<commit_message>
updated the erd diagram
</commit_message>
<xml_diff>
--- a/Database Documentation/Database Documentation.pptx
+++ b/Database Documentation/Database Documentation.pptx
@@ -266,7 +266,7 @@
           <a:p>
             <a:fld id="{80FB5BE9-7F13-4564-9415-A50ADEB12BD1}" type="datetimeFigureOut">
               <a:rPr lang="en-GB" smtClean="0"/>
-              <a:t>20/04/2020</a:t>
+              <a:t>22/04/2020</a:t>
             </a:fld>
             <a:endParaRPr lang="en-GB" dirty="0"/>
           </a:p>
@@ -466,7 +466,7 @@
           <a:p>
             <a:fld id="{80FB5BE9-7F13-4564-9415-A50ADEB12BD1}" type="datetimeFigureOut">
               <a:rPr lang="en-GB" smtClean="0"/>
-              <a:t>20/04/2020</a:t>
+              <a:t>22/04/2020</a:t>
             </a:fld>
             <a:endParaRPr lang="en-GB" dirty="0"/>
           </a:p>
@@ -676,7 +676,7 @@
           <a:p>
             <a:fld id="{80FB5BE9-7F13-4564-9415-A50ADEB12BD1}" type="datetimeFigureOut">
               <a:rPr lang="en-GB" smtClean="0"/>
-              <a:t>20/04/2020</a:t>
+              <a:t>22/04/2020</a:t>
             </a:fld>
             <a:endParaRPr lang="en-GB" dirty="0"/>
           </a:p>
@@ -876,7 +876,7 @@
           <a:p>
             <a:fld id="{80FB5BE9-7F13-4564-9415-A50ADEB12BD1}" type="datetimeFigureOut">
               <a:rPr lang="en-GB" smtClean="0"/>
-              <a:t>20/04/2020</a:t>
+              <a:t>22/04/2020</a:t>
             </a:fld>
             <a:endParaRPr lang="en-GB" dirty="0"/>
           </a:p>
@@ -1152,7 +1152,7 @@
           <a:p>
             <a:fld id="{80FB5BE9-7F13-4564-9415-A50ADEB12BD1}" type="datetimeFigureOut">
               <a:rPr lang="en-GB" smtClean="0"/>
-              <a:t>20/04/2020</a:t>
+              <a:t>22/04/2020</a:t>
             </a:fld>
             <a:endParaRPr lang="en-GB" dirty="0"/>
           </a:p>
@@ -1420,7 +1420,7 @@
           <a:p>
             <a:fld id="{80FB5BE9-7F13-4564-9415-A50ADEB12BD1}" type="datetimeFigureOut">
               <a:rPr lang="en-GB" smtClean="0"/>
-              <a:t>20/04/2020</a:t>
+              <a:t>22/04/2020</a:t>
             </a:fld>
             <a:endParaRPr lang="en-GB" dirty="0"/>
           </a:p>
@@ -1835,7 +1835,7 @@
           <a:p>
             <a:fld id="{80FB5BE9-7F13-4564-9415-A50ADEB12BD1}" type="datetimeFigureOut">
               <a:rPr lang="en-GB" smtClean="0"/>
-              <a:t>20/04/2020</a:t>
+              <a:t>22/04/2020</a:t>
             </a:fld>
             <a:endParaRPr lang="en-GB" dirty="0"/>
           </a:p>
@@ -1977,7 +1977,7 @@
           <a:p>
             <a:fld id="{80FB5BE9-7F13-4564-9415-A50ADEB12BD1}" type="datetimeFigureOut">
               <a:rPr lang="en-GB" smtClean="0"/>
-              <a:t>20/04/2020</a:t>
+              <a:t>22/04/2020</a:t>
             </a:fld>
             <a:endParaRPr lang="en-GB" dirty="0"/>
           </a:p>
@@ -2090,7 +2090,7 @@
           <a:p>
             <a:fld id="{80FB5BE9-7F13-4564-9415-A50ADEB12BD1}" type="datetimeFigureOut">
               <a:rPr lang="en-GB" smtClean="0"/>
-              <a:t>20/04/2020</a:t>
+              <a:t>22/04/2020</a:t>
             </a:fld>
             <a:endParaRPr lang="en-GB" dirty="0"/>
           </a:p>
@@ -2403,7 +2403,7 @@
           <a:p>
             <a:fld id="{80FB5BE9-7F13-4564-9415-A50ADEB12BD1}" type="datetimeFigureOut">
               <a:rPr lang="en-GB" smtClean="0"/>
-              <a:t>20/04/2020</a:t>
+              <a:t>22/04/2020</a:t>
             </a:fld>
             <a:endParaRPr lang="en-GB" dirty="0"/>
           </a:p>
@@ -2692,7 +2692,7 @@
           <a:p>
             <a:fld id="{80FB5BE9-7F13-4564-9415-A50ADEB12BD1}" type="datetimeFigureOut">
               <a:rPr lang="en-GB" smtClean="0"/>
-              <a:t>20/04/2020</a:t>
+              <a:t>22/04/2020</a:t>
             </a:fld>
             <a:endParaRPr lang="en-GB" dirty="0"/>
           </a:p>
@@ -2935,7 +2935,7 @@
           <a:p>
             <a:fld id="{80FB5BE9-7F13-4564-9415-A50ADEB12BD1}" type="datetimeFigureOut">
               <a:rPr lang="en-GB" smtClean="0"/>
-              <a:t>20/04/2020</a:t>
+              <a:t>22/04/2020</a:t>
             </a:fld>
             <a:endParaRPr lang="en-GB" dirty="0"/>
           </a:p>
@@ -8348,7 +8348,7 @@
           <p:nvPr>
             <p:extLst>
               <p:ext uri="{D42A27DB-BD31-4B8C-83A1-F6EECF244321}">
-                <p14:modId xmlns:p14="http://schemas.microsoft.com/office/powerpoint/2010/main" val="1446418841"/>
+                <p14:modId xmlns:p14="http://schemas.microsoft.com/office/powerpoint/2010/main" val="342287743"/>
               </p:ext>
             </p:extLst>
           </p:nvPr>
@@ -8468,7 +8468,7 @@
                       <a:pPr algn="ctr"/>
                       <a:r>
                         <a:rPr lang="en-GB" dirty="0"/>
-                        <a:t>PROFILE ID</a:t>
+                        <a:t>Profile Name</a:t>
                       </a:r>
                     </a:p>
                   </a:txBody>
@@ -8481,9 +8481,10 @@
                     <a:p>
                       <a:pPr algn="ctr"/>
                       <a:r>
-                        <a:rPr lang="en-GB" dirty="0"/>
-                        <a:t>Profile Name</a:t>
-                      </a:r>
+                        <a:rPr lang="en-US" altLang="en-US" sz="1800" dirty="0"/>
+                        <a:t>One Time Fee </a:t>
+                      </a:r>
+                      <a:endParaRPr lang="en-GB" dirty="0"/>
                     </a:p>
                   </a:txBody>
                   <a:tcPr anchor="ctr"/>
@@ -8910,14 +8911,14 @@
           <p:nvPr>
             <p:extLst>
               <p:ext uri="{D42A27DB-BD31-4B8C-83A1-F6EECF244321}">
-                <p14:modId xmlns:p14="http://schemas.microsoft.com/office/powerpoint/2010/main" val="2679063501"/>
+                <p14:modId xmlns:p14="http://schemas.microsoft.com/office/powerpoint/2010/main" val="1960369115"/>
               </p:ext>
             </p:extLst>
           </p:nvPr>
         </p:nvGraphicFramePr>
         <p:xfrm>
           <a:off x="296552" y="5791514"/>
-          <a:ext cx="11666064" cy="770213"/>
+          <a:ext cx="10369832" cy="914400"/>
         </p:xfrm>
         <a:graphic>
           <a:graphicData uri="http://schemas.openxmlformats.org/drawingml/2006/table">
@@ -8926,56 +8927,56 @@
                 <a:tableStyleId>{21E4AEA4-8DFA-4A89-87EB-49C32662AFE0}</a:tableStyleId>
               </a:tblPr>
               <a:tblGrid>
-                <a:gridCol w="1458258">
+                <a:gridCol w="1296229">
                   <a:extLst>
                     <a:ext uri="{9D8B030D-6E8A-4147-A177-3AD203B41FA5}">
                       <a16:colId xmlns:a16="http://schemas.microsoft.com/office/drawing/2014/main" val="2544850993"/>
                     </a:ext>
                   </a:extLst>
                 </a:gridCol>
-                <a:gridCol w="1458258">
+                <a:gridCol w="1296229">
                   <a:extLst>
                     <a:ext uri="{9D8B030D-6E8A-4147-A177-3AD203B41FA5}">
                       <a16:colId xmlns:a16="http://schemas.microsoft.com/office/drawing/2014/main" val="4160908569"/>
                     </a:ext>
                   </a:extLst>
                 </a:gridCol>
-                <a:gridCol w="1458258">
+                <a:gridCol w="1296229">
                   <a:extLst>
                     <a:ext uri="{9D8B030D-6E8A-4147-A177-3AD203B41FA5}">
                       <a16:colId xmlns:a16="http://schemas.microsoft.com/office/drawing/2014/main" val="3835503643"/>
                     </a:ext>
                   </a:extLst>
                 </a:gridCol>
-                <a:gridCol w="1458258">
+                <a:gridCol w="1296229">
                   <a:extLst>
                     <a:ext uri="{9D8B030D-6E8A-4147-A177-3AD203B41FA5}">
                       <a16:colId xmlns:a16="http://schemas.microsoft.com/office/drawing/2014/main" val="1590507565"/>
                     </a:ext>
                   </a:extLst>
                 </a:gridCol>
-                <a:gridCol w="1458258">
+                <a:gridCol w="1296229">
                   <a:extLst>
                     <a:ext uri="{9D8B030D-6E8A-4147-A177-3AD203B41FA5}">
                       <a16:colId xmlns:a16="http://schemas.microsoft.com/office/drawing/2014/main" val="1851729959"/>
                     </a:ext>
                   </a:extLst>
                 </a:gridCol>
-                <a:gridCol w="1458258">
+                <a:gridCol w="1296229">
                   <a:extLst>
                     <a:ext uri="{9D8B030D-6E8A-4147-A177-3AD203B41FA5}">
                       <a16:colId xmlns:a16="http://schemas.microsoft.com/office/drawing/2014/main" val="976838896"/>
                     </a:ext>
                   </a:extLst>
                 </a:gridCol>
-                <a:gridCol w="1458258">
+                <a:gridCol w="1296229">
                   <a:extLst>
                     <a:ext uri="{9D8B030D-6E8A-4147-A177-3AD203B41FA5}">
                       <a16:colId xmlns:a16="http://schemas.microsoft.com/office/drawing/2014/main" val="593576195"/>
                     </a:ext>
                   </a:extLst>
                 </a:gridCol>
-                <a:gridCol w="1458258">
+                <a:gridCol w="1296229">
                   <a:extLst>
                     <a:ext uri="{9D8B030D-6E8A-4147-A177-3AD203B41FA5}">
                       <a16:colId xmlns:a16="http://schemas.microsoft.com/office/drawing/2014/main" val="1376094664"/>
@@ -9041,256 +9042,9 @@
                       </a:pPr>
                       <a:r>
                         <a:rPr lang="en-GB" dirty="0"/>
-                        <a:t>Profile ID</a:t>
-                      </a:r>
-                    </a:p>
-                  </a:txBody>
-                  <a:tcPr anchor="ctr"/>
-                </a:tc>
-                <a:tc>
-                  <a:txBody>
-                    <a:bodyPr/>
-                    <a:lstStyle/>
-                    <a:p>
-                      <a:pPr algn="ctr"/>
-                      <a:r>
-                        <a:rPr lang="en-GB" dirty="0"/>
-                        <a:t>Service</a:t>
-                      </a:r>
-                    </a:p>
-                    <a:p>
-                      <a:pPr algn="ctr"/>
-                      <a:r>
-                        <a:rPr lang="en-GB" dirty="0"/>
-                        <a:t>ID</a:t>
-                      </a:r>
-                    </a:p>
-                  </a:txBody>
-                  <a:tcPr anchor="ctr"/>
-                </a:tc>
-                <a:tc>
-                  <a:txBody>
-                    <a:bodyPr/>
-                    <a:lstStyle/>
-                    <a:p>
-                      <a:pPr algn="ctr"/>
-                      <a:r>
-                        <a:rPr lang="en-GB" sz="1800" dirty="0"/>
-                        <a:t>Round</a:t>
-                      </a:r>
-                    </a:p>
-                    <a:p>
-                      <a:pPr algn="ctr"/>
-                      <a:r>
-                        <a:rPr lang="en-GB" sz="1800" dirty="0"/>
-                        <a:t>Amount</a:t>
-                      </a:r>
-                    </a:p>
-                  </a:txBody>
-                  <a:tcPr anchor="ctr"/>
-                </a:tc>
-                <a:tc>
-                  <a:txBody>
-                    <a:bodyPr/>
-                    <a:lstStyle/>
-                    <a:p>
-                      <a:pPr algn="ctr"/>
-                      <a:r>
-                        <a:rPr lang="en-GB" sz="1100" dirty="0"/>
-                        <a:t>Fees</a:t>
-                      </a:r>
-                    </a:p>
-                    <a:p>
-                      <a:pPr algn="ctr"/>
-                      <a:r>
-                        <a:rPr lang="en-GB" sz="1100" dirty="0"/>
-                        <a:t>Local</a:t>
-                      </a:r>
-                    </a:p>
-                    <a:p>
-                      <a:pPr algn="ctr"/>
-                      <a:r>
-                        <a:rPr lang="en-GB" sz="1100" dirty="0"/>
-                        <a:t>Same Operator</a:t>
-                      </a:r>
-                    </a:p>
-                  </a:txBody>
-                  <a:tcPr anchor="ctr"/>
-                </a:tc>
-                <a:tc>
-                  <a:txBody>
-                    <a:bodyPr/>
-                    <a:lstStyle/>
-                    <a:p>
-                      <a:pPr algn="ctr"/>
-                      <a:r>
-                        <a:rPr lang="en-GB" sz="1100" dirty="0"/>
-                        <a:t>Fees</a:t>
-                      </a:r>
-                    </a:p>
-                    <a:p>
-                      <a:pPr algn="ctr"/>
-                      <a:r>
-                        <a:rPr lang="en-GB" sz="1100" dirty="0"/>
-                        <a:t>Local</a:t>
-                      </a:r>
-                    </a:p>
-                    <a:p>
-                      <a:pPr algn="ctr"/>
-                      <a:r>
-                        <a:rPr lang="en-GB" sz="1100" dirty="0"/>
-                        <a:t>Another Operator</a:t>
-                      </a:r>
-                    </a:p>
-                  </a:txBody>
-                  <a:tcPr anchor="ctr"/>
-                </a:tc>
-                <a:tc>
-                  <a:txBody>
-                    <a:bodyPr/>
-                    <a:lstStyle/>
-                    <a:p>
-                      <a:pPr algn="ctr"/>
-                      <a:r>
-                        <a:rPr lang="en-GB" sz="1800" dirty="0"/>
-                        <a:t>Fees</a:t>
-                      </a:r>
-                    </a:p>
-                    <a:p>
-                      <a:pPr algn="ctr"/>
-                      <a:r>
-                        <a:rPr lang="en-GB" sz="1800" dirty="0"/>
-                        <a:t>International</a:t>
-                      </a:r>
-                    </a:p>
-                  </a:txBody>
-                  <a:tcPr anchor="ctr"/>
-                </a:tc>
-                <a:tc>
-                  <a:txBody>
-                    <a:bodyPr/>
-                    <a:lstStyle/>
-                    <a:p>
-                      <a:pPr algn="ctr"/>
-                      <a:r>
-                        <a:rPr lang="en-GB" sz="1100" dirty="0"/>
-                        <a:t>Additional</a:t>
-                      </a:r>
-                    </a:p>
-                    <a:p>
-                      <a:pPr algn="ctr"/>
-                      <a:r>
-                        <a:rPr lang="en-GB" sz="1100" dirty="0"/>
-                        <a:t>Quota</a:t>
-                      </a:r>
-                    </a:p>
-                    <a:p>
-                      <a:pPr algn="ctr"/>
-                      <a:r>
-                        <a:rPr lang="en-GB" sz="1100" dirty="0"/>
-                        <a:t>Size</a:t>
-                      </a:r>
-                    </a:p>
-                    <a:p>
-                      <a:pPr algn="ctr"/>
-                      <a:r>
-                        <a:rPr lang="en-GB" sz="1100" dirty="0"/>
-                        <a:t>(LE/MB/COUNT)</a:t>
-                      </a:r>
-                    </a:p>
-                  </a:txBody>
-                  <a:tcPr anchor="ctr"/>
-                </a:tc>
-                <a:extLst>
-                  <a:ext uri="{0D108BD9-81ED-4DB2-BD59-A6C34878D82A}">
-                    <a16:rowId xmlns:a16="http://schemas.microsoft.com/office/drawing/2014/main" val="3577827613"/>
-                  </a:ext>
-                </a:extLst>
-              </a:tr>
-            </a:tbl>
-          </a:graphicData>
-        </a:graphic>
-      </p:graphicFrame>
-      <p:graphicFrame>
-        <p:nvGraphicFramePr>
-          <p:cNvPr id="9" name="Table 8">
-            <a:extLst>
-              <a:ext uri="{FF2B5EF4-FFF2-40B4-BE49-F238E27FC236}">
-                <a16:creationId xmlns:a16="http://schemas.microsoft.com/office/drawing/2014/main" id="{072447E5-7ED2-4BA7-A1E9-77259EEADE86}"/>
-              </a:ext>
-            </a:extLst>
-          </p:cNvPr>
-          <p:cNvGraphicFramePr>
-            <a:graphicFrameLocks noGrp="1"/>
-          </p:cNvGraphicFramePr>
-          <p:nvPr>
-            <p:extLst>
-              <p:ext uri="{D42A27DB-BD31-4B8C-83A1-F6EECF244321}">
-                <p14:modId xmlns:p14="http://schemas.microsoft.com/office/powerpoint/2010/main" val="1160147922"/>
-              </p:ext>
-            </p:extLst>
-          </p:nvPr>
-        </p:nvGraphicFramePr>
-        <p:xfrm>
-          <a:off x="8403602" y="4648831"/>
-          <a:ext cx="3559014" cy="640080"/>
-        </p:xfrm>
-        <a:graphic>
-          <a:graphicData uri="http://schemas.openxmlformats.org/drawingml/2006/table">
-            <a:tbl>
-              <a:tblPr firstRow="1" bandRow="1">
-                <a:tableStyleId>{00A15C55-8517-42AA-B614-E9B94910E393}</a:tableStyleId>
-              </a:tblPr>
-              <a:tblGrid>
-                <a:gridCol w="1186338">
-                  <a:extLst>
-                    <a:ext uri="{9D8B030D-6E8A-4147-A177-3AD203B41FA5}">
-                      <a16:colId xmlns:a16="http://schemas.microsoft.com/office/drawing/2014/main" val="2059838879"/>
-                    </a:ext>
-                  </a:extLst>
-                </a:gridCol>
-                <a:gridCol w="1186338">
-                  <a:extLst>
-                    <a:ext uri="{9D8B030D-6E8A-4147-A177-3AD203B41FA5}">
-                      <a16:colId xmlns:a16="http://schemas.microsoft.com/office/drawing/2014/main" val="3077536117"/>
-                    </a:ext>
-                  </a:extLst>
-                </a:gridCol>
-                <a:gridCol w="1186338">
-                  <a:extLst>
-                    <a:ext uri="{9D8B030D-6E8A-4147-A177-3AD203B41FA5}">
-                      <a16:colId xmlns:a16="http://schemas.microsoft.com/office/drawing/2014/main" val="2412225613"/>
-                    </a:ext>
-                  </a:extLst>
-                </a:gridCol>
-              </a:tblGrid>
-              <a:tr h="374469">
-                <a:tc>
-                  <a:txBody>
-                    <a:bodyPr/>
-                    <a:lstStyle/>
-                    <a:p>
-                      <a:pPr algn="ctr"/>
-                      <a:r>
-                        <a:rPr lang="en-GB" dirty="0">
-                          <a:solidFill>
-                            <a:sysClr val="windowText" lastClr="000000"/>
-                          </a:solidFill>
-                        </a:rPr>
-                        <a:t>Services</a:t>
-                      </a:r>
-                    </a:p>
-                  </a:txBody>
-                  <a:tcPr anchor="ctr">
-                    <a:solidFill>
-                      <a:schemeClr val="bg2"/>
-                    </a:solidFill>
-                  </a:tcPr>
-                </a:tc>
-                <a:tc>
-                  <a:txBody>
-                    <a:bodyPr/>
-                    <a:lstStyle/>
+                        <a:t>Profile</a:t>
+                      </a:r>
+                    </a:p>
                     <a:p>
                       <a:pPr marL="0" marR="0" lvl="0" indent="0" algn="ctr" defTabSz="914400" rtl="0" eaLnBrk="1" fontAlgn="auto" latinLnBrk="0" hangingPunct="1">
                         <a:lnSpc>
@@ -9311,7 +9065,7 @@
                       </a:pPr>
                       <a:r>
                         <a:rPr lang="en-GB" dirty="0"/>
-                        <a:t>Service ID</a:t>
+                        <a:t>ID</a:t>
                       </a:r>
                     </a:p>
                   </a:txBody>
@@ -9324,9 +9078,308 @@
                     <a:p>
                       <a:pPr algn="ctr"/>
                       <a:r>
+                        <a:rPr lang="en-GB" dirty="0"/>
+                        <a:t>Service</a:t>
+                      </a:r>
+                    </a:p>
+                    <a:p>
+                      <a:pPr algn="ctr"/>
+                      <a:r>
+                        <a:rPr lang="en-GB" dirty="0"/>
+                        <a:t>ID</a:t>
+                      </a:r>
+                    </a:p>
+                  </a:txBody>
+                  <a:tcPr anchor="ctr"/>
+                </a:tc>
+                <a:tc>
+                  <a:txBody>
+                    <a:bodyPr/>
+                    <a:lstStyle/>
+                    <a:p>
+                      <a:pPr algn="ctr"/>
+                      <a:r>
+                        <a:rPr lang="en-GB" sz="1600" dirty="0"/>
+                        <a:t>Round</a:t>
+                      </a:r>
+                    </a:p>
+                    <a:p>
+                      <a:pPr algn="ctr"/>
+                      <a:r>
+                        <a:rPr lang="en-GB" sz="1600" dirty="0"/>
+                        <a:t>Amount</a:t>
+                      </a:r>
+                    </a:p>
+                  </a:txBody>
+                  <a:tcPr anchor="ctr"/>
+                </a:tc>
+                <a:tc>
+                  <a:txBody>
+                    <a:bodyPr/>
+                    <a:lstStyle/>
+                    <a:p>
+                      <a:pPr algn="ctr"/>
+                      <a:r>
+                        <a:rPr lang="en-GB" sz="1100" dirty="0"/>
+                        <a:t>Fees</a:t>
+                      </a:r>
+                    </a:p>
+                    <a:p>
+                      <a:pPr algn="ctr"/>
+                      <a:r>
+                        <a:rPr lang="en-GB" sz="1100" dirty="0"/>
+                        <a:t>Local</a:t>
+                      </a:r>
+                    </a:p>
+                    <a:p>
+                      <a:pPr algn="ctr"/>
+                      <a:r>
+                        <a:rPr lang="en-GB" sz="1100" dirty="0"/>
+                        <a:t>Same Operator</a:t>
+                      </a:r>
+                    </a:p>
+                  </a:txBody>
+                  <a:tcPr anchor="ctr"/>
+                </a:tc>
+                <a:tc>
+                  <a:txBody>
+                    <a:bodyPr/>
+                    <a:lstStyle/>
+                    <a:p>
+                      <a:pPr algn="ctr"/>
+                      <a:r>
+                        <a:rPr lang="en-GB" sz="1100" dirty="0"/>
+                        <a:t>Fees</a:t>
+                      </a:r>
+                    </a:p>
+                    <a:p>
+                      <a:pPr algn="ctr"/>
+                      <a:r>
+                        <a:rPr lang="en-GB" sz="1100" dirty="0"/>
+                        <a:t>Local</a:t>
+                      </a:r>
+                    </a:p>
+                    <a:p>
+                      <a:pPr algn="ctr"/>
+                      <a:r>
+                        <a:rPr lang="en-GB" sz="1100" dirty="0"/>
+                        <a:t>Another Operator</a:t>
+                      </a:r>
+                    </a:p>
+                  </a:txBody>
+                  <a:tcPr anchor="ctr"/>
+                </a:tc>
+                <a:tc>
+                  <a:txBody>
+                    <a:bodyPr/>
+                    <a:lstStyle/>
+                    <a:p>
+                      <a:pPr algn="ctr"/>
+                      <a:r>
+                        <a:rPr lang="en-GB" sz="1800" dirty="0"/>
+                        <a:t>Fees</a:t>
+                      </a:r>
+                    </a:p>
+                    <a:p>
+                      <a:pPr algn="ctr"/>
+                      <a:r>
+                        <a:rPr lang="en-GB" sz="1800" dirty="0"/>
+                        <a:t>International</a:t>
+                      </a:r>
+                    </a:p>
+                  </a:txBody>
+                  <a:tcPr anchor="ctr"/>
+                </a:tc>
+                <a:tc>
+                  <a:txBody>
+                    <a:bodyPr/>
+                    <a:lstStyle/>
+                    <a:p>
+                      <a:pPr algn="ctr"/>
+                      <a:r>
+                        <a:rPr lang="en-GB" sz="1100" dirty="0"/>
+                        <a:t>Additional</a:t>
+                      </a:r>
+                    </a:p>
+                    <a:p>
+                      <a:pPr algn="ctr"/>
+                      <a:r>
+                        <a:rPr lang="en-GB" sz="1100" dirty="0"/>
+                        <a:t>Quota</a:t>
+                      </a:r>
+                    </a:p>
+                    <a:p>
+                      <a:pPr algn="ctr"/>
+                      <a:r>
+                        <a:rPr lang="en-GB" sz="1100" dirty="0"/>
+                        <a:t>Size</a:t>
+                      </a:r>
+                    </a:p>
+                    <a:p>
+                      <a:pPr algn="ctr"/>
+                      <a:r>
+                        <a:rPr lang="en-GB" sz="1100" dirty="0"/>
+                        <a:t>(LE/MB/COUNT)</a:t>
+                      </a:r>
+                    </a:p>
+                  </a:txBody>
+                  <a:tcPr anchor="ctr"/>
+                </a:tc>
+                <a:extLst>
+                  <a:ext uri="{0D108BD9-81ED-4DB2-BD59-A6C34878D82A}">
+                    <a16:rowId xmlns:a16="http://schemas.microsoft.com/office/drawing/2014/main" val="3577827613"/>
+                  </a:ext>
+                </a:extLst>
+              </a:tr>
+            </a:tbl>
+          </a:graphicData>
+        </a:graphic>
+      </p:graphicFrame>
+      <p:graphicFrame>
+        <p:nvGraphicFramePr>
+          <p:cNvPr id="9" name="Table 8">
+            <a:extLst>
+              <a:ext uri="{FF2B5EF4-FFF2-40B4-BE49-F238E27FC236}">
+                <a16:creationId xmlns:a16="http://schemas.microsoft.com/office/drawing/2014/main" id="{072447E5-7ED2-4BA7-A1E9-77259EEADE86}"/>
+              </a:ext>
+            </a:extLst>
+          </p:cNvPr>
+          <p:cNvGraphicFramePr>
+            <a:graphicFrameLocks noGrp="1"/>
+          </p:cNvGraphicFramePr>
+          <p:nvPr>
+            <p:extLst>
+              <p:ext uri="{D42A27DB-BD31-4B8C-83A1-F6EECF244321}">
+                <p14:modId xmlns:p14="http://schemas.microsoft.com/office/powerpoint/2010/main" val="2194798429"/>
+              </p:ext>
+            </p:extLst>
+          </p:nvPr>
+        </p:nvGraphicFramePr>
+        <p:xfrm>
+          <a:off x="8040624" y="4648673"/>
+          <a:ext cx="3921992" cy="640080"/>
+        </p:xfrm>
+        <a:graphic>
+          <a:graphicData uri="http://schemas.openxmlformats.org/drawingml/2006/table">
+            <a:tbl>
+              <a:tblPr firstRow="1" bandRow="1">
+                <a:tableStyleId>{00A15C55-8517-42AA-B614-E9B94910E393}</a:tableStyleId>
+              </a:tblPr>
+              <a:tblGrid>
+                <a:gridCol w="980498">
+                  <a:extLst>
+                    <a:ext uri="{9D8B030D-6E8A-4147-A177-3AD203B41FA5}">
+                      <a16:colId xmlns:a16="http://schemas.microsoft.com/office/drawing/2014/main" val="2059838879"/>
+                    </a:ext>
+                  </a:extLst>
+                </a:gridCol>
+                <a:gridCol w="980498">
+                  <a:extLst>
+                    <a:ext uri="{9D8B030D-6E8A-4147-A177-3AD203B41FA5}">
+                      <a16:colId xmlns:a16="http://schemas.microsoft.com/office/drawing/2014/main" val="3077536117"/>
+                    </a:ext>
+                  </a:extLst>
+                </a:gridCol>
+                <a:gridCol w="980498">
+                  <a:extLst>
+                    <a:ext uri="{9D8B030D-6E8A-4147-A177-3AD203B41FA5}">
+                      <a16:colId xmlns:a16="http://schemas.microsoft.com/office/drawing/2014/main" val="2412225613"/>
+                    </a:ext>
+                  </a:extLst>
+                </a:gridCol>
+                <a:gridCol w="980498">
+                  <a:extLst>
+                    <a:ext uri="{9D8B030D-6E8A-4147-A177-3AD203B41FA5}">
+                      <a16:colId xmlns:a16="http://schemas.microsoft.com/office/drawing/2014/main" val="1493320668"/>
+                    </a:ext>
+                  </a:extLst>
+                </a:gridCol>
+              </a:tblGrid>
+              <a:tr h="374469">
+                <a:tc>
+                  <a:txBody>
+                    <a:bodyPr/>
+                    <a:lstStyle/>
+                    <a:p>
+                      <a:pPr algn="ctr"/>
+                      <a:r>
+                        <a:rPr lang="en-GB" dirty="0">
+                          <a:solidFill>
+                            <a:sysClr val="windowText" lastClr="000000"/>
+                          </a:solidFill>
+                        </a:rPr>
+                        <a:t>Services</a:t>
+                      </a:r>
+                    </a:p>
+                  </a:txBody>
+                  <a:tcPr anchor="ctr">
+                    <a:solidFill>
+                      <a:schemeClr val="bg2"/>
+                    </a:solidFill>
+                  </a:tcPr>
+                </a:tc>
+                <a:tc>
+                  <a:txBody>
+                    <a:bodyPr/>
+                    <a:lstStyle/>
+                    <a:p>
+                      <a:pPr marL="0" marR="0" lvl="0" indent="0" algn="ctr" defTabSz="914400" rtl="0" eaLnBrk="1" fontAlgn="auto" latinLnBrk="0" hangingPunct="1">
+                        <a:lnSpc>
+                          <a:spcPct val="100000"/>
+                        </a:lnSpc>
+                        <a:spcBef>
+                          <a:spcPts val="0"/>
+                        </a:spcBef>
+                        <a:spcAft>
+                          <a:spcPts val="0"/>
+                        </a:spcAft>
+                        <a:buClrTx/>
+                        <a:buSzTx/>
+                        <a:buFontTx/>
+                        <a:buNone/>
+                        <a:tabLst/>
+                        <a:defRPr/>
+                      </a:pPr>
+                      <a:r>
+                        <a:rPr lang="en-GB" dirty="0"/>
+                        <a:t>Service ID</a:t>
+                      </a:r>
+                    </a:p>
+                  </a:txBody>
+                  <a:tcPr anchor="ctr"/>
+                </a:tc>
+                <a:tc>
+                  <a:txBody>
+                    <a:bodyPr/>
+                    <a:lstStyle/>
+                    <a:p>
+                      <a:pPr algn="ctr"/>
+                      <a:r>
                         <a:rPr lang="en-GB" sz="1800" dirty="0"/>
                         <a:t>Service Name</a:t>
                       </a:r>
+                    </a:p>
+                  </a:txBody>
+                  <a:tcPr anchor="ctr"/>
+                </a:tc>
+                <a:tc>
+                  <a:txBody>
+                    <a:bodyPr/>
+                    <a:lstStyle/>
+                    <a:p>
+                      <a:pPr algn="ctr"/>
+                      <a:r>
+                        <a:rPr lang="en-US" altLang="en-US" sz="1800" dirty="0"/>
+                        <a:t>Rate</a:t>
+                      </a:r>
+                    </a:p>
+                    <a:p>
+                      <a:pPr algn="ctr"/>
+                      <a:r>
+                        <a:rPr lang="en-US" sz="1800" dirty="0"/>
+                        <a:t>Points</a:t>
+                      </a:r>
+                      <a:endParaRPr lang="en-GB" sz="1800" dirty="0"/>
                     </a:p>
                   </a:txBody>
                   <a:tcPr anchor="ctr"/>

</xml_diff>

<commit_message>
added the new erd
</commit_message>
<xml_diff>
--- a/Database Documentation/Database Documentation.pptx
+++ b/Database Documentation/Database Documentation.pptx
@@ -267,7 +267,7 @@
           <a:p>
             <a:fld id="{80FB5BE9-7F13-4564-9415-A50ADEB12BD1}" type="datetimeFigureOut">
               <a:rPr lang="en-GB" smtClean="0"/>
-              <a:t>22/04/2020</a:t>
+              <a:t>25/04/2020</a:t>
             </a:fld>
             <a:endParaRPr lang="en-GB" dirty="0"/>
           </a:p>
@@ -467,7 +467,7 @@
           <a:p>
             <a:fld id="{80FB5BE9-7F13-4564-9415-A50ADEB12BD1}" type="datetimeFigureOut">
               <a:rPr lang="en-GB" smtClean="0"/>
-              <a:t>22/04/2020</a:t>
+              <a:t>25/04/2020</a:t>
             </a:fld>
             <a:endParaRPr lang="en-GB" dirty="0"/>
           </a:p>
@@ -677,7 +677,7 @@
           <a:p>
             <a:fld id="{80FB5BE9-7F13-4564-9415-A50ADEB12BD1}" type="datetimeFigureOut">
               <a:rPr lang="en-GB" smtClean="0"/>
-              <a:t>22/04/2020</a:t>
+              <a:t>25/04/2020</a:t>
             </a:fld>
             <a:endParaRPr lang="en-GB" dirty="0"/>
           </a:p>
@@ -877,7 +877,7 @@
           <a:p>
             <a:fld id="{80FB5BE9-7F13-4564-9415-A50ADEB12BD1}" type="datetimeFigureOut">
               <a:rPr lang="en-GB" smtClean="0"/>
-              <a:t>22/04/2020</a:t>
+              <a:t>25/04/2020</a:t>
             </a:fld>
             <a:endParaRPr lang="en-GB" dirty="0"/>
           </a:p>
@@ -1153,7 +1153,7 @@
           <a:p>
             <a:fld id="{80FB5BE9-7F13-4564-9415-A50ADEB12BD1}" type="datetimeFigureOut">
               <a:rPr lang="en-GB" smtClean="0"/>
-              <a:t>22/04/2020</a:t>
+              <a:t>25/04/2020</a:t>
             </a:fld>
             <a:endParaRPr lang="en-GB" dirty="0"/>
           </a:p>
@@ -1421,7 +1421,7 @@
           <a:p>
             <a:fld id="{80FB5BE9-7F13-4564-9415-A50ADEB12BD1}" type="datetimeFigureOut">
               <a:rPr lang="en-GB" smtClean="0"/>
-              <a:t>22/04/2020</a:t>
+              <a:t>25/04/2020</a:t>
             </a:fld>
             <a:endParaRPr lang="en-GB" dirty="0"/>
           </a:p>
@@ -1836,7 +1836,7 @@
           <a:p>
             <a:fld id="{80FB5BE9-7F13-4564-9415-A50ADEB12BD1}" type="datetimeFigureOut">
               <a:rPr lang="en-GB" smtClean="0"/>
-              <a:t>22/04/2020</a:t>
+              <a:t>25/04/2020</a:t>
             </a:fld>
             <a:endParaRPr lang="en-GB" dirty="0"/>
           </a:p>
@@ -1978,7 +1978,7 @@
           <a:p>
             <a:fld id="{80FB5BE9-7F13-4564-9415-A50ADEB12BD1}" type="datetimeFigureOut">
               <a:rPr lang="en-GB" smtClean="0"/>
-              <a:t>22/04/2020</a:t>
+              <a:t>25/04/2020</a:t>
             </a:fld>
             <a:endParaRPr lang="en-GB" dirty="0"/>
           </a:p>
@@ -2091,7 +2091,7 @@
           <a:p>
             <a:fld id="{80FB5BE9-7F13-4564-9415-A50ADEB12BD1}" type="datetimeFigureOut">
               <a:rPr lang="en-GB" smtClean="0"/>
-              <a:t>22/04/2020</a:t>
+              <a:t>25/04/2020</a:t>
             </a:fld>
             <a:endParaRPr lang="en-GB" dirty="0"/>
           </a:p>
@@ -2404,7 +2404,7 @@
           <a:p>
             <a:fld id="{80FB5BE9-7F13-4564-9415-A50ADEB12BD1}" type="datetimeFigureOut">
               <a:rPr lang="en-GB" smtClean="0"/>
-              <a:t>22/04/2020</a:t>
+              <a:t>25/04/2020</a:t>
             </a:fld>
             <a:endParaRPr lang="en-GB" dirty="0"/>
           </a:p>
@@ -2693,7 +2693,7 @@
           <a:p>
             <a:fld id="{80FB5BE9-7F13-4564-9415-A50ADEB12BD1}" type="datetimeFigureOut">
               <a:rPr lang="en-GB" smtClean="0"/>
-              <a:t>22/04/2020</a:t>
+              <a:t>25/04/2020</a:t>
             </a:fld>
             <a:endParaRPr lang="en-GB" dirty="0"/>
           </a:p>
@@ -2936,7 +2936,7 @@
           <a:p>
             <a:fld id="{80FB5BE9-7F13-4564-9415-A50ADEB12BD1}" type="datetimeFigureOut">
               <a:rPr lang="en-GB" smtClean="0"/>
-              <a:t>22/04/2020</a:t>
+              <a:t>25/04/2020</a:t>
             </a:fld>
             <a:endParaRPr lang="en-GB" dirty="0"/>
           </a:p>
@@ -8095,7 +8095,7 @@
           <p:nvPr>
             <p:extLst>
               <p:ext uri="{D42A27DB-BD31-4B8C-83A1-F6EECF244321}">
-                <p14:modId xmlns:p14="http://schemas.microsoft.com/office/powerpoint/2010/main" val="4214181991"/>
+                <p14:modId xmlns:p14="http://schemas.microsoft.com/office/powerpoint/2010/main" val="2279121783"/>
               </p:ext>
             </p:extLst>
           </p:nvPr>
@@ -8681,14 +8681,14 @@
           <p:nvPr>
             <p:extLst>
               <p:ext uri="{D42A27DB-BD31-4B8C-83A1-F6EECF244321}">
-                <p14:modId xmlns:p14="http://schemas.microsoft.com/office/powerpoint/2010/main" val="2423187898"/>
+                <p14:modId xmlns:p14="http://schemas.microsoft.com/office/powerpoint/2010/main" val="4119309427"/>
               </p:ext>
             </p:extLst>
           </p:nvPr>
         </p:nvGraphicFramePr>
         <p:xfrm>
           <a:off x="296549" y="3456267"/>
-          <a:ext cx="9394208" cy="640080"/>
+          <a:ext cx="7045656" cy="640080"/>
         </p:xfrm>
         <a:graphic>
           <a:graphicData uri="http://schemas.openxmlformats.org/drawingml/2006/table">
@@ -8721,13 +8721,6 @@
                 <a:gridCol w="1174276">
                   <a:extLst>
                     <a:ext uri="{9D8B030D-6E8A-4147-A177-3AD203B41FA5}">
-                      <a16:colId xmlns:a16="http://schemas.microsoft.com/office/drawing/2014/main" val="1590507565"/>
-                    </a:ext>
-                  </a:extLst>
-                </a:gridCol>
-                <a:gridCol w="1174276">
-                  <a:extLst>
-                    <a:ext uri="{9D8B030D-6E8A-4147-A177-3AD203B41FA5}">
                       <a16:colId xmlns:a16="http://schemas.microsoft.com/office/drawing/2014/main" val="1851729959"/>
                     </a:ext>
                   </a:extLst>
@@ -8736,13 +8729,6 @@
                   <a:extLst>
                     <a:ext uri="{9D8B030D-6E8A-4147-A177-3AD203B41FA5}">
                       <a16:colId xmlns:a16="http://schemas.microsoft.com/office/drawing/2014/main" val="976838896"/>
-                    </a:ext>
-                  </a:extLst>
-                </a:gridCol>
-                <a:gridCol w="1174276">
-                  <a:extLst>
-                    <a:ext uri="{9D8B030D-6E8A-4147-A177-3AD203B41FA5}">
-                      <a16:colId xmlns:a16="http://schemas.microsoft.com/office/drawing/2014/main" val="3915712042"/>
                     </a:ext>
                   </a:extLst>
                 </a:gridCol>
@@ -8851,21 +8837,6 @@
                     <a:p>
                       <a:pPr algn="ctr"/>
                       <a:r>
-                        <a:rPr lang="en-US" altLang="en-US" sz="1800" dirty="0"/>
-                        <a:t>One Time Fee </a:t>
-                      </a:r>
-                      <a:endParaRPr lang="en-GB" dirty="0"/>
-                    </a:p>
-                  </a:txBody>
-                  <a:tcPr anchor="ctr"/>
-                </a:tc>
-                <a:tc>
-                  <a:txBody>
-                    <a:bodyPr/>
-                    <a:lstStyle/>
-                    <a:p>
-                      <a:pPr algn="ctr"/>
-                      <a:r>
                         <a:rPr lang="en-GB" sz="1800" dirty="0"/>
                         <a:t>Renew Duration</a:t>
                       </a:r>
@@ -8882,20 +8853,6 @@
                       <a:r>
                         <a:rPr lang="en-GB" dirty="0"/>
                         <a:t>Profile Fees</a:t>
-                      </a:r>
-                    </a:p>
-                  </a:txBody>
-                  <a:tcPr anchor="ctr"/>
-                </a:tc>
-                <a:tc>
-                  <a:txBody>
-                    <a:bodyPr/>
-                    <a:lstStyle/>
-                    <a:p>
-                      <a:pPr algn="ctr"/>
-                      <a:r>
-                        <a:rPr lang="en-GB" dirty="0"/>
-                        <a:t>Recurring Services</a:t>
                       </a:r>
                     </a:p>
                   </a:txBody>
@@ -9274,14 +9231,14 @@
           <p:nvPr>
             <p:extLst>
               <p:ext uri="{D42A27DB-BD31-4B8C-83A1-F6EECF244321}">
-                <p14:modId xmlns:p14="http://schemas.microsoft.com/office/powerpoint/2010/main" val="3695870878"/>
+                <p14:modId xmlns:p14="http://schemas.microsoft.com/office/powerpoint/2010/main" val="205739633"/>
               </p:ext>
             </p:extLst>
           </p:nvPr>
         </p:nvGraphicFramePr>
         <p:xfrm>
           <a:off x="296548" y="5578475"/>
-          <a:ext cx="10008810" cy="770213"/>
+          <a:ext cx="11684920" cy="944880"/>
         </p:xfrm>
         <a:graphic>
           <a:graphicData uri="http://schemas.openxmlformats.org/drawingml/2006/table">
@@ -9290,52 +9247,73 @@
                 <a:tableStyleId>{21E4AEA4-8DFA-4A89-87EB-49C32662AFE0}</a:tableStyleId>
               </a:tblPr>
               <a:tblGrid>
-                <a:gridCol w="1429830">
+                <a:gridCol w="1168492">
                   <a:extLst>
                     <a:ext uri="{9D8B030D-6E8A-4147-A177-3AD203B41FA5}">
                       <a16:colId xmlns:a16="http://schemas.microsoft.com/office/drawing/2014/main" val="2544850993"/>
                     </a:ext>
                   </a:extLst>
                 </a:gridCol>
-                <a:gridCol w="1429830">
+                <a:gridCol w="1168492">
+                  <a:extLst>
+                    <a:ext uri="{9D8B030D-6E8A-4147-A177-3AD203B41FA5}">
+                      <a16:colId xmlns:a16="http://schemas.microsoft.com/office/drawing/2014/main" val="1162217233"/>
+                    </a:ext>
+                  </a:extLst>
+                </a:gridCol>
+                <a:gridCol w="1168492">
                   <a:extLst>
                     <a:ext uri="{9D8B030D-6E8A-4147-A177-3AD203B41FA5}">
                       <a16:colId xmlns:a16="http://schemas.microsoft.com/office/drawing/2014/main" val="4160908569"/>
                     </a:ext>
                   </a:extLst>
                 </a:gridCol>
-                <a:gridCol w="1429830">
+                <a:gridCol w="1168492">
                   <a:extLst>
                     <a:ext uri="{9D8B030D-6E8A-4147-A177-3AD203B41FA5}">
                       <a16:colId xmlns:a16="http://schemas.microsoft.com/office/drawing/2014/main" val="3835503643"/>
                     </a:ext>
                   </a:extLst>
                 </a:gridCol>
-                <a:gridCol w="1429830">
+                <a:gridCol w="1168492">
                   <a:extLst>
                     <a:ext uri="{9D8B030D-6E8A-4147-A177-3AD203B41FA5}">
                       <a16:colId xmlns:a16="http://schemas.microsoft.com/office/drawing/2014/main" val="1590507565"/>
                     </a:ext>
                   </a:extLst>
                 </a:gridCol>
-                <a:gridCol w="1429830">
+                <a:gridCol w="1168492">
                   <a:extLst>
                     <a:ext uri="{9D8B030D-6E8A-4147-A177-3AD203B41FA5}">
                       <a16:colId xmlns:a16="http://schemas.microsoft.com/office/drawing/2014/main" val="1851729959"/>
                     </a:ext>
                   </a:extLst>
                 </a:gridCol>
-                <a:gridCol w="1429830">
+                <a:gridCol w="1168492">
                   <a:extLst>
                     <a:ext uri="{9D8B030D-6E8A-4147-A177-3AD203B41FA5}">
                       <a16:colId xmlns:a16="http://schemas.microsoft.com/office/drawing/2014/main" val="976838896"/>
                     </a:ext>
                   </a:extLst>
                 </a:gridCol>
-                <a:gridCol w="1429830">
+                <a:gridCol w="1168492">
                   <a:extLst>
                     <a:ext uri="{9D8B030D-6E8A-4147-A177-3AD203B41FA5}">
                       <a16:colId xmlns:a16="http://schemas.microsoft.com/office/drawing/2014/main" val="593576195"/>
+                    </a:ext>
+                  </a:extLst>
+                </a:gridCol>
+                <a:gridCol w="1168492">
+                  <a:extLst>
+                    <a:ext uri="{9D8B030D-6E8A-4147-A177-3AD203B41FA5}">
+                      <a16:colId xmlns:a16="http://schemas.microsoft.com/office/drawing/2014/main" val="740313113"/>
+                    </a:ext>
+                  </a:extLst>
+                </a:gridCol>
+                <a:gridCol w="1168492">
+                  <a:extLst>
+                    <a:ext uri="{9D8B030D-6E8A-4147-A177-3AD203B41FA5}">
+                      <a16:colId xmlns:a16="http://schemas.microsoft.com/office/drawing/2014/main" val="207279214"/>
                     </a:ext>
                   </a:extLst>
                 </a:gridCol>
@@ -9397,9 +9375,10 @@
                         <a:defRPr/>
                       </a:pPr>
                       <a:r>
-                        <a:rPr lang="en-GB" dirty="0"/>
-                        <a:t>Profile</a:t>
-                      </a:r>
+                        <a:rPr lang="en-GB" dirty="0" err="1"/>
+                        <a:t>Profile_Services</a:t>
+                      </a:r>
+                      <a:endParaRPr lang="en-GB" dirty="0"/>
                     </a:p>
                     <a:p>
                       <a:pPr marL="0" marR="0" lvl="0" indent="0" algn="ctr" defTabSz="914400" rtl="0" eaLnBrk="1" fontAlgn="auto" latinLnBrk="0" hangingPunct="1">
@@ -9432,211 +9411,6 @@
                     <a:bodyPr/>
                     <a:lstStyle/>
                     <a:p>
-                      <a:pPr algn="ctr"/>
-                      <a:r>
-                        <a:rPr lang="en-GB" dirty="0"/>
-                        <a:t>Service</a:t>
-                      </a:r>
-                    </a:p>
-                    <a:p>
-                      <a:pPr algn="ctr"/>
-                      <a:r>
-                        <a:rPr lang="en-GB" dirty="0"/>
-                        <a:t>ID (PK)</a:t>
-                      </a:r>
-                    </a:p>
-                  </a:txBody>
-                  <a:tcPr anchor="ctr"/>
-                </a:tc>
-                <a:tc>
-                  <a:txBody>
-                    <a:bodyPr/>
-                    <a:lstStyle/>
-                    <a:p>
-                      <a:pPr algn="ctr"/>
-                      <a:r>
-                        <a:rPr lang="en-GB" sz="1600" dirty="0"/>
-                        <a:t>Round</a:t>
-                      </a:r>
-                    </a:p>
-                    <a:p>
-                      <a:pPr algn="ctr"/>
-                      <a:r>
-                        <a:rPr lang="en-GB" sz="1600" dirty="0"/>
-                        <a:t>Amount</a:t>
-                      </a:r>
-                    </a:p>
-                  </a:txBody>
-                  <a:tcPr anchor="ctr"/>
-                </a:tc>
-                <a:tc>
-                  <a:txBody>
-                    <a:bodyPr/>
-                    <a:lstStyle/>
-                    <a:p>
-                      <a:pPr algn="ctr"/>
-                      <a:r>
-                        <a:rPr lang="en-GB" sz="1400" dirty="0"/>
-                        <a:t>Fees</a:t>
-                      </a:r>
-                    </a:p>
-                    <a:p>
-                      <a:pPr algn="ctr"/>
-                      <a:r>
-                        <a:rPr lang="en-GB" sz="1400" dirty="0"/>
-                        <a:t>Local</a:t>
-                      </a:r>
-                    </a:p>
-                    <a:p>
-                      <a:pPr algn="ctr"/>
-                      <a:r>
-                        <a:rPr lang="en-GB" sz="1400" dirty="0"/>
-                        <a:t>Same Operator</a:t>
-                      </a:r>
-                    </a:p>
-                  </a:txBody>
-                  <a:tcPr anchor="ctr"/>
-                </a:tc>
-                <a:tc>
-                  <a:txBody>
-                    <a:bodyPr/>
-                    <a:lstStyle/>
-                    <a:p>
-                      <a:pPr algn="ctr"/>
-                      <a:r>
-                        <a:rPr lang="en-GB" sz="1100" dirty="0"/>
-                        <a:t>Fees</a:t>
-                      </a:r>
-                    </a:p>
-                    <a:p>
-                      <a:pPr algn="ctr"/>
-                      <a:r>
-                        <a:rPr lang="en-GB" sz="1100" dirty="0"/>
-                        <a:t>Local</a:t>
-                      </a:r>
-                    </a:p>
-                    <a:p>
-                      <a:pPr algn="ctr"/>
-                      <a:r>
-                        <a:rPr lang="en-GB" sz="1100" dirty="0"/>
-                        <a:t>Another Operator</a:t>
-                      </a:r>
-                    </a:p>
-                  </a:txBody>
-                  <a:tcPr anchor="ctr"/>
-                </a:tc>
-                <a:tc>
-                  <a:txBody>
-                    <a:bodyPr/>
-                    <a:lstStyle/>
-                    <a:p>
-                      <a:pPr algn="ctr"/>
-                      <a:r>
-                        <a:rPr lang="en-GB" sz="1800" dirty="0"/>
-                        <a:t>Fees</a:t>
-                      </a:r>
-                    </a:p>
-                    <a:p>
-                      <a:pPr algn="ctr"/>
-                      <a:r>
-                        <a:rPr lang="en-GB" sz="1800" dirty="0"/>
-                        <a:t>International</a:t>
-                      </a:r>
-                    </a:p>
-                  </a:txBody>
-                  <a:tcPr anchor="ctr"/>
-                </a:tc>
-                <a:extLst>
-                  <a:ext uri="{0D108BD9-81ED-4DB2-BD59-A6C34878D82A}">
-                    <a16:rowId xmlns:a16="http://schemas.microsoft.com/office/drawing/2014/main" val="3577827613"/>
-                  </a:ext>
-                </a:extLst>
-              </a:tr>
-            </a:tbl>
-          </a:graphicData>
-        </a:graphic>
-      </p:graphicFrame>
-      <p:graphicFrame>
-        <p:nvGraphicFramePr>
-          <p:cNvPr id="9" name="Table 8">
-            <a:extLst>
-              <a:ext uri="{FF2B5EF4-FFF2-40B4-BE49-F238E27FC236}">
-                <a16:creationId xmlns:a16="http://schemas.microsoft.com/office/drawing/2014/main" id="{072447E5-7ED2-4BA7-A1E9-77259EEADE86}"/>
-              </a:ext>
-            </a:extLst>
-          </p:cNvPr>
-          <p:cNvGraphicFramePr>
-            <a:graphicFrameLocks noGrp="1"/>
-          </p:cNvGraphicFramePr>
-          <p:nvPr>
-            <p:extLst>
-              <p:ext uri="{D42A27DB-BD31-4B8C-83A1-F6EECF244321}">
-                <p14:modId xmlns:p14="http://schemas.microsoft.com/office/powerpoint/2010/main" val="1514673097"/>
-              </p:ext>
-            </p:extLst>
-          </p:nvPr>
-        </p:nvGraphicFramePr>
-        <p:xfrm>
-          <a:off x="8105345" y="1443106"/>
-          <a:ext cx="2941494" cy="640080"/>
-        </p:xfrm>
-        <a:graphic>
-          <a:graphicData uri="http://schemas.openxmlformats.org/drawingml/2006/table">
-            <a:tbl>
-              <a:tblPr firstRow="1" bandRow="1">
-                <a:tableStyleId>{00A15C55-8517-42AA-B614-E9B94910E393}</a:tableStyleId>
-              </a:tblPr>
-              <a:tblGrid>
-                <a:gridCol w="980498">
-                  <a:extLst>
-                    <a:ext uri="{9D8B030D-6E8A-4147-A177-3AD203B41FA5}">
-                      <a16:colId xmlns:a16="http://schemas.microsoft.com/office/drawing/2014/main" val="2059838879"/>
-                    </a:ext>
-                  </a:extLst>
-                </a:gridCol>
-                <a:gridCol w="980498">
-                  <a:extLst>
-                    <a:ext uri="{9D8B030D-6E8A-4147-A177-3AD203B41FA5}">
-                      <a16:colId xmlns:a16="http://schemas.microsoft.com/office/drawing/2014/main" val="3077536117"/>
-                    </a:ext>
-                  </a:extLst>
-                </a:gridCol>
-                <a:gridCol w="980498">
-                  <a:extLst>
-                    <a:ext uri="{9D8B030D-6E8A-4147-A177-3AD203B41FA5}">
-                      <a16:colId xmlns:a16="http://schemas.microsoft.com/office/drawing/2014/main" val="2412225613"/>
-                    </a:ext>
-                  </a:extLst>
-                </a:gridCol>
-              </a:tblGrid>
-              <a:tr h="374469">
-                <a:tc>
-                  <a:txBody>
-                    <a:bodyPr/>
-                    <a:lstStyle/>
-                    <a:p>
-                      <a:pPr algn="ctr"/>
-                      <a:r>
-                        <a:rPr lang="en-GB" dirty="0">
-                          <a:solidFill>
-                            <a:sysClr val="windowText" lastClr="000000"/>
-                          </a:solidFill>
-                        </a:rPr>
-                        <a:t>Services</a:t>
-                      </a:r>
-                    </a:p>
-                  </a:txBody>
-                  <a:tcPr anchor="ctr">
-                    <a:solidFill>
-                      <a:schemeClr val="bg2"/>
-                    </a:solidFill>
-                  </a:tcPr>
-                </a:tc>
-                <a:tc>
-                  <a:txBody>
-                    <a:bodyPr/>
-                    <a:lstStyle/>
-                    <a:p>
                       <a:pPr marL="0" marR="0" lvl="0" indent="0" algn="ctr" defTabSz="914400" rtl="0" eaLnBrk="1" fontAlgn="auto" latinLnBrk="0" hangingPunct="1">
                         <a:lnSpc>
                           <a:spcPct val="100000"/>
@@ -9656,6 +9430,300 @@
                       </a:pPr>
                       <a:r>
                         <a:rPr lang="en-GB" dirty="0"/>
+                        <a:t>Profile</a:t>
+                      </a:r>
+                    </a:p>
+                    <a:p>
+                      <a:pPr marL="0" marR="0" lvl="0" indent="0" algn="ctr" defTabSz="914400" rtl="0" eaLnBrk="1" fontAlgn="auto" latinLnBrk="0" hangingPunct="1">
+                        <a:lnSpc>
+                          <a:spcPct val="100000"/>
+                        </a:lnSpc>
+                        <a:spcBef>
+                          <a:spcPts val="0"/>
+                        </a:spcBef>
+                        <a:spcAft>
+                          <a:spcPts val="0"/>
+                        </a:spcAft>
+                        <a:buClrTx/>
+                        <a:buSzTx/>
+                        <a:buFontTx/>
+                        <a:buNone/>
+                        <a:tabLst/>
+                        <a:defRPr/>
+                      </a:pPr>
+                      <a:r>
+                        <a:rPr lang="en-GB" dirty="0"/>
+                        <a:t>ID (PK)</a:t>
+                      </a:r>
+                    </a:p>
+                  </a:txBody>
+                  <a:tcPr anchor="ctr"/>
+                </a:tc>
+                <a:tc>
+                  <a:txBody>
+                    <a:bodyPr/>
+                    <a:lstStyle/>
+                    <a:p>
+                      <a:pPr algn="ctr"/>
+                      <a:r>
+                        <a:rPr lang="en-GB" dirty="0"/>
+                        <a:t>Service</a:t>
+                      </a:r>
+                    </a:p>
+                    <a:p>
+                      <a:pPr algn="ctr"/>
+                      <a:r>
+                        <a:rPr lang="en-GB" dirty="0"/>
+                        <a:t>ID (PK)</a:t>
+                      </a:r>
+                    </a:p>
+                  </a:txBody>
+                  <a:tcPr anchor="ctr"/>
+                </a:tc>
+                <a:tc>
+                  <a:txBody>
+                    <a:bodyPr/>
+                    <a:lstStyle/>
+                    <a:p>
+                      <a:pPr algn="ctr"/>
+                      <a:r>
+                        <a:rPr lang="en-GB" sz="1600" dirty="0"/>
+                        <a:t>Round</a:t>
+                      </a:r>
+                    </a:p>
+                    <a:p>
+                      <a:pPr algn="ctr"/>
+                      <a:r>
+                        <a:rPr lang="en-GB" sz="1600" dirty="0"/>
+                        <a:t>Amount</a:t>
+                      </a:r>
+                    </a:p>
+                  </a:txBody>
+                  <a:tcPr anchor="ctr"/>
+                </a:tc>
+                <a:tc>
+                  <a:txBody>
+                    <a:bodyPr/>
+                    <a:lstStyle/>
+                    <a:p>
+                      <a:pPr algn="ctr"/>
+                      <a:r>
+                        <a:rPr lang="en-GB" sz="1400" dirty="0"/>
+                        <a:t>Fees</a:t>
+                      </a:r>
+                    </a:p>
+                    <a:p>
+                      <a:pPr algn="ctr"/>
+                      <a:r>
+                        <a:rPr lang="en-GB" sz="1400" dirty="0"/>
+                        <a:t>Local</a:t>
+                      </a:r>
+                    </a:p>
+                    <a:p>
+                      <a:pPr algn="ctr"/>
+                      <a:r>
+                        <a:rPr lang="en-GB" sz="1400" dirty="0"/>
+                        <a:t>Same Operator</a:t>
+                      </a:r>
+                    </a:p>
+                  </a:txBody>
+                  <a:tcPr anchor="ctr"/>
+                </a:tc>
+                <a:tc>
+                  <a:txBody>
+                    <a:bodyPr/>
+                    <a:lstStyle/>
+                    <a:p>
+                      <a:pPr algn="ctr"/>
+                      <a:r>
+                        <a:rPr lang="en-GB" sz="1100" dirty="0"/>
+                        <a:t>Fees</a:t>
+                      </a:r>
+                    </a:p>
+                    <a:p>
+                      <a:pPr algn="ctr"/>
+                      <a:r>
+                        <a:rPr lang="en-GB" sz="1100" dirty="0"/>
+                        <a:t>Local</a:t>
+                      </a:r>
+                    </a:p>
+                    <a:p>
+                      <a:pPr algn="ctr"/>
+                      <a:r>
+                        <a:rPr lang="en-GB" sz="1100" dirty="0"/>
+                        <a:t>Another Operator</a:t>
+                      </a:r>
+                    </a:p>
+                  </a:txBody>
+                  <a:tcPr anchor="ctr"/>
+                </a:tc>
+                <a:tc>
+                  <a:txBody>
+                    <a:bodyPr/>
+                    <a:lstStyle/>
+                    <a:p>
+                      <a:pPr algn="ctr"/>
+                      <a:r>
+                        <a:rPr lang="en-GB" sz="1800" dirty="0"/>
+                        <a:t>Fees</a:t>
+                      </a:r>
+                    </a:p>
+                    <a:p>
+                      <a:pPr algn="ctr"/>
+                      <a:r>
+                        <a:rPr lang="en-GB" sz="1800" dirty="0"/>
+                        <a:t>International</a:t>
+                      </a:r>
+                    </a:p>
+                  </a:txBody>
+                  <a:tcPr anchor="ctr"/>
+                </a:tc>
+                <a:tc>
+                  <a:txBody>
+                    <a:bodyPr/>
+                    <a:lstStyle/>
+                    <a:p>
+                      <a:pPr algn="ctr"/>
+                      <a:r>
+                        <a:rPr lang="en-GB" sz="1800" dirty="0" err="1"/>
+                        <a:t>Is_Recurring</a:t>
+                      </a:r>
+                      <a:endParaRPr lang="en-GB" sz="1800" dirty="0"/>
+                    </a:p>
+                  </a:txBody>
+                  <a:tcPr anchor="ctr"/>
+                </a:tc>
+                <a:tc>
+                  <a:txBody>
+                    <a:bodyPr/>
+                    <a:lstStyle/>
+                    <a:p>
+                      <a:pPr algn="ctr"/>
+                      <a:r>
+                        <a:rPr lang="en-GB" sz="1800" dirty="0"/>
+                        <a:t>Recurring Fees</a:t>
+                      </a:r>
+                    </a:p>
+                  </a:txBody>
+                  <a:tcPr anchor="ctr"/>
+                </a:tc>
+                <a:extLst>
+                  <a:ext uri="{0D108BD9-81ED-4DB2-BD59-A6C34878D82A}">
+                    <a16:rowId xmlns:a16="http://schemas.microsoft.com/office/drawing/2014/main" val="3577827613"/>
+                  </a:ext>
+                </a:extLst>
+              </a:tr>
+            </a:tbl>
+          </a:graphicData>
+        </a:graphic>
+      </p:graphicFrame>
+      <p:graphicFrame>
+        <p:nvGraphicFramePr>
+          <p:cNvPr id="9" name="Table 8">
+            <a:extLst>
+              <a:ext uri="{FF2B5EF4-FFF2-40B4-BE49-F238E27FC236}">
+                <a16:creationId xmlns:a16="http://schemas.microsoft.com/office/drawing/2014/main" id="{072447E5-7ED2-4BA7-A1E9-77259EEADE86}"/>
+              </a:ext>
+            </a:extLst>
+          </p:cNvPr>
+          <p:cNvGraphicFramePr>
+            <a:graphicFrameLocks noGrp="1"/>
+          </p:cNvGraphicFramePr>
+          <p:nvPr>
+            <p:extLst>
+              <p:ext uri="{D42A27DB-BD31-4B8C-83A1-F6EECF244321}">
+                <p14:modId xmlns:p14="http://schemas.microsoft.com/office/powerpoint/2010/main" val="3092718262"/>
+              </p:ext>
+            </p:extLst>
+          </p:nvPr>
+        </p:nvGraphicFramePr>
+        <p:xfrm>
+          <a:off x="7777112" y="1443106"/>
+          <a:ext cx="4118336" cy="640080"/>
+        </p:xfrm>
+        <a:graphic>
+          <a:graphicData uri="http://schemas.openxmlformats.org/drawingml/2006/table">
+            <a:tbl>
+              <a:tblPr firstRow="1" bandRow="1">
+                <a:tableStyleId>{00A15C55-8517-42AA-B614-E9B94910E393}</a:tableStyleId>
+              </a:tblPr>
+              <a:tblGrid>
+                <a:gridCol w="1029584">
+                  <a:extLst>
+                    <a:ext uri="{9D8B030D-6E8A-4147-A177-3AD203B41FA5}">
+                      <a16:colId xmlns:a16="http://schemas.microsoft.com/office/drawing/2014/main" val="2059838879"/>
+                    </a:ext>
+                  </a:extLst>
+                </a:gridCol>
+                <a:gridCol w="1029584">
+                  <a:extLst>
+                    <a:ext uri="{9D8B030D-6E8A-4147-A177-3AD203B41FA5}">
+                      <a16:colId xmlns:a16="http://schemas.microsoft.com/office/drawing/2014/main" val="3077536117"/>
+                    </a:ext>
+                  </a:extLst>
+                </a:gridCol>
+                <a:gridCol w="1029584">
+                  <a:extLst>
+                    <a:ext uri="{9D8B030D-6E8A-4147-A177-3AD203B41FA5}">
+                      <a16:colId xmlns:a16="http://schemas.microsoft.com/office/drawing/2014/main" val="2412225613"/>
+                    </a:ext>
+                  </a:extLst>
+                </a:gridCol>
+                <a:gridCol w="1029584">
+                  <a:extLst>
+                    <a:ext uri="{9D8B030D-6E8A-4147-A177-3AD203B41FA5}">
+                      <a16:colId xmlns:a16="http://schemas.microsoft.com/office/drawing/2014/main" val="2405177763"/>
+                    </a:ext>
+                  </a:extLst>
+                </a:gridCol>
+              </a:tblGrid>
+              <a:tr h="374469">
+                <a:tc>
+                  <a:txBody>
+                    <a:bodyPr/>
+                    <a:lstStyle/>
+                    <a:p>
+                      <a:pPr algn="ctr"/>
+                      <a:r>
+                        <a:rPr lang="en-GB" dirty="0">
+                          <a:solidFill>
+                            <a:sysClr val="windowText" lastClr="000000"/>
+                          </a:solidFill>
+                        </a:rPr>
+                        <a:t>Services</a:t>
+                      </a:r>
+                    </a:p>
+                  </a:txBody>
+                  <a:tcPr anchor="ctr">
+                    <a:solidFill>
+                      <a:schemeClr val="bg2"/>
+                    </a:solidFill>
+                  </a:tcPr>
+                </a:tc>
+                <a:tc>
+                  <a:txBody>
+                    <a:bodyPr/>
+                    <a:lstStyle/>
+                    <a:p>
+                      <a:pPr marL="0" marR="0" lvl="0" indent="0" algn="ctr" defTabSz="914400" rtl="0" eaLnBrk="1" fontAlgn="auto" latinLnBrk="0" hangingPunct="1">
+                        <a:lnSpc>
+                          <a:spcPct val="100000"/>
+                        </a:lnSpc>
+                        <a:spcBef>
+                          <a:spcPts val="0"/>
+                        </a:spcBef>
+                        <a:spcAft>
+                          <a:spcPts val="0"/>
+                        </a:spcAft>
+                        <a:buClrTx/>
+                        <a:buSzTx/>
+                        <a:buFontTx/>
+                        <a:buNone/>
+                        <a:tabLst/>
+                        <a:defRPr/>
+                      </a:pPr>
+                      <a:r>
+                        <a:rPr lang="en-GB" dirty="0"/>
                         <a:t>Service ID (PK)</a:t>
                       </a:r>
                     </a:p>
@@ -9671,6 +9739,227 @@
                       <a:r>
                         <a:rPr lang="en-GB" sz="1800" dirty="0"/>
                         <a:t>Service Name</a:t>
+                      </a:r>
+                    </a:p>
+                  </a:txBody>
+                  <a:tcPr anchor="ctr"/>
+                </a:tc>
+                <a:tc>
+                  <a:txBody>
+                    <a:bodyPr/>
+                    <a:lstStyle/>
+                    <a:p>
+                      <a:pPr marL="0" marR="0" lvl="0" indent="0" algn="ctr" defTabSz="914400" rtl="0" eaLnBrk="1" fontAlgn="auto" latinLnBrk="0" hangingPunct="1">
+                        <a:lnSpc>
+                          <a:spcPct val="100000"/>
+                        </a:lnSpc>
+                        <a:spcBef>
+                          <a:spcPts val="0"/>
+                        </a:spcBef>
+                        <a:spcAft>
+                          <a:spcPts val="0"/>
+                        </a:spcAft>
+                        <a:buClrTx/>
+                        <a:buSzTx/>
+                        <a:buFontTx/>
+                        <a:buNone/>
+                        <a:tabLst/>
+                        <a:defRPr/>
+                      </a:pPr>
+                      <a:r>
+                        <a:rPr lang="en-GB" sz="1800" dirty="0" err="1"/>
+                        <a:t>Is_Recurring</a:t>
+                      </a:r>
+                      <a:endParaRPr lang="en-GB" sz="1800" dirty="0"/>
+                    </a:p>
+                  </a:txBody>
+                  <a:tcPr anchor="ctr"/>
+                </a:tc>
+                <a:extLst>
+                  <a:ext uri="{0D108BD9-81ED-4DB2-BD59-A6C34878D82A}">
+                    <a16:rowId xmlns:a16="http://schemas.microsoft.com/office/drawing/2014/main" val="1505324408"/>
+                  </a:ext>
+                </a:extLst>
+              </a:tr>
+            </a:tbl>
+          </a:graphicData>
+        </a:graphic>
+      </p:graphicFrame>
+      <p:graphicFrame>
+        <p:nvGraphicFramePr>
+          <p:cNvPr id="10" name="Table 9">
+            <a:extLst>
+              <a:ext uri="{FF2B5EF4-FFF2-40B4-BE49-F238E27FC236}">
+                <a16:creationId xmlns:a16="http://schemas.microsoft.com/office/drawing/2014/main" id="{51CDC825-A04A-4A49-8760-E446C7877C26}"/>
+              </a:ext>
+            </a:extLst>
+          </p:cNvPr>
+          <p:cNvGraphicFramePr>
+            <a:graphicFrameLocks noGrp="1"/>
+          </p:cNvGraphicFramePr>
+          <p:nvPr>
+            <p:extLst>
+              <p:ext uri="{D42A27DB-BD31-4B8C-83A1-F6EECF244321}">
+                <p14:modId xmlns:p14="http://schemas.microsoft.com/office/powerpoint/2010/main" val="917846419"/>
+              </p:ext>
+            </p:extLst>
+          </p:nvPr>
+        </p:nvGraphicFramePr>
+        <p:xfrm>
+          <a:off x="7550870" y="3349299"/>
+          <a:ext cx="4430604" cy="914400"/>
+        </p:xfrm>
+        <a:graphic>
+          <a:graphicData uri="http://schemas.openxmlformats.org/drawingml/2006/table">
+            <a:tbl>
+              <a:tblPr firstRow="1" bandRow="1">
+                <a:tableStyleId>{00A15C55-8517-42AA-B614-E9B94910E393}</a:tableStyleId>
+              </a:tblPr>
+              <a:tblGrid>
+                <a:gridCol w="1107651">
+                  <a:extLst>
+                    <a:ext uri="{9D8B030D-6E8A-4147-A177-3AD203B41FA5}">
+                      <a16:colId xmlns:a16="http://schemas.microsoft.com/office/drawing/2014/main" val="2059838879"/>
+                    </a:ext>
+                  </a:extLst>
+                </a:gridCol>
+                <a:gridCol w="1107651">
+                  <a:extLst>
+                    <a:ext uri="{9D8B030D-6E8A-4147-A177-3AD203B41FA5}">
+                      <a16:colId xmlns:a16="http://schemas.microsoft.com/office/drawing/2014/main" val="3077536117"/>
+                    </a:ext>
+                  </a:extLst>
+                </a:gridCol>
+                <a:gridCol w="1107651">
+                  <a:extLst>
+                    <a:ext uri="{9D8B030D-6E8A-4147-A177-3AD203B41FA5}">
+                      <a16:colId xmlns:a16="http://schemas.microsoft.com/office/drawing/2014/main" val="2412225613"/>
+                    </a:ext>
+                  </a:extLst>
+                </a:gridCol>
+                <a:gridCol w="1107651">
+                  <a:extLst>
+                    <a:ext uri="{9D8B030D-6E8A-4147-A177-3AD203B41FA5}">
+                      <a16:colId xmlns:a16="http://schemas.microsoft.com/office/drawing/2014/main" val="492678564"/>
+                    </a:ext>
+                  </a:extLst>
+                </a:gridCol>
+              </a:tblGrid>
+              <a:tr h="747048">
+                <a:tc>
+                  <a:txBody>
+                    <a:bodyPr/>
+                    <a:lstStyle/>
+                    <a:p>
+                      <a:pPr algn="ctr"/>
+                      <a:r>
+                        <a:rPr lang="en-GB" dirty="0">
+                          <a:solidFill>
+                            <a:sysClr val="windowText" lastClr="000000"/>
+                          </a:solidFill>
+                        </a:rPr>
+                        <a:t>One Time Service</a:t>
+                      </a:r>
+                    </a:p>
+                  </a:txBody>
+                  <a:tcPr anchor="ctr">
+                    <a:solidFill>
+                      <a:schemeClr val="bg2"/>
+                    </a:solidFill>
+                  </a:tcPr>
+                </a:tc>
+                <a:tc>
+                  <a:txBody>
+                    <a:bodyPr/>
+                    <a:lstStyle/>
+                    <a:p>
+                      <a:pPr marL="0" marR="0" lvl="0" indent="0" algn="ctr" defTabSz="914400" rtl="0" eaLnBrk="1" fontAlgn="auto" latinLnBrk="0" hangingPunct="1">
+                        <a:lnSpc>
+                          <a:spcPct val="100000"/>
+                        </a:lnSpc>
+                        <a:spcBef>
+                          <a:spcPts val="0"/>
+                        </a:spcBef>
+                        <a:spcAft>
+                          <a:spcPts val="0"/>
+                        </a:spcAft>
+                        <a:buClrTx/>
+                        <a:buSzTx/>
+                        <a:buFontTx/>
+                        <a:buNone/>
+                        <a:tabLst/>
+                        <a:defRPr/>
+                      </a:pPr>
+                      <a:r>
+                        <a:rPr lang="en-GB" dirty="0">
+                          <a:solidFill>
+                            <a:schemeClr val="bg1"/>
+                          </a:solidFill>
+                        </a:rPr>
+                        <a:t>One Time Service</a:t>
+                      </a:r>
+                    </a:p>
+                    <a:p>
+                      <a:pPr marL="0" marR="0" lvl="0" indent="0" algn="ctr" defTabSz="914400" rtl="0" eaLnBrk="1" fontAlgn="auto" latinLnBrk="0" hangingPunct="1">
+                        <a:lnSpc>
+                          <a:spcPct val="100000"/>
+                        </a:lnSpc>
+                        <a:spcBef>
+                          <a:spcPts val="0"/>
+                        </a:spcBef>
+                        <a:spcAft>
+                          <a:spcPts val="0"/>
+                        </a:spcAft>
+                        <a:buClrTx/>
+                        <a:buSzTx/>
+                        <a:buFontTx/>
+                        <a:buNone/>
+                        <a:tabLst/>
+                        <a:defRPr/>
+                      </a:pPr>
+                      <a:r>
+                        <a:rPr lang="en-GB" dirty="0">
+                          <a:solidFill>
+                            <a:schemeClr val="bg1"/>
+                          </a:solidFill>
+                        </a:rPr>
+                        <a:t> ID (PK)</a:t>
+                      </a:r>
+                    </a:p>
+                  </a:txBody>
+                  <a:tcPr anchor="ctr"/>
+                </a:tc>
+                <a:tc>
+                  <a:txBody>
+                    <a:bodyPr/>
+                    <a:lstStyle/>
+                    <a:p>
+                      <a:pPr algn="ctr"/>
+                      <a:r>
+                        <a:rPr lang="en-GB" sz="1800" dirty="0">
+                          <a:solidFill>
+                            <a:schemeClr val="bg1"/>
+                          </a:solidFill>
+                        </a:rPr>
+                        <a:t>Service Name</a:t>
+                      </a:r>
+                    </a:p>
+                  </a:txBody>
+                  <a:tcPr anchor="ctr"/>
+                </a:tc>
+                <a:tc>
+                  <a:txBody>
+                    <a:bodyPr/>
+                    <a:lstStyle/>
+                    <a:p>
+                      <a:pPr algn="ctr"/>
+                      <a:r>
+                        <a:rPr lang="en-GB" sz="1800" dirty="0">
+                          <a:solidFill>
+                            <a:schemeClr val="bg1"/>
+                          </a:solidFill>
+                        </a:rPr>
+                        <a:t>Service Fee</a:t>
                       </a:r>
                     </a:p>
                   </a:txBody>
@@ -9760,7 +10049,7 @@
           <p:nvPr>
             <p:extLst>
               <p:ext uri="{D42A27DB-BD31-4B8C-83A1-F6EECF244321}">
-                <p14:modId xmlns:p14="http://schemas.microsoft.com/office/powerpoint/2010/main" val="3624569069"/>
+                <p14:modId xmlns:p14="http://schemas.microsoft.com/office/powerpoint/2010/main" val="863486022"/>
               </p:ext>
             </p:extLst>
           </p:nvPr>
@@ -9909,6 +10198,13 @@
                         <a:t>ID</a:t>
                       </a:r>
                     </a:p>
+                    <a:p>
+                      <a:pPr algn="ctr"/>
+                      <a:r>
+                        <a:rPr lang="en-GB" dirty="0"/>
+                        <a:t>(PK)</a:t>
+                      </a:r>
+                    </a:p>
                   </a:txBody>
                   <a:tcPr anchor="ctr"/>
                 </a:tc>
@@ -9937,6 +10233,556 @@
                         <a:rPr lang="en-GB" dirty="0"/>
                         <a:t>Cost</a:t>
                       </a:r>
+                    </a:p>
+                  </a:txBody>
+                  <a:tcPr anchor="ctr"/>
+                </a:tc>
+                <a:extLst>
+                  <a:ext uri="{0D108BD9-81ED-4DB2-BD59-A6C34878D82A}">
+                    <a16:rowId xmlns:a16="http://schemas.microsoft.com/office/drawing/2014/main" val="3577827613"/>
+                  </a:ext>
+                </a:extLst>
+              </a:tr>
+            </a:tbl>
+          </a:graphicData>
+        </a:graphic>
+      </p:graphicFrame>
+      <p:graphicFrame>
+        <p:nvGraphicFramePr>
+          <p:cNvPr id="4" name="Table 9">
+            <a:extLst>
+              <a:ext uri="{FF2B5EF4-FFF2-40B4-BE49-F238E27FC236}">
+                <a16:creationId xmlns:a16="http://schemas.microsoft.com/office/drawing/2014/main" id="{ED8C13D1-758A-4F38-9DD8-F6813BEA4BF9}"/>
+              </a:ext>
+            </a:extLst>
+          </p:cNvPr>
+          <p:cNvGraphicFramePr>
+            <a:graphicFrameLocks noGrp="1"/>
+          </p:cNvGraphicFramePr>
+          <p:nvPr>
+            <p:extLst>
+              <p:ext uri="{D42A27DB-BD31-4B8C-83A1-F6EECF244321}">
+                <p14:modId xmlns:p14="http://schemas.microsoft.com/office/powerpoint/2010/main" val="2960720624"/>
+              </p:ext>
+            </p:extLst>
+          </p:nvPr>
+        </p:nvGraphicFramePr>
+        <p:xfrm>
+          <a:off x="296548" y="3108960"/>
+          <a:ext cx="7584260" cy="914400"/>
+        </p:xfrm>
+        <a:graphic>
+          <a:graphicData uri="http://schemas.openxmlformats.org/drawingml/2006/table">
+            <a:tbl>
+              <a:tblPr firstRow="1" bandRow="1">
+                <a:tableStyleId>{7DF18680-E054-41AD-8BC1-D1AEF772440D}</a:tableStyleId>
+              </a:tblPr>
+              <a:tblGrid>
+                <a:gridCol w="1896065">
+                  <a:extLst>
+                    <a:ext uri="{9D8B030D-6E8A-4147-A177-3AD203B41FA5}">
+                      <a16:colId xmlns:a16="http://schemas.microsoft.com/office/drawing/2014/main" val="201513916"/>
+                    </a:ext>
+                  </a:extLst>
+                </a:gridCol>
+                <a:gridCol w="1896065">
+                  <a:extLst>
+                    <a:ext uri="{9D8B030D-6E8A-4147-A177-3AD203B41FA5}">
+                      <a16:colId xmlns:a16="http://schemas.microsoft.com/office/drawing/2014/main" val="4160908569"/>
+                    </a:ext>
+                  </a:extLst>
+                </a:gridCol>
+                <a:gridCol w="1896065">
+                  <a:extLst>
+                    <a:ext uri="{9D8B030D-6E8A-4147-A177-3AD203B41FA5}">
+                      <a16:colId xmlns:a16="http://schemas.microsoft.com/office/drawing/2014/main" val="3835503643"/>
+                    </a:ext>
+                  </a:extLst>
+                </a:gridCol>
+                <a:gridCol w="1896065">
+                  <a:extLst>
+                    <a:ext uri="{9D8B030D-6E8A-4147-A177-3AD203B41FA5}">
+                      <a16:colId xmlns:a16="http://schemas.microsoft.com/office/drawing/2014/main" val="1590507565"/>
+                    </a:ext>
+                  </a:extLst>
+                </a:gridCol>
+              </a:tblGrid>
+              <a:tr h="374469">
+                <a:tc>
+                  <a:txBody>
+                    <a:bodyPr/>
+                    <a:lstStyle/>
+                    <a:p>
+                      <a:pPr algn="ctr"/>
+                      <a:r>
+                        <a:rPr lang="en-GB" dirty="0" err="1">
+                          <a:solidFill>
+                            <a:sysClr val="windowText" lastClr="000000"/>
+                          </a:solidFill>
+                        </a:rPr>
+                        <a:t>Customer_Profile_Services</a:t>
+                      </a:r>
+                      <a:endParaRPr lang="en-GB" dirty="0">
+                        <a:solidFill>
+                          <a:sysClr val="windowText" lastClr="000000"/>
+                        </a:solidFill>
+                      </a:endParaRPr>
+                    </a:p>
+                  </a:txBody>
+                  <a:tcPr anchor="ctr">
+                    <a:solidFill>
+                      <a:schemeClr val="bg2"/>
+                    </a:solidFill>
+                  </a:tcPr>
+                </a:tc>
+                <a:tc>
+                  <a:txBody>
+                    <a:bodyPr/>
+                    <a:lstStyle/>
+                    <a:p>
+                      <a:pPr algn="ctr"/>
+                      <a:r>
+                        <a:rPr lang="en-GB" dirty="0">
+                          <a:solidFill>
+                            <a:schemeClr val="bg1"/>
+                          </a:solidFill>
+                        </a:rPr>
+                        <a:t>MSISDN</a:t>
+                      </a:r>
+                    </a:p>
+                    <a:p>
+                      <a:pPr algn="ctr"/>
+                      <a:r>
+                        <a:rPr lang="en-GB" dirty="0">
+                          <a:solidFill>
+                            <a:schemeClr val="bg1"/>
+                          </a:solidFill>
+                        </a:rPr>
+                        <a:t>(PK)</a:t>
+                      </a:r>
+                    </a:p>
+                  </a:txBody>
+                  <a:tcPr anchor="ctr"/>
+                </a:tc>
+                <a:tc>
+                  <a:txBody>
+                    <a:bodyPr/>
+                    <a:lstStyle/>
+                    <a:p>
+                      <a:pPr marL="0" marR="0" lvl="0" indent="0" algn="ctr" defTabSz="914400" rtl="0" eaLnBrk="1" fontAlgn="auto" latinLnBrk="0" hangingPunct="1">
+                        <a:lnSpc>
+                          <a:spcPct val="100000"/>
+                        </a:lnSpc>
+                        <a:spcBef>
+                          <a:spcPts val="0"/>
+                        </a:spcBef>
+                        <a:spcAft>
+                          <a:spcPts val="0"/>
+                        </a:spcAft>
+                        <a:buClrTx/>
+                        <a:buSzTx/>
+                        <a:buFontTx/>
+                        <a:buNone/>
+                        <a:tabLst/>
+                        <a:defRPr/>
+                      </a:pPr>
+                      <a:r>
+                        <a:rPr lang="en-GB" dirty="0" err="1">
+                          <a:solidFill>
+                            <a:schemeClr val="bg1"/>
+                          </a:solidFill>
+                        </a:rPr>
+                        <a:t>Profile_Services</a:t>
+                      </a:r>
+                      <a:endParaRPr lang="en-GB" dirty="0">
+                        <a:solidFill>
+                          <a:schemeClr val="bg1"/>
+                        </a:solidFill>
+                      </a:endParaRPr>
+                    </a:p>
+                    <a:p>
+                      <a:pPr marL="0" marR="0" lvl="0" indent="0" algn="ctr" defTabSz="914400" rtl="0" eaLnBrk="1" fontAlgn="auto" latinLnBrk="0" hangingPunct="1">
+                        <a:lnSpc>
+                          <a:spcPct val="100000"/>
+                        </a:lnSpc>
+                        <a:spcBef>
+                          <a:spcPts val="0"/>
+                        </a:spcBef>
+                        <a:spcAft>
+                          <a:spcPts val="0"/>
+                        </a:spcAft>
+                        <a:buClrTx/>
+                        <a:buSzTx/>
+                        <a:buFontTx/>
+                        <a:buNone/>
+                        <a:tabLst/>
+                        <a:defRPr/>
+                      </a:pPr>
+                      <a:r>
+                        <a:rPr lang="en-GB" dirty="0">
+                          <a:solidFill>
+                            <a:schemeClr val="bg1"/>
+                          </a:solidFill>
+                        </a:rPr>
+                        <a:t>ID (PK)</a:t>
+                      </a:r>
+                    </a:p>
+                  </a:txBody>
+                  <a:tcPr anchor="ctr"/>
+                </a:tc>
+                <a:tc>
+                  <a:txBody>
+                    <a:bodyPr/>
+                    <a:lstStyle/>
+                    <a:p>
+                      <a:pPr marL="0" marR="0" lvl="0" indent="0" algn="ctr" defTabSz="914400" rtl="0" eaLnBrk="1" fontAlgn="auto" latinLnBrk="0" hangingPunct="1">
+                        <a:lnSpc>
+                          <a:spcPct val="100000"/>
+                        </a:lnSpc>
+                        <a:spcBef>
+                          <a:spcPts val="0"/>
+                        </a:spcBef>
+                        <a:spcAft>
+                          <a:spcPts val="0"/>
+                        </a:spcAft>
+                        <a:buClrTx/>
+                        <a:buSzTx/>
+                        <a:buFontTx/>
+                        <a:buNone/>
+                        <a:tabLst/>
+                        <a:defRPr/>
+                      </a:pPr>
+                      <a:r>
+                        <a:rPr lang="en-GB" dirty="0">
+                          <a:solidFill>
+                            <a:schemeClr val="bg1"/>
+                          </a:solidFill>
+                        </a:rPr>
+                        <a:t>OCC</a:t>
+                      </a:r>
+                    </a:p>
+                    <a:p>
+                      <a:pPr algn="ctr"/>
+                      <a:r>
+                        <a:rPr lang="en-GB" dirty="0">
+                          <a:solidFill>
+                            <a:schemeClr val="bg1"/>
+                          </a:solidFill>
+                        </a:rPr>
+                        <a:t>ID</a:t>
+                      </a:r>
+                    </a:p>
+                    <a:p>
+                      <a:pPr algn="ctr"/>
+                      <a:r>
+                        <a:rPr lang="en-GB">
+                          <a:solidFill>
+                            <a:schemeClr val="bg1"/>
+                          </a:solidFill>
+                        </a:rPr>
+                        <a:t>(PK)</a:t>
+                      </a:r>
+                      <a:endParaRPr lang="en-GB" dirty="0">
+                        <a:solidFill>
+                          <a:schemeClr val="bg1"/>
+                        </a:solidFill>
+                      </a:endParaRPr>
+                    </a:p>
+                  </a:txBody>
+                  <a:tcPr anchor="ctr"/>
+                </a:tc>
+                <a:extLst>
+                  <a:ext uri="{0D108BD9-81ED-4DB2-BD59-A6C34878D82A}">
+                    <a16:rowId xmlns:a16="http://schemas.microsoft.com/office/drawing/2014/main" val="3577827613"/>
+                  </a:ext>
+                </a:extLst>
+              </a:tr>
+            </a:tbl>
+          </a:graphicData>
+        </a:graphic>
+      </p:graphicFrame>
+      <p:graphicFrame>
+        <p:nvGraphicFramePr>
+          <p:cNvPr id="5" name="Table 9">
+            <a:extLst>
+              <a:ext uri="{FF2B5EF4-FFF2-40B4-BE49-F238E27FC236}">
+                <a16:creationId xmlns:a16="http://schemas.microsoft.com/office/drawing/2014/main" id="{A71F2F7B-8F0F-4253-95BB-378DF4A0D6BA}"/>
+              </a:ext>
+            </a:extLst>
+          </p:cNvPr>
+          <p:cNvGraphicFramePr>
+            <a:graphicFrameLocks noGrp="1"/>
+          </p:cNvGraphicFramePr>
+          <p:nvPr>
+            <p:extLst>
+              <p:ext uri="{D42A27DB-BD31-4B8C-83A1-F6EECF244321}">
+                <p14:modId xmlns:p14="http://schemas.microsoft.com/office/powerpoint/2010/main" val="3563519996"/>
+              </p:ext>
+            </p:extLst>
+          </p:nvPr>
+        </p:nvGraphicFramePr>
+        <p:xfrm>
+          <a:off x="296550" y="4252912"/>
+          <a:ext cx="7112920" cy="914400"/>
+        </p:xfrm>
+        <a:graphic>
+          <a:graphicData uri="http://schemas.openxmlformats.org/drawingml/2006/table">
+            <a:tbl>
+              <a:tblPr firstRow="1" bandRow="1">
+                <a:tableStyleId>{7DF18680-E054-41AD-8BC1-D1AEF772440D}</a:tableStyleId>
+              </a:tblPr>
+              <a:tblGrid>
+                <a:gridCol w="1422584">
+                  <a:extLst>
+                    <a:ext uri="{9D8B030D-6E8A-4147-A177-3AD203B41FA5}">
+                      <a16:colId xmlns:a16="http://schemas.microsoft.com/office/drawing/2014/main" val="201513916"/>
+                    </a:ext>
+                  </a:extLst>
+                </a:gridCol>
+                <a:gridCol w="1422584">
+                  <a:extLst>
+                    <a:ext uri="{9D8B030D-6E8A-4147-A177-3AD203B41FA5}">
+                      <a16:colId xmlns:a16="http://schemas.microsoft.com/office/drawing/2014/main" val="1629275936"/>
+                    </a:ext>
+                  </a:extLst>
+                </a:gridCol>
+                <a:gridCol w="1422584">
+                  <a:extLst>
+                    <a:ext uri="{9D8B030D-6E8A-4147-A177-3AD203B41FA5}">
+                      <a16:colId xmlns:a16="http://schemas.microsoft.com/office/drawing/2014/main" val="4160908569"/>
+                    </a:ext>
+                  </a:extLst>
+                </a:gridCol>
+                <a:gridCol w="1422584">
+                  <a:extLst>
+                    <a:ext uri="{9D8B030D-6E8A-4147-A177-3AD203B41FA5}">
+                      <a16:colId xmlns:a16="http://schemas.microsoft.com/office/drawing/2014/main" val="3835503643"/>
+                    </a:ext>
+                  </a:extLst>
+                </a:gridCol>
+                <a:gridCol w="1422584">
+                  <a:extLst>
+                    <a:ext uri="{9D8B030D-6E8A-4147-A177-3AD203B41FA5}">
+                      <a16:colId xmlns:a16="http://schemas.microsoft.com/office/drawing/2014/main" val="1590507565"/>
+                    </a:ext>
+                  </a:extLst>
+                </a:gridCol>
+              </a:tblGrid>
+              <a:tr h="374469">
+                <a:tc>
+                  <a:txBody>
+                    <a:bodyPr/>
+                    <a:lstStyle/>
+                    <a:p>
+                      <a:pPr algn="ctr"/>
+                      <a:r>
+                        <a:rPr lang="en-GB" dirty="0">
+                          <a:solidFill>
+                            <a:sysClr val="windowText" lastClr="000000"/>
+                          </a:solidFill>
+                        </a:rPr>
+                        <a:t>OCC</a:t>
+                      </a:r>
+                    </a:p>
+                  </a:txBody>
+                  <a:tcPr anchor="ctr">
+                    <a:solidFill>
+                      <a:schemeClr val="bg2"/>
+                    </a:solidFill>
+                  </a:tcPr>
+                </a:tc>
+                <a:tc>
+                  <a:txBody>
+                    <a:bodyPr/>
+                    <a:lstStyle/>
+                    <a:p>
+                      <a:pPr marL="0" marR="0" lvl="0" indent="0" algn="ctr" defTabSz="914400" rtl="0" eaLnBrk="1" fontAlgn="auto" latinLnBrk="0" hangingPunct="1">
+                        <a:lnSpc>
+                          <a:spcPct val="100000"/>
+                        </a:lnSpc>
+                        <a:spcBef>
+                          <a:spcPts val="0"/>
+                        </a:spcBef>
+                        <a:spcAft>
+                          <a:spcPts val="0"/>
+                        </a:spcAft>
+                        <a:buClrTx/>
+                        <a:buSzTx/>
+                        <a:buFontTx/>
+                        <a:buNone/>
+                        <a:tabLst/>
+                        <a:defRPr/>
+                      </a:pPr>
+                      <a:r>
+                        <a:rPr lang="en-GB" dirty="0">
+                          <a:solidFill>
+                            <a:schemeClr val="bg1"/>
+                          </a:solidFill>
+                        </a:rPr>
+                        <a:t>OCC</a:t>
+                      </a:r>
+                    </a:p>
+                    <a:p>
+                      <a:pPr algn="ctr"/>
+                      <a:r>
+                        <a:rPr lang="en-GB" dirty="0">
+                          <a:solidFill>
+                            <a:schemeClr val="bg1"/>
+                          </a:solidFill>
+                        </a:rPr>
+                        <a:t>ID</a:t>
+                      </a:r>
+                    </a:p>
+                    <a:p>
+                      <a:pPr algn="ctr"/>
+                      <a:r>
+                        <a:rPr lang="en-GB" dirty="0">
+                          <a:solidFill>
+                            <a:schemeClr val="bg1"/>
+                          </a:solidFill>
+                        </a:rPr>
+                        <a:t>(PK)</a:t>
+                      </a:r>
+                    </a:p>
+                  </a:txBody>
+                  <a:tcPr anchor="ctr"/>
+                </a:tc>
+                <a:tc>
+                  <a:txBody>
+                    <a:bodyPr/>
+                    <a:lstStyle/>
+                    <a:p>
+                      <a:pPr algn="ctr"/>
+                      <a:r>
+                        <a:rPr lang="en-GB" dirty="0">
+                          <a:solidFill>
+                            <a:schemeClr val="bg1"/>
+                          </a:solidFill>
+                        </a:rPr>
+                        <a:t>MSISDN</a:t>
+                      </a:r>
+                    </a:p>
+                    <a:p>
+                      <a:pPr algn="ctr"/>
+                      <a:r>
+                        <a:rPr lang="en-GB" dirty="0">
+                          <a:solidFill>
+                            <a:schemeClr val="bg1"/>
+                          </a:solidFill>
+                        </a:rPr>
+                        <a:t>(PK)</a:t>
+                      </a:r>
+                    </a:p>
+                  </a:txBody>
+                  <a:tcPr anchor="ctr"/>
+                </a:tc>
+                <a:tc>
+                  <a:txBody>
+                    <a:bodyPr/>
+                    <a:lstStyle/>
+                    <a:p>
+                      <a:pPr marL="0" marR="0" lvl="0" indent="0" algn="ctr" defTabSz="914400" rtl="0" eaLnBrk="1" fontAlgn="auto" latinLnBrk="0" hangingPunct="1">
+                        <a:lnSpc>
+                          <a:spcPct val="100000"/>
+                        </a:lnSpc>
+                        <a:spcBef>
+                          <a:spcPts val="0"/>
+                        </a:spcBef>
+                        <a:spcAft>
+                          <a:spcPts val="0"/>
+                        </a:spcAft>
+                        <a:buClrTx/>
+                        <a:buSzTx/>
+                        <a:buFontTx/>
+                        <a:buNone/>
+                        <a:tabLst/>
+                        <a:defRPr/>
+                      </a:pPr>
+                      <a:r>
+                        <a:rPr lang="en-GB" dirty="0">
+                          <a:solidFill>
+                            <a:schemeClr val="bg1"/>
+                          </a:solidFill>
+                        </a:rPr>
+                        <a:t>One Time Service</a:t>
+                      </a:r>
+                    </a:p>
+                    <a:p>
+                      <a:pPr marL="0" marR="0" lvl="0" indent="0" algn="ctr" defTabSz="914400" rtl="0" eaLnBrk="1" fontAlgn="auto" latinLnBrk="0" hangingPunct="1">
+                        <a:lnSpc>
+                          <a:spcPct val="100000"/>
+                        </a:lnSpc>
+                        <a:spcBef>
+                          <a:spcPts val="0"/>
+                        </a:spcBef>
+                        <a:spcAft>
+                          <a:spcPts val="0"/>
+                        </a:spcAft>
+                        <a:buClrTx/>
+                        <a:buSzTx/>
+                        <a:buFontTx/>
+                        <a:buNone/>
+                        <a:tabLst/>
+                        <a:defRPr/>
+                      </a:pPr>
+                      <a:r>
+                        <a:rPr lang="en-GB" dirty="0">
+                          <a:solidFill>
+                            <a:schemeClr val="bg1"/>
+                          </a:solidFill>
+                        </a:rPr>
+                        <a:t>(PK)</a:t>
+                      </a:r>
+                    </a:p>
+                  </a:txBody>
+                  <a:tcPr anchor="ctr"/>
+                </a:tc>
+                <a:tc>
+                  <a:txBody>
+                    <a:bodyPr/>
+                    <a:lstStyle/>
+                    <a:p>
+                      <a:pPr marL="0" marR="0" lvl="0" indent="0" algn="ctr" defTabSz="914400" rtl="0" eaLnBrk="1" fontAlgn="auto" latinLnBrk="0" hangingPunct="1">
+                        <a:lnSpc>
+                          <a:spcPct val="100000"/>
+                        </a:lnSpc>
+                        <a:spcBef>
+                          <a:spcPts val="0"/>
+                        </a:spcBef>
+                        <a:spcAft>
+                          <a:spcPts val="0"/>
+                        </a:spcAft>
+                        <a:buClrTx/>
+                        <a:buSzTx/>
+                        <a:buFontTx/>
+                        <a:buNone/>
+                        <a:tabLst/>
+                        <a:defRPr/>
+                      </a:pPr>
+                      <a:r>
+                        <a:rPr lang="en-GB" dirty="0">
+                          <a:solidFill>
+                            <a:schemeClr val="bg1"/>
+                          </a:solidFill>
+                        </a:rPr>
+                        <a:t>One Time Service</a:t>
+                      </a:r>
+                    </a:p>
+                    <a:p>
+                      <a:pPr algn="ctr"/>
+                      <a:r>
+                        <a:rPr lang="en-GB" dirty="0" err="1">
+                          <a:solidFill>
+                            <a:schemeClr val="bg1"/>
+                          </a:solidFill>
+                        </a:rPr>
+                        <a:t>IS_Processed</a:t>
+                      </a:r>
+                      <a:endParaRPr lang="en-GB" dirty="0">
+                        <a:solidFill>
+                          <a:schemeClr val="bg1"/>
+                        </a:solidFill>
+                      </a:endParaRPr>
                     </a:p>
                   </a:txBody>
                   <a:tcPr anchor="ctr"/>

</xml_diff>

<commit_message>
edited the erd diagaram
</commit_message>
<xml_diff>
--- a/Database Documentation/Database Documentation.pptx
+++ b/Database Documentation/Database Documentation.pptx
@@ -9231,14 +9231,14 @@
           <p:nvPr>
             <p:extLst>
               <p:ext uri="{D42A27DB-BD31-4B8C-83A1-F6EECF244321}">
-                <p14:modId xmlns:p14="http://schemas.microsoft.com/office/powerpoint/2010/main" val="205739633"/>
+                <p14:modId xmlns:p14="http://schemas.microsoft.com/office/powerpoint/2010/main" val="341163213"/>
               </p:ext>
             </p:extLst>
           </p:nvPr>
         </p:nvGraphicFramePr>
         <p:xfrm>
           <a:off x="296548" y="5578475"/>
-          <a:ext cx="11684920" cy="944880"/>
+          <a:ext cx="9347936" cy="944880"/>
         </p:xfrm>
         <a:graphic>
           <a:graphicData uri="http://schemas.openxmlformats.org/drawingml/2006/table">
@@ -9303,20 +9303,6 @@
                     </a:ext>
                   </a:extLst>
                 </a:gridCol>
-                <a:gridCol w="1168492">
-                  <a:extLst>
-                    <a:ext uri="{9D8B030D-6E8A-4147-A177-3AD203B41FA5}">
-                      <a16:colId xmlns:a16="http://schemas.microsoft.com/office/drawing/2014/main" val="740313113"/>
-                    </a:ext>
-                  </a:extLst>
-                </a:gridCol>
-                <a:gridCol w="1168492">
-                  <a:extLst>
-                    <a:ext uri="{9D8B030D-6E8A-4147-A177-3AD203B41FA5}">
-                      <a16:colId xmlns:a16="http://schemas.microsoft.com/office/drawing/2014/main" val="207279214"/>
-                    </a:ext>
-                  </a:extLst>
-                </a:gridCol>
               </a:tblGrid>
               <a:tr h="770213">
                 <a:tc>
@@ -9578,35 +9564,6 @@
                   </a:txBody>
                   <a:tcPr anchor="ctr"/>
                 </a:tc>
-                <a:tc>
-                  <a:txBody>
-                    <a:bodyPr/>
-                    <a:lstStyle/>
-                    <a:p>
-                      <a:pPr algn="ctr"/>
-                      <a:r>
-                        <a:rPr lang="en-GB" sz="1800" dirty="0" err="1"/>
-                        <a:t>Is_Recurring</a:t>
-                      </a:r>
-                      <a:endParaRPr lang="en-GB" sz="1800" dirty="0"/>
-                    </a:p>
-                  </a:txBody>
-                  <a:tcPr anchor="ctr"/>
-                </a:tc>
-                <a:tc>
-                  <a:txBody>
-                    <a:bodyPr/>
-                    <a:lstStyle/>
-                    <a:p>
-                      <a:pPr algn="ctr"/>
-                      <a:r>
-                        <a:rPr lang="en-GB" sz="1800" dirty="0"/>
-                        <a:t>Recurring Fees</a:t>
-                      </a:r>
-                    </a:p>
-                  </a:txBody>
-                  <a:tcPr anchor="ctr"/>
-                </a:tc>
                 <a:extLst>
                   <a:ext uri="{0D108BD9-81ED-4DB2-BD59-A6C34878D82A}">
                     <a16:rowId xmlns:a16="http://schemas.microsoft.com/office/drawing/2014/main" val="3577827613"/>
@@ -9632,14 +9589,14 @@
           <p:nvPr>
             <p:extLst>
               <p:ext uri="{D42A27DB-BD31-4B8C-83A1-F6EECF244321}">
-                <p14:modId xmlns:p14="http://schemas.microsoft.com/office/powerpoint/2010/main" val="3092718262"/>
+                <p14:modId xmlns:p14="http://schemas.microsoft.com/office/powerpoint/2010/main" val="1489058218"/>
               </p:ext>
             </p:extLst>
           </p:nvPr>
         </p:nvGraphicFramePr>
         <p:xfrm>
-          <a:off x="7777112" y="1443106"/>
-          <a:ext cx="4118336" cy="640080"/>
+          <a:off x="7550871" y="1312385"/>
+          <a:ext cx="4430600" cy="914400"/>
         </p:xfrm>
         <a:graphic>
           <a:graphicData uri="http://schemas.openxmlformats.org/drawingml/2006/table">
@@ -9648,31 +9605,38 @@
                 <a:tableStyleId>{00A15C55-8517-42AA-B614-E9B94910E393}</a:tableStyleId>
               </a:tblPr>
               <a:tblGrid>
-                <a:gridCol w="1029584">
+                <a:gridCol w="886120">
                   <a:extLst>
                     <a:ext uri="{9D8B030D-6E8A-4147-A177-3AD203B41FA5}">
                       <a16:colId xmlns:a16="http://schemas.microsoft.com/office/drawing/2014/main" val="2059838879"/>
                     </a:ext>
                   </a:extLst>
                 </a:gridCol>
-                <a:gridCol w="1029584">
+                <a:gridCol w="886120">
                   <a:extLst>
                     <a:ext uri="{9D8B030D-6E8A-4147-A177-3AD203B41FA5}">
                       <a16:colId xmlns:a16="http://schemas.microsoft.com/office/drawing/2014/main" val="3077536117"/>
                     </a:ext>
                   </a:extLst>
                 </a:gridCol>
-                <a:gridCol w="1029584">
+                <a:gridCol w="886120">
                   <a:extLst>
                     <a:ext uri="{9D8B030D-6E8A-4147-A177-3AD203B41FA5}">
                       <a16:colId xmlns:a16="http://schemas.microsoft.com/office/drawing/2014/main" val="2412225613"/>
                     </a:ext>
                   </a:extLst>
                 </a:gridCol>
-                <a:gridCol w="1029584">
+                <a:gridCol w="886120">
                   <a:extLst>
                     <a:ext uri="{9D8B030D-6E8A-4147-A177-3AD203B41FA5}">
                       <a16:colId xmlns:a16="http://schemas.microsoft.com/office/drawing/2014/main" val="2405177763"/>
+                    </a:ext>
+                  </a:extLst>
+                </a:gridCol>
+                <a:gridCol w="886120">
+                  <a:extLst>
+                    <a:ext uri="{9D8B030D-6E8A-4147-A177-3AD203B41FA5}">
+                      <a16:colId xmlns:a16="http://schemas.microsoft.com/office/drawing/2014/main" val="2495853743"/>
                     </a:ext>
                   </a:extLst>
                 </a:gridCol>
@@ -9771,6 +9735,20 @@
                         <a:t>Is_Recurring</a:t>
                       </a:r>
                       <a:endParaRPr lang="en-GB" sz="1800" dirty="0"/>
+                    </a:p>
+                  </a:txBody>
+                  <a:tcPr anchor="ctr"/>
+                </a:tc>
+                <a:tc>
+                  <a:txBody>
+                    <a:bodyPr/>
+                    <a:lstStyle/>
+                    <a:p>
+                      <a:pPr algn="ctr"/>
+                      <a:r>
+                        <a:rPr lang="en-GB" sz="1800" dirty="0"/>
+                        <a:t>Recurring Fees</a:t>
+                      </a:r>
                     </a:p>
                   </a:txBody>
                   <a:tcPr anchor="ctr"/>

</xml_diff>

<commit_message>
Voice cost calculation & add new table in  DB document
</commit_message>
<xml_diff>
--- a/Database Documentation/Database Documentation.pptx
+++ b/Database Documentation/Database Documentation.pptx
@@ -5,7 +5,7 @@
     <p:sldMasterId id="2147483648" r:id="rId1"/>
   </p:sldMasterIdLst>
   <p:notesMasterIdLst>
-    <p:notesMasterId r:id="rId9"/>
+    <p:notesMasterId r:id="rId10"/>
   </p:notesMasterIdLst>
   <p:sldIdLst>
     <p:sldId id="256" r:id="rId2"/>
@@ -14,7 +14,8 @@
     <p:sldId id="260" r:id="rId5"/>
     <p:sldId id="261" r:id="rId6"/>
     <p:sldId id="263" r:id="rId7"/>
-    <p:sldId id="258" r:id="rId8"/>
+    <p:sldId id="264" r:id="rId8"/>
+    <p:sldId id="258" r:id="rId9"/>
   </p:sldIdLst>
   <p:sldSz cx="12192000" cy="6858000"/>
   <p:notesSz cx="6858000" cy="9144000"/>
@@ -203,7 +204,7 @@
           <a:p>
             <a:fld id="{951D2AFC-B146-40C7-8E13-8C846E293EC8}" type="datetimeFigureOut">
               <a:rPr lang="en-US" smtClean="0"/>
-              <a:t>4/26/2020</a:t>
+              <a:t>4/30/2020</a:t>
             </a:fld>
             <a:endParaRPr lang="en-US"/>
           </a:p>
@@ -555,6 +556,90 @@
 </p:notes>
 </file>
 
+<file path=ppt/notesSlides/notesSlide2.xml><?xml version="1.0" encoding="utf-8"?>
+<p:notes xmlns:a="http://schemas.openxmlformats.org/drawingml/2006/main" xmlns:r="http://schemas.openxmlformats.org/officeDocument/2006/relationships" xmlns:p="http://schemas.openxmlformats.org/presentationml/2006/main">
+  <p:cSld>
+    <p:spTree>
+      <p:nvGrpSpPr>
+        <p:cNvPr id="1" name=""/>
+        <p:cNvGrpSpPr/>
+        <p:nvPr/>
+      </p:nvGrpSpPr>
+      <p:grpSpPr>
+        <a:xfrm>
+          <a:off x="0" y="0"/>
+          <a:ext cx="0" cy="0"/>
+          <a:chOff x="0" y="0"/>
+          <a:chExt cx="0" cy="0"/>
+        </a:xfrm>
+      </p:grpSpPr>
+      <p:sp>
+        <p:nvSpPr>
+          <p:cNvPr id="2" name="Slide Image Placeholder 1"/>
+          <p:cNvSpPr>
+            <a:spLocks noGrp="1" noRot="1" noChangeAspect="1"/>
+          </p:cNvSpPr>
+          <p:nvPr>
+            <p:ph type="sldImg"/>
+          </p:nvPr>
+        </p:nvSpPr>
+        <p:spPr/>
+      </p:sp>
+      <p:sp>
+        <p:nvSpPr>
+          <p:cNvPr id="3" name="Notes Placeholder 2"/>
+          <p:cNvSpPr>
+            <a:spLocks noGrp="1"/>
+          </p:cNvSpPr>
+          <p:nvPr>
+            <p:ph type="body" idx="1"/>
+          </p:nvPr>
+        </p:nvSpPr>
+        <p:spPr/>
+        <p:txBody>
+          <a:bodyPr/>
+          <a:lstStyle/>
+          <a:p>
+            <a:endParaRPr lang="en-US" dirty="0"/>
+          </a:p>
+        </p:txBody>
+      </p:sp>
+      <p:sp>
+        <p:nvSpPr>
+          <p:cNvPr id="4" name="Slide Number Placeholder 3"/>
+          <p:cNvSpPr>
+            <a:spLocks noGrp="1"/>
+          </p:cNvSpPr>
+          <p:nvPr>
+            <p:ph type="sldNum" sz="quarter" idx="10"/>
+          </p:nvPr>
+        </p:nvSpPr>
+        <p:spPr/>
+        <p:txBody>
+          <a:bodyPr/>
+          <a:lstStyle/>
+          <a:p>
+            <a:fld id="{68FD2EF9-7B9B-46AC-A885-338B1C581335}" type="slidenum">
+              <a:rPr lang="en-US" smtClean="0"/>
+              <a:t>7</a:t>
+            </a:fld>
+            <a:endParaRPr lang="en-US"/>
+          </a:p>
+        </p:txBody>
+      </p:sp>
+    </p:spTree>
+    <p:extLst>
+      <p:ext uri="{BB962C8B-B14F-4D97-AF65-F5344CB8AC3E}">
+        <p14:creationId xmlns:p14="http://schemas.microsoft.com/office/powerpoint/2010/main" val="1046054999"/>
+      </p:ext>
+    </p:extLst>
+  </p:cSld>
+  <p:clrMapOvr>
+    <a:masterClrMapping/>
+  </p:clrMapOvr>
+</p:notes>
+</file>
+
 <file path=ppt/slideLayouts/slideLayout1.xml><?xml version="1.0" encoding="utf-8"?>
 <p:sldLayout xmlns:a="http://schemas.openxmlformats.org/drawingml/2006/main" xmlns:r="http://schemas.openxmlformats.org/officeDocument/2006/relationships" xmlns:p="http://schemas.openxmlformats.org/presentationml/2006/main" type="title" preserve="1">
   <p:cSld name="Title Slide">
@@ -704,7 +789,7 @@
           <a:p>
             <a:fld id="{80FB5BE9-7F13-4564-9415-A50ADEB12BD1}" type="datetimeFigureOut">
               <a:rPr lang="en-GB" smtClean="0"/>
-              <a:t>26/04/2020</a:t>
+              <a:t>30/04/2020</a:t>
             </a:fld>
             <a:endParaRPr lang="en-GB" dirty="0"/>
           </a:p>
@@ -904,7 +989,7 @@
           <a:p>
             <a:fld id="{80FB5BE9-7F13-4564-9415-A50ADEB12BD1}" type="datetimeFigureOut">
               <a:rPr lang="en-GB" smtClean="0"/>
-              <a:t>26/04/2020</a:t>
+              <a:t>30/04/2020</a:t>
             </a:fld>
             <a:endParaRPr lang="en-GB" dirty="0"/>
           </a:p>
@@ -1114,7 +1199,7 @@
           <a:p>
             <a:fld id="{80FB5BE9-7F13-4564-9415-A50ADEB12BD1}" type="datetimeFigureOut">
               <a:rPr lang="en-GB" smtClean="0"/>
-              <a:t>26/04/2020</a:t>
+              <a:t>30/04/2020</a:t>
             </a:fld>
             <a:endParaRPr lang="en-GB" dirty="0"/>
           </a:p>
@@ -1314,7 +1399,7 @@
           <a:p>
             <a:fld id="{80FB5BE9-7F13-4564-9415-A50ADEB12BD1}" type="datetimeFigureOut">
               <a:rPr lang="en-GB" smtClean="0"/>
-              <a:t>26/04/2020</a:t>
+              <a:t>30/04/2020</a:t>
             </a:fld>
             <a:endParaRPr lang="en-GB" dirty="0"/>
           </a:p>
@@ -1590,7 +1675,7 @@
           <a:p>
             <a:fld id="{80FB5BE9-7F13-4564-9415-A50ADEB12BD1}" type="datetimeFigureOut">
               <a:rPr lang="en-GB" smtClean="0"/>
-              <a:t>26/04/2020</a:t>
+              <a:t>30/04/2020</a:t>
             </a:fld>
             <a:endParaRPr lang="en-GB" dirty="0"/>
           </a:p>
@@ -1858,7 +1943,7 @@
           <a:p>
             <a:fld id="{80FB5BE9-7F13-4564-9415-A50ADEB12BD1}" type="datetimeFigureOut">
               <a:rPr lang="en-GB" smtClean="0"/>
-              <a:t>26/04/2020</a:t>
+              <a:t>30/04/2020</a:t>
             </a:fld>
             <a:endParaRPr lang="en-GB" dirty="0"/>
           </a:p>
@@ -2273,7 +2358,7 @@
           <a:p>
             <a:fld id="{80FB5BE9-7F13-4564-9415-A50ADEB12BD1}" type="datetimeFigureOut">
               <a:rPr lang="en-GB" smtClean="0"/>
-              <a:t>26/04/2020</a:t>
+              <a:t>30/04/2020</a:t>
             </a:fld>
             <a:endParaRPr lang="en-GB" dirty="0"/>
           </a:p>
@@ -2415,7 +2500,7 @@
           <a:p>
             <a:fld id="{80FB5BE9-7F13-4564-9415-A50ADEB12BD1}" type="datetimeFigureOut">
               <a:rPr lang="en-GB" smtClean="0"/>
-              <a:t>26/04/2020</a:t>
+              <a:t>30/04/2020</a:t>
             </a:fld>
             <a:endParaRPr lang="en-GB" dirty="0"/>
           </a:p>
@@ -2528,7 +2613,7 @@
           <a:p>
             <a:fld id="{80FB5BE9-7F13-4564-9415-A50ADEB12BD1}" type="datetimeFigureOut">
               <a:rPr lang="en-GB" smtClean="0"/>
-              <a:t>26/04/2020</a:t>
+              <a:t>30/04/2020</a:t>
             </a:fld>
             <a:endParaRPr lang="en-GB" dirty="0"/>
           </a:p>
@@ -2841,7 +2926,7 @@
           <a:p>
             <a:fld id="{80FB5BE9-7F13-4564-9415-A50ADEB12BD1}" type="datetimeFigureOut">
               <a:rPr lang="en-GB" smtClean="0"/>
-              <a:t>26/04/2020</a:t>
+              <a:t>30/04/2020</a:t>
             </a:fld>
             <a:endParaRPr lang="en-GB" dirty="0"/>
           </a:p>
@@ -3130,7 +3215,7 @@
           <a:p>
             <a:fld id="{80FB5BE9-7F13-4564-9415-A50ADEB12BD1}" type="datetimeFigureOut">
               <a:rPr lang="en-GB" smtClean="0"/>
-              <a:t>26/04/2020</a:t>
+              <a:t>30/04/2020</a:t>
             </a:fld>
             <a:endParaRPr lang="en-GB" dirty="0"/>
           </a:p>
@@ -3373,7 +3458,7 @@
           <a:p>
             <a:fld id="{80FB5BE9-7F13-4564-9415-A50ADEB12BD1}" type="datetimeFigureOut">
               <a:rPr lang="en-GB" smtClean="0"/>
-              <a:t>26/04/2020</a:t>
+              <a:t>30/04/2020</a:t>
             </a:fld>
             <a:endParaRPr lang="en-GB" dirty="0"/>
           </a:p>
@@ -8539,14 +8624,14 @@
           <p:nvPr>
             <p:extLst>
               <p:ext uri="{D42A27DB-BD31-4B8C-83A1-F6EECF244321}">
-                <p14:modId xmlns:p14="http://schemas.microsoft.com/office/powerpoint/2010/main" val="2197428018"/>
+                <p14:modId xmlns:p14="http://schemas.microsoft.com/office/powerpoint/2010/main" val="184603235"/>
               </p:ext>
             </p:extLst>
           </p:nvPr>
         </p:nvGraphicFramePr>
         <p:xfrm>
-          <a:off x="260366" y="5112430"/>
-          <a:ext cx="11308180" cy="929640"/>
+          <a:off x="499922" y="5092131"/>
+          <a:ext cx="11169632" cy="1005840"/>
         </p:xfrm>
         <a:graphic>
           <a:graphicData uri="http://schemas.openxmlformats.org/drawingml/2006/table">
@@ -8555,77 +8640,77 @@
                 <a:tableStyleId>{7DF18680-E054-41AD-8BC1-D1AEF772440D}</a:tableStyleId>
               </a:tblPr>
               <a:tblGrid>
-                <a:gridCol w="1005790">
+                <a:gridCol w="993467">
                   <a:extLst>
                     <a:ext uri="{9D8B030D-6E8A-4147-A177-3AD203B41FA5}">
                       <a16:colId xmlns:a16="http://schemas.microsoft.com/office/drawing/2014/main" val="201513916"/>
                     </a:ext>
                   </a:extLst>
                 </a:gridCol>
-                <a:gridCol w="1005790">
+                <a:gridCol w="993467">
                   <a:extLst>
                     <a:ext uri="{9D8B030D-6E8A-4147-A177-3AD203B41FA5}">
                       <a16:colId xmlns:a16="http://schemas.microsoft.com/office/drawing/2014/main" val="3070872457"/>
                     </a:ext>
                   </a:extLst>
                 </a:gridCol>
-                <a:gridCol w="1005790">
+                <a:gridCol w="993467">
                   <a:extLst>
                     <a:ext uri="{9D8B030D-6E8A-4147-A177-3AD203B41FA5}">
                       <a16:colId xmlns:a16="http://schemas.microsoft.com/office/drawing/2014/main" val="4160908569"/>
                     </a:ext>
                   </a:extLst>
                 </a:gridCol>
-                <a:gridCol w="1391133">
+                <a:gridCol w="1374089">
                   <a:extLst>
                     <a:ext uri="{9D8B030D-6E8A-4147-A177-3AD203B41FA5}">
                       <a16:colId xmlns:a16="http://schemas.microsoft.com/office/drawing/2014/main" val="1590507565"/>
                     </a:ext>
                   </a:extLst>
                 </a:gridCol>
-                <a:gridCol w="1005790">
+                <a:gridCol w="993467">
                   <a:extLst>
                     <a:ext uri="{9D8B030D-6E8A-4147-A177-3AD203B41FA5}">
                       <a16:colId xmlns:a16="http://schemas.microsoft.com/office/drawing/2014/main" val="1851729959"/>
                     </a:ext>
                   </a:extLst>
                 </a:gridCol>
-                <a:gridCol w="1005790">
+                <a:gridCol w="993467">
                   <a:extLst>
                     <a:ext uri="{9D8B030D-6E8A-4147-A177-3AD203B41FA5}">
                       <a16:colId xmlns:a16="http://schemas.microsoft.com/office/drawing/2014/main" val="923522584"/>
                     </a:ext>
                   </a:extLst>
                 </a:gridCol>
-                <a:gridCol w="1005790">
+                <a:gridCol w="993467">
                   <a:extLst>
                     <a:ext uri="{9D8B030D-6E8A-4147-A177-3AD203B41FA5}">
                       <a16:colId xmlns:a16="http://schemas.microsoft.com/office/drawing/2014/main" val="3417585095"/>
                     </a:ext>
                   </a:extLst>
                 </a:gridCol>
-                <a:gridCol w="1005790">
+                <a:gridCol w="993467">
                   <a:extLst>
                     <a:ext uri="{9D8B030D-6E8A-4147-A177-3AD203B41FA5}">
                       <a16:colId xmlns:a16="http://schemas.microsoft.com/office/drawing/2014/main" val="2557095657"/>
                     </a:ext>
                   </a:extLst>
                 </a:gridCol>
-                <a:gridCol w="864937">
+                <a:gridCol w="854340">
                   <a:extLst>
                     <a:ext uri="{9D8B030D-6E8A-4147-A177-3AD203B41FA5}">
                       <a16:colId xmlns:a16="http://schemas.microsoft.com/office/drawing/2014/main" val="2967440029"/>
                     </a:ext>
                   </a:extLst>
                 </a:gridCol>
-                <a:gridCol w="1005790">
+                <a:gridCol w="993467">
                   <a:extLst>
                     <a:ext uri="{9D8B030D-6E8A-4147-A177-3AD203B41FA5}">
                       <a16:colId xmlns:a16="http://schemas.microsoft.com/office/drawing/2014/main" val="1327699478"/>
                     </a:ext>
                   </a:extLst>
                 </a:gridCol>
-                <a:gridCol w="1005790">
+                <a:gridCol w="993467">
                   <a:extLst>
                     <a:ext uri="{9D8B030D-6E8A-4147-A177-3AD203B41FA5}">
                       <a16:colId xmlns:a16="http://schemas.microsoft.com/office/drawing/2014/main" val="2835791411"/>
@@ -8633,7 +8718,7 @@
                   </a:extLst>
                 </a:gridCol>
               </a:tblGrid>
-              <a:tr h="929640">
+              <a:tr h="721511">
                 <a:tc>
                   <a:txBody>
                     <a:bodyPr/>
@@ -8830,8 +8915,20 @@
                       <a:pPr algn="ctr"/>
                       <a:r>
                         <a:rPr lang="en-GB" sz="1200" dirty="0"/>
-                        <a:t>On Net</a:t>
-                      </a:r>
+                        <a:t>On </a:t>
+                      </a:r>
+                      <a:r>
+                        <a:rPr lang="en-GB" sz="1200" dirty="0" smtClean="0"/>
+                        <a:t>Net</a:t>
+                      </a:r>
+                    </a:p>
+                    <a:p>
+                      <a:pPr algn="ctr"/>
+                      <a:r>
+                        <a:rPr lang="en-GB" sz="1200" dirty="0" smtClean="0"/>
+                        <a:t>(sec)</a:t>
+                      </a:r>
+                      <a:endParaRPr lang="en-GB" sz="1200" dirty="0"/>
                     </a:p>
                   </a:txBody>
                   <a:tcPr anchor="ctr"/>
@@ -8865,8 +8962,13 @@
                       <a:pPr algn="ctr"/>
                       <a:r>
                         <a:rPr lang="en-GB" sz="1200" dirty="0"/>
-                        <a:t>Cross  Net</a:t>
-                      </a:r>
+                        <a:t>Cross  </a:t>
+                      </a:r>
+                      <a:r>
+                        <a:rPr lang="en-GB" sz="1200" dirty="0" smtClean="0"/>
+                        <a:t>Net(sec)</a:t>
+                      </a:r>
+                      <a:endParaRPr lang="en-GB" sz="1200" dirty="0"/>
                     </a:p>
                   </a:txBody>
                   <a:tcPr anchor="ctr"/>
@@ -8994,13 +9096,13 @@
           <p:nvPr>
             <p:extLst>
               <p:ext uri="{D42A27DB-BD31-4B8C-83A1-F6EECF244321}">
-                <p14:modId xmlns:p14="http://schemas.microsoft.com/office/powerpoint/2010/main" val="3339611842"/>
+                <p14:modId xmlns:p14="http://schemas.microsoft.com/office/powerpoint/2010/main" val="4054592951"/>
               </p:ext>
             </p:extLst>
           </p:nvPr>
         </p:nvGraphicFramePr>
         <p:xfrm>
-          <a:off x="224183" y="704530"/>
+          <a:off x="260366" y="731843"/>
           <a:ext cx="7118022" cy="640080"/>
         </p:xfrm>
         <a:graphic>
@@ -9399,7 +9501,7 @@
           <p:nvPr>
             <p:extLst>
               <p:ext uri="{D42A27DB-BD31-4B8C-83A1-F6EECF244321}">
-                <p14:modId xmlns:p14="http://schemas.microsoft.com/office/powerpoint/2010/main" val="2402260837"/>
+                <p14:modId xmlns:p14="http://schemas.microsoft.com/office/powerpoint/2010/main" val="2350178164"/>
               </p:ext>
             </p:extLst>
           </p:nvPr>
@@ -9668,9 +9770,10 @@
                     <a:p>
                       <a:pPr algn="ctr"/>
                       <a:r>
-                        <a:rPr lang="en-GB" sz="1600" dirty="0"/>
+                        <a:rPr lang="en-GB" sz="1600" dirty="0" smtClean="0"/>
                         <a:t>Internet</a:t>
                       </a:r>
+                      <a:endParaRPr lang="en-GB" sz="1600" dirty="0"/>
                     </a:p>
                   </a:txBody>
                   <a:tcPr anchor="ctr">
@@ -9734,7 +9837,7 @@
           <p:nvPr>
             <p:extLst>
               <p:ext uri="{D42A27DB-BD31-4B8C-83A1-F6EECF244321}">
-                <p14:modId xmlns:p14="http://schemas.microsoft.com/office/powerpoint/2010/main" val="40435006"/>
+                <p14:modId xmlns:p14="http://schemas.microsoft.com/office/powerpoint/2010/main" val="707272583"/>
               </p:ext>
             </p:extLst>
           </p:nvPr>
@@ -9999,9 +10102,10 @@
                     <a:p>
                       <a:pPr algn="ctr"/>
                       <a:r>
-                        <a:rPr lang="en-GB" sz="1600" dirty="0"/>
-                        <a:t>Amount</a:t>
-                      </a:r>
+                        <a:rPr lang="en-GB" sz="1600" dirty="0" smtClean="0"/>
+                        <a:t>Amount(sec)</a:t>
+                      </a:r>
+                      <a:endParaRPr lang="en-GB" sz="1600" dirty="0"/>
                     </a:p>
                   </a:txBody>
                   <a:tcPr anchor="ctr"/>
@@ -10362,13 +10466,13 @@
           <p:nvPr>
             <p:extLst>
               <p:ext uri="{D42A27DB-BD31-4B8C-83A1-F6EECF244321}">
-                <p14:modId xmlns:p14="http://schemas.microsoft.com/office/powerpoint/2010/main" val="765382133"/>
+                <p14:modId xmlns:p14="http://schemas.microsoft.com/office/powerpoint/2010/main" val="310829193"/>
               </p:ext>
             </p:extLst>
           </p:nvPr>
         </p:nvGraphicFramePr>
         <p:xfrm>
-          <a:off x="7492250" y="1382307"/>
+          <a:off x="8051585" y="4138631"/>
           <a:ext cx="4416860" cy="747048"/>
         </p:xfrm>
         <a:graphic>
@@ -10552,13 +10656,13 @@
           <p:nvPr>
             <p:extLst>
               <p:ext uri="{D42A27DB-BD31-4B8C-83A1-F6EECF244321}">
-                <p14:modId xmlns:p14="http://schemas.microsoft.com/office/powerpoint/2010/main" val="2277102868"/>
+                <p14:modId xmlns:p14="http://schemas.microsoft.com/office/powerpoint/2010/main" val="1943366788"/>
               </p:ext>
             </p:extLst>
           </p:nvPr>
         </p:nvGraphicFramePr>
         <p:xfrm>
-          <a:off x="260366" y="4152381"/>
+          <a:off x="-1182022" y="4187110"/>
           <a:ext cx="9157955" cy="822960"/>
         </p:xfrm>
         <a:graphic>
@@ -10879,8 +10983,8 @@
         </p:nvSpPr>
         <p:spPr>
           <a:xfrm>
-            <a:off x="4282860" y="70276"/>
-            <a:ext cx="5429176" cy="646331"/>
+            <a:off x="2895600" y="70276"/>
+            <a:ext cx="9013510" cy="646331"/>
           </a:xfrm>
           <a:prstGeom prst="rect">
             <a:avLst/>
@@ -10901,7 +11005,19 @@
               <a:rPr lang="en-US" dirty="0" smtClean="0">
                 <a:sym typeface="Wingdings" panose="05000000000000000000" pitchFamily="2" charset="2"/>
               </a:rPr>
-              <a:t> float                                   All Date text</a:t>
+              <a:t> float                                   All Date text                    1G---1.16LE (</a:t>
+            </a:r>
+            <a:r>
+              <a:rPr lang="en-US" dirty="0" err="1" smtClean="0">
+                <a:sym typeface="Wingdings" panose="05000000000000000000" pitchFamily="2" charset="2"/>
+              </a:rPr>
+              <a:t>exp</a:t>
+            </a:r>
+            <a:r>
+              <a:rPr lang="en-US" dirty="0" smtClean="0">
+                <a:sym typeface="Wingdings" panose="05000000000000000000" pitchFamily="2" charset="2"/>
+              </a:rPr>
+              <a:t>)</a:t>
             </a:r>
           </a:p>
           <a:p>
@@ -10984,14 +11100,14 @@
           <p:nvPr>
             <p:extLst>
               <p:ext uri="{D42A27DB-BD31-4B8C-83A1-F6EECF244321}">
-                <p14:modId xmlns:p14="http://schemas.microsoft.com/office/powerpoint/2010/main" val="3145403644"/>
+                <p14:modId xmlns:p14="http://schemas.microsoft.com/office/powerpoint/2010/main" val="2921790643"/>
               </p:ext>
             </p:extLst>
           </p:nvPr>
         </p:nvGraphicFramePr>
         <p:xfrm>
-          <a:off x="260366" y="6138844"/>
-          <a:ext cx="9776704" cy="640080"/>
+          <a:off x="838200" y="6182971"/>
+          <a:ext cx="9776705" cy="640080"/>
         </p:xfrm>
         <a:graphic>
           <a:graphicData uri="http://schemas.openxmlformats.org/drawingml/2006/table">
@@ -11000,31 +11116,38 @@
                 <a:tableStyleId>{7DF18680-E054-41AD-8BC1-D1AEF772440D}</a:tableStyleId>
               </a:tblPr>
               <a:tblGrid>
-                <a:gridCol w="2444176">
+                <a:gridCol w="1955341">
                   <a:extLst>
                     <a:ext uri="{9D8B030D-6E8A-4147-A177-3AD203B41FA5}">
                       <a16:colId xmlns:a16="http://schemas.microsoft.com/office/drawing/2014/main" val="201513916"/>
                     </a:ext>
                   </a:extLst>
                 </a:gridCol>
-                <a:gridCol w="2444176">
+                <a:gridCol w="1955341">
                   <a:extLst>
                     <a:ext uri="{9D8B030D-6E8A-4147-A177-3AD203B41FA5}">
                       <a16:colId xmlns:a16="http://schemas.microsoft.com/office/drawing/2014/main" val="4160908569"/>
                     </a:ext>
                   </a:extLst>
                 </a:gridCol>
-                <a:gridCol w="2444176">
+                <a:gridCol w="1955341">
                   <a:extLst>
                     <a:ext uri="{9D8B030D-6E8A-4147-A177-3AD203B41FA5}">
                       <a16:colId xmlns:a16="http://schemas.microsoft.com/office/drawing/2014/main" val="3835503643"/>
                     </a:ext>
                   </a:extLst>
                 </a:gridCol>
-                <a:gridCol w="2444176">
+                <a:gridCol w="1955341">
                   <a:extLst>
                     <a:ext uri="{9D8B030D-6E8A-4147-A177-3AD203B41FA5}">
                       <a16:colId xmlns:a16="http://schemas.microsoft.com/office/drawing/2014/main" val="1590507565"/>
+                    </a:ext>
+                  </a:extLst>
+                </a:gridCol>
+                <a:gridCol w="1955341">
+                  <a:extLst>
+                    <a:ext uri="{9D8B030D-6E8A-4147-A177-3AD203B41FA5}">
+                      <a16:colId xmlns:a16="http://schemas.microsoft.com/office/drawing/2014/main" val="451514499"/>
                     </a:ext>
                   </a:extLst>
                 </a:gridCol>
@@ -11249,6 +11372,33 @@
                     </a:p>
                   </a:txBody>
                   <a:tcPr anchor="ctr"/>
+                </a:tc>
+                <a:tc>
+                  <a:txBody>
+                    <a:bodyPr/>
+                    <a:lstStyle/>
+                    <a:p>
+                      <a:pPr algn="ctr"/>
+                      <a:r>
+                        <a:rPr lang="en-GB" dirty="0" smtClean="0">
+                          <a:solidFill>
+                            <a:schemeClr val="bg1"/>
+                          </a:solidFill>
+                        </a:rPr>
+                        <a:t>Ask for OTS(false/true)</a:t>
+                      </a:r>
+                      <a:endParaRPr lang="en-GB" dirty="0">
+                        <a:solidFill>
+                          <a:schemeClr val="bg1"/>
+                        </a:solidFill>
+                      </a:endParaRPr>
+                    </a:p>
+                  </a:txBody>
+                  <a:tcPr anchor="ctr">
+                    <a:solidFill>
+                      <a:schemeClr val="tx1"/>
+                    </a:solidFill>
+                  </a:tcPr>
                 </a:tc>
                 <a:extLst>
                   <a:ext uri="{0D108BD9-81ED-4DB2-BD59-A6C34878D82A}">
@@ -11326,301 +11476,6 @@
           </a:p>
         </p:txBody>
       </p:sp>
-      <p:graphicFrame>
-        <p:nvGraphicFramePr>
-          <p:cNvPr id="3" name="Table 9">
-            <a:extLst>
-              <a:ext uri="{FF2B5EF4-FFF2-40B4-BE49-F238E27FC236}">
-                <a16:creationId xmlns:a16="http://schemas.microsoft.com/office/drawing/2014/main" id="{9D1E50DD-A0A6-406D-8B9C-1C41C027B4E9}"/>
-              </a:ext>
-            </a:extLst>
-          </p:cNvPr>
-          <p:cNvGraphicFramePr>
-            <a:graphicFrameLocks noGrp="1"/>
-          </p:cNvGraphicFramePr>
-          <p:nvPr>
-            <p:extLst>
-              <p:ext uri="{D42A27DB-BD31-4B8C-83A1-F6EECF244321}">
-                <p14:modId xmlns:p14="http://schemas.microsoft.com/office/powerpoint/2010/main" val="1458794295"/>
-              </p:ext>
-            </p:extLst>
-          </p:nvPr>
-        </p:nvGraphicFramePr>
-        <p:xfrm>
-          <a:off x="296548" y="4513089"/>
-          <a:ext cx="9941961" cy="914400"/>
-        </p:xfrm>
-        <a:graphic>
-          <a:graphicData uri="http://schemas.openxmlformats.org/drawingml/2006/table">
-            <a:tbl>
-              <a:tblPr firstRow="1" bandRow="1">
-                <a:tableStyleId>{7DF18680-E054-41AD-8BC1-D1AEF772440D}</a:tableStyleId>
-              </a:tblPr>
-              <a:tblGrid>
-                <a:gridCol w="1242745">
-                  <a:extLst>
-                    <a:ext uri="{9D8B030D-6E8A-4147-A177-3AD203B41FA5}">
-                      <a16:colId xmlns:a16="http://schemas.microsoft.com/office/drawing/2014/main" val="201513916"/>
-                    </a:ext>
-                  </a:extLst>
-                </a:gridCol>
-                <a:gridCol w="1242745">
-                  <a:extLst>
-                    <a:ext uri="{9D8B030D-6E8A-4147-A177-3AD203B41FA5}">
-                      <a16:colId xmlns:a16="http://schemas.microsoft.com/office/drawing/2014/main" val="4160908569"/>
-                    </a:ext>
-                  </a:extLst>
-                </a:gridCol>
-                <a:gridCol w="1242745">
-                  <a:extLst>
-                    <a:ext uri="{9D8B030D-6E8A-4147-A177-3AD203B41FA5}">
-                      <a16:colId xmlns:a16="http://schemas.microsoft.com/office/drawing/2014/main" val="3835503643"/>
-                    </a:ext>
-                  </a:extLst>
-                </a:gridCol>
-                <a:gridCol w="1242745">
-                  <a:extLst>
-                    <a:ext uri="{9D8B030D-6E8A-4147-A177-3AD203B41FA5}">
-                      <a16:colId xmlns:a16="http://schemas.microsoft.com/office/drawing/2014/main" val="1590507565"/>
-                    </a:ext>
-                  </a:extLst>
-                </a:gridCol>
-                <a:gridCol w="1242745">
-                  <a:extLst>
-                    <a:ext uri="{9D8B030D-6E8A-4147-A177-3AD203B41FA5}">
-                      <a16:colId xmlns:a16="http://schemas.microsoft.com/office/drawing/2014/main" val="3183350773"/>
-                    </a:ext>
-                  </a:extLst>
-                </a:gridCol>
-                <a:gridCol w="1242745">
-                  <a:extLst>
-                    <a:ext uri="{9D8B030D-6E8A-4147-A177-3AD203B41FA5}">
-                      <a16:colId xmlns:a16="http://schemas.microsoft.com/office/drawing/2014/main" val="943213032"/>
-                    </a:ext>
-                  </a:extLst>
-                </a:gridCol>
-                <a:gridCol w="808154">
-                  <a:extLst>
-                    <a:ext uri="{9D8B030D-6E8A-4147-A177-3AD203B41FA5}">
-                      <a16:colId xmlns:a16="http://schemas.microsoft.com/office/drawing/2014/main" val="1851729959"/>
-                    </a:ext>
-                  </a:extLst>
-                </a:gridCol>
-                <a:gridCol w="1677337">
-                  <a:extLst>
-                    <a:ext uri="{9D8B030D-6E8A-4147-A177-3AD203B41FA5}">
-                      <a16:colId xmlns:a16="http://schemas.microsoft.com/office/drawing/2014/main" val="3391271075"/>
-                    </a:ext>
-                  </a:extLst>
-                </a:gridCol>
-              </a:tblGrid>
-              <a:tr h="374469">
-                <a:tc>
-                  <a:txBody>
-                    <a:bodyPr/>
-                    <a:lstStyle/>
-                    <a:p>
-                      <a:pPr algn="ctr"/>
-                      <a:r>
-                        <a:rPr lang="en-GB" dirty="0">
-                          <a:solidFill>
-                            <a:sysClr val="windowText" lastClr="000000"/>
-                          </a:solidFill>
-                        </a:rPr>
-                        <a:t>UDR</a:t>
-                      </a:r>
-                    </a:p>
-                  </a:txBody>
-                  <a:tcPr anchor="ctr">
-                    <a:solidFill>
-                      <a:schemeClr val="bg2"/>
-                    </a:solidFill>
-                  </a:tcPr>
-                </a:tc>
-                <a:tc>
-                  <a:txBody>
-                    <a:bodyPr/>
-                    <a:lstStyle/>
-                    <a:p>
-                      <a:pPr algn="ctr"/>
-                      <a:r>
-                        <a:rPr lang="en-GB" dirty="0"/>
-                        <a:t>UDR ID</a:t>
-                      </a:r>
-                    </a:p>
-                    <a:p>
-                      <a:pPr algn="ctr"/>
-                      <a:r>
-                        <a:rPr lang="en-GB" dirty="0"/>
-                        <a:t>(PK)</a:t>
-                      </a:r>
-                    </a:p>
-                  </a:txBody>
-                  <a:tcPr anchor="ctr"/>
-                </a:tc>
-                <a:tc>
-                  <a:txBody>
-                    <a:bodyPr/>
-                    <a:lstStyle/>
-                    <a:p>
-                      <a:pPr algn="ctr"/>
-                      <a:r>
-                        <a:rPr lang="en-GB" dirty="0"/>
-                        <a:t>CDR</a:t>
-                      </a:r>
-                    </a:p>
-                    <a:p>
-                      <a:pPr algn="ctr"/>
-                      <a:r>
-                        <a:rPr lang="en-GB" dirty="0"/>
-                        <a:t>Number</a:t>
-                      </a:r>
-                    </a:p>
-                    <a:p>
-                      <a:pPr algn="ctr"/>
-                      <a:r>
-                        <a:rPr lang="en-GB" dirty="0" smtClean="0"/>
-                        <a:t>(FK</a:t>
-                      </a:r>
-                      <a:r>
-                        <a:rPr lang="en-GB" dirty="0"/>
-                        <a:t>)</a:t>
-                      </a:r>
-                    </a:p>
-                  </a:txBody>
-                  <a:tcPr anchor="ctr">
-                    <a:solidFill>
-                      <a:srgbClr val="FF0000"/>
-                    </a:solidFill>
-                  </a:tcPr>
-                </a:tc>
-                <a:tc>
-                  <a:txBody>
-                    <a:bodyPr/>
-                    <a:lstStyle/>
-                    <a:p>
-                      <a:pPr algn="ctr"/>
-                      <a:r>
-                        <a:rPr lang="en-GB" dirty="0" smtClean="0"/>
-                        <a:t>Profile</a:t>
-                      </a:r>
-                      <a:r>
-                        <a:rPr lang="en-GB" baseline="0" dirty="0" smtClean="0"/>
-                        <a:t> </a:t>
-                      </a:r>
-                      <a:r>
-                        <a:rPr lang="en-GB" dirty="0" smtClean="0"/>
-                        <a:t>ID</a:t>
-                      </a:r>
-                      <a:endParaRPr lang="en-GB" dirty="0"/>
-                    </a:p>
-                    <a:p>
-                      <a:pPr algn="ctr"/>
-                      <a:r>
-                        <a:rPr lang="en-GB" dirty="0" smtClean="0"/>
-                        <a:t>(FK</a:t>
-                      </a:r>
-                      <a:r>
-                        <a:rPr lang="en-GB" dirty="0"/>
-                        <a:t>)</a:t>
-                      </a:r>
-                    </a:p>
-                  </a:txBody>
-                  <a:tcPr anchor="ctr"/>
-                </a:tc>
-                <a:tc>
-                  <a:txBody>
-                    <a:bodyPr/>
-                    <a:lstStyle/>
-                    <a:p>
-                      <a:pPr algn="ctr"/>
-                      <a:r>
-                        <a:rPr lang="en-GB" dirty="0" err="1" smtClean="0"/>
-                        <a:t>DialA</a:t>
-                      </a:r>
-                      <a:endParaRPr lang="en-GB" dirty="0" smtClean="0"/>
-                    </a:p>
-                    <a:p>
-                      <a:pPr algn="ctr"/>
-                      <a:r>
-                        <a:rPr lang="en-GB" dirty="0" err="1" smtClean="0"/>
-                        <a:t>Fk</a:t>
-                      </a:r>
-                      <a:endParaRPr lang="en-GB" dirty="0"/>
-                    </a:p>
-                  </a:txBody>
-                  <a:tcPr anchor="ctr">
-                    <a:solidFill>
-                      <a:srgbClr val="FF0000"/>
-                    </a:solidFill>
-                  </a:tcPr>
-                </a:tc>
-                <a:tc>
-                  <a:txBody>
-                    <a:bodyPr/>
-                    <a:lstStyle/>
-                    <a:p>
-                      <a:pPr algn="ctr"/>
-                      <a:r>
-                        <a:rPr lang="en-GB" dirty="0" err="1"/>
-                        <a:t>Has_FreeUnit</a:t>
-                      </a:r>
-                      <a:endParaRPr lang="en-GB" dirty="0"/>
-                    </a:p>
-                  </a:txBody>
-                  <a:tcPr anchor="ctr"/>
-                </a:tc>
-                <a:tc>
-                  <a:txBody>
-                    <a:bodyPr/>
-                    <a:lstStyle/>
-                    <a:p>
-                      <a:pPr algn="ctr"/>
-                      <a:r>
-                        <a:rPr lang="en-GB" dirty="0" smtClean="0"/>
-                        <a:t>Cost</a:t>
-                      </a:r>
-                    </a:p>
-                    <a:p>
-                      <a:pPr algn="ctr"/>
-                      <a:r>
-                        <a:rPr lang="en-GB" dirty="0" smtClean="0"/>
-                        <a:t>(float)</a:t>
-                      </a:r>
-                      <a:endParaRPr lang="en-GB" dirty="0"/>
-                    </a:p>
-                  </a:txBody>
-                  <a:tcPr anchor="ctr">
-                    <a:solidFill>
-                      <a:srgbClr val="FF0000"/>
-                    </a:solidFill>
-                  </a:tcPr>
-                </a:tc>
-                <a:tc>
-                  <a:txBody>
-                    <a:bodyPr/>
-                    <a:lstStyle/>
-                    <a:p>
-                      <a:pPr algn="ctr"/>
-                      <a:r>
-                        <a:rPr lang="en-GB" dirty="0" err="1" smtClean="0"/>
-                        <a:t>StartDate</a:t>
-                      </a:r>
-                      <a:endParaRPr lang="en-GB" dirty="0"/>
-                    </a:p>
-                  </a:txBody>
-                  <a:tcPr anchor="ctr"/>
-                </a:tc>
-                <a:extLst>
-                  <a:ext uri="{0D108BD9-81ED-4DB2-BD59-A6C34878D82A}">
-                    <a16:rowId xmlns:a16="http://schemas.microsoft.com/office/drawing/2014/main" val="3577827613"/>
-                  </a:ext>
-                </a:extLst>
-              </a:tr>
-            </a:tbl>
-          </a:graphicData>
-        </a:graphic>
-      </p:graphicFrame>
       <p:graphicFrame>
         <p:nvGraphicFramePr>
           <p:cNvPr id="5" name="Table 9">
@@ -11932,14 +11787,14 @@
           <p:nvPr>
             <p:extLst>
               <p:ext uri="{D42A27DB-BD31-4B8C-83A1-F6EECF244321}">
-                <p14:modId xmlns:p14="http://schemas.microsoft.com/office/powerpoint/2010/main" val="4112999811"/>
+                <p14:modId xmlns:p14="http://schemas.microsoft.com/office/powerpoint/2010/main" val="2092860283"/>
               </p:ext>
             </p:extLst>
           </p:nvPr>
         </p:nvGraphicFramePr>
         <p:xfrm>
-          <a:off x="296548" y="1872934"/>
-          <a:ext cx="11309420" cy="731520"/>
+          <a:off x="296548" y="944592"/>
+          <a:ext cx="11309420" cy="944880"/>
         </p:xfrm>
         <a:graphic>
           <a:graphicData uri="http://schemas.openxmlformats.org/drawingml/2006/table">
@@ -12124,9 +11979,17 @@
                     <a:p>
                       <a:pPr algn="ctr"/>
                       <a:r>
-                        <a:rPr lang="en-US" altLang="en-US" sz="1400" dirty="0"/>
+                        <a:rPr lang="en-US" altLang="en-US" sz="1400" dirty="0" smtClean="0"/>
                         <a:t>Duration</a:t>
                       </a:r>
+                    </a:p>
+                    <a:p>
+                      <a:pPr algn="ctr"/>
+                      <a:r>
+                        <a:rPr lang="en-US" altLang="en-US" sz="1400" dirty="0" smtClean="0"/>
+                        <a:t>(sec)</a:t>
+                      </a:r>
+                      <a:endParaRPr lang="en-US" altLang="en-US" sz="1400" dirty="0"/>
                     </a:p>
                     <a:p>
                       <a:pPr algn="ctr"/>
@@ -12312,14 +12175,14 @@
           <p:nvPr>
             <p:extLst>
               <p:ext uri="{D42A27DB-BD31-4B8C-83A1-F6EECF244321}">
-                <p14:modId xmlns:p14="http://schemas.microsoft.com/office/powerpoint/2010/main" val="2792032822"/>
+                <p14:modId xmlns:p14="http://schemas.microsoft.com/office/powerpoint/2010/main" val="1841071091"/>
               </p:ext>
             </p:extLst>
           </p:nvPr>
         </p:nvGraphicFramePr>
         <p:xfrm>
-          <a:off x="296548" y="2839721"/>
-          <a:ext cx="11604502" cy="1188720"/>
+          <a:off x="283511" y="2016646"/>
+          <a:ext cx="11624978" cy="1265729"/>
         </p:xfrm>
         <a:graphic>
           <a:graphicData uri="http://schemas.openxmlformats.org/drawingml/2006/table">
@@ -12342,14 +12205,14 @@
                     </a:ext>
                   </a:extLst>
                 </a:gridCol>
-                <a:gridCol w="892654">
+                <a:gridCol w="910726">
                   <a:extLst>
                     <a:ext uri="{9D8B030D-6E8A-4147-A177-3AD203B41FA5}">
                       <a16:colId xmlns:a16="http://schemas.microsoft.com/office/drawing/2014/main" val="3990853779"/>
                     </a:ext>
                   </a:extLst>
                 </a:gridCol>
-                <a:gridCol w="892654">
+                <a:gridCol w="874582">
                   <a:extLst>
                     <a:ext uri="{9D8B030D-6E8A-4147-A177-3AD203B41FA5}">
                       <a16:colId xmlns:a16="http://schemas.microsoft.com/office/drawing/2014/main" val="4160908569"/>
@@ -12398,7 +12261,7 @@
                     </a:ext>
                   </a:extLst>
                 </a:gridCol>
-                <a:gridCol w="892654">
+                <a:gridCol w="913130">
                   <a:extLst>
                     <a:ext uri="{9D8B030D-6E8A-4147-A177-3AD203B41FA5}">
                       <a16:colId xmlns:a16="http://schemas.microsoft.com/office/drawing/2014/main" val="2548652607"/>
@@ -12420,7 +12283,7 @@
                   </a:extLst>
                 </a:gridCol>
               </a:tblGrid>
-              <a:tr h="374469">
+              <a:tr h="1265729">
                 <a:tc>
                   <a:txBody>
                     <a:bodyPr/>
@@ -12549,8 +12412,13 @@
                       <a:pPr algn="ctr"/>
                       <a:r>
                         <a:rPr lang="en-GB" sz="1800" dirty="0"/>
-                        <a:t>Service ID</a:t>
-                      </a:r>
+                        <a:t>Service </a:t>
+                      </a:r>
+                      <a:r>
+                        <a:rPr lang="en-GB" sz="1800" dirty="0" smtClean="0"/>
+                        <a:t>ID(FK)</a:t>
+                      </a:r>
+                      <a:endParaRPr lang="en-GB" sz="1800" dirty="0"/>
                     </a:p>
                   </a:txBody>
                   <a:tcPr anchor="ctr"/>
@@ -12562,9 +12430,17 @@
                     <a:p>
                       <a:pPr algn="ctr"/>
                       <a:r>
-                        <a:rPr lang="en-US" altLang="en-US" sz="1400" dirty="0"/>
+                        <a:rPr lang="en-US" altLang="en-US" sz="1400" dirty="0" smtClean="0"/>
                         <a:t>Duration</a:t>
                       </a:r>
+                    </a:p>
+                    <a:p>
+                      <a:pPr algn="ctr"/>
+                      <a:r>
+                        <a:rPr lang="en-US" altLang="en-US" sz="1400" dirty="0" smtClean="0"/>
+                        <a:t>(sec)</a:t>
+                      </a:r>
+                      <a:endParaRPr lang="en-US" altLang="en-US" sz="1400" dirty="0"/>
                     </a:p>
                     <a:p>
                       <a:pPr algn="ctr"/>
@@ -12760,6 +12636,282 @@
                 <a:extLst>
                   <a:ext uri="{0D108BD9-81ED-4DB2-BD59-A6C34878D82A}">
                     <a16:rowId xmlns:a16="http://schemas.microsoft.com/office/drawing/2014/main" val="3577827613"/>
+                  </a:ext>
+                </a:extLst>
+              </a:tr>
+            </a:tbl>
+          </a:graphicData>
+        </a:graphic>
+      </p:graphicFrame>
+      <p:graphicFrame>
+        <p:nvGraphicFramePr>
+          <p:cNvPr id="10" name="Table 9"/>
+          <p:cNvGraphicFramePr>
+            <a:graphicFrameLocks noGrp="1"/>
+          </p:cNvGraphicFramePr>
+          <p:nvPr>
+            <p:extLst>
+              <p:ext uri="{D42A27DB-BD31-4B8C-83A1-F6EECF244321}">
+                <p14:modId xmlns:p14="http://schemas.microsoft.com/office/powerpoint/2010/main" val="1998053836"/>
+              </p:ext>
+            </p:extLst>
+          </p:nvPr>
+        </p:nvGraphicFramePr>
+        <p:xfrm>
+          <a:off x="400202" y="3481015"/>
+          <a:ext cx="11102112" cy="914400"/>
+        </p:xfrm>
+        <a:graphic>
+          <a:graphicData uri="http://schemas.openxmlformats.org/drawingml/2006/table">
+            <a:tbl>
+              <a:tblPr firstRow="1" bandRow="1">
+                <a:tableStyleId>{5C22544A-7EE6-4342-B048-85BDC9FD1C3A}</a:tableStyleId>
+              </a:tblPr>
+              <a:tblGrid>
+                <a:gridCol w="710089">
+                  <a:extLst>
+                    <a:ext uri="{9D8B030D-6E8A-4147-A177-3AD203B41FA5}">
+                      <a16:colId xmlns:a16="http://schemas.microsoft.com/office/drawing/2014/main" val="4251094841"/>
+                    </a:ext>
+                  </a:extLst>
+                </a:gridCol>
+                <a:gridCol w="1308476">
+                  <a:extLst>
+                    <a:ext uri="{9D8B030D-6E8A-4147-A177-3AD203B41FA5}">
+                      <a16:colId xmlns:a16="http://schemas.microsoft.com/office/drawing/2014/main" val="1610645073"/>
+                    </a:ext>
+                  </a:extLst>
+                </a:gridCol>
+                <a:gridCol w="1009283">
+                  <a:extLst>
+                    <a:ext uri="{9D8B030D-6E8A-4147-A177-3AD203B41FA5}">
+                      <a16:colId xmlns:a16="http://schemas.microsoft.com/office/drawing/2014/main" val="3836028896"/>
+                    </a:ext>
+                  </a:extLst>
+                </a:gridCol>
+                <a:gridCol w="1009283">
+                  <a:extLst>
+                    <a:ext uri="{9D8B030D-6E8A-4147-A177-3AD203B41FA5}">
+                      <a16:colId xmlns:a16="http://schemas.microsoft.com/office/drawing/2014/main" val="1935004993"/>
+                    </a:ext>
+                  </a:extLst>
+                </a:gridCol>
+                <a:gridCol w="1009283">
+                  <a:extLst>
+                    <a:ext uri="{9D8B030D-6E8A-4147-A177-3AD203B41FA5}">
+                      <a16:colId xmlns:a16="http://schemas.microsoft.com/office/drawing/2014/main" val="3423328262"/>
+                    </a:ext>
+                  </a:extLst>
+                </a:gridCol>
+                <a:gridCol w="1009283">
+                  <a:extLst>
+                    <a:ext uri="{9D8B030D-6E8A-4147-A177-3AD203B41FA5}">
+                      <a16:colId xmlns:a16="http://schemas.microsoft.com/office/drawing/2014/main" val="1628423275"/>
+                    </a:ext>
+                  </a:extLst>
+                </a:gridCol>
+                <a:gridCol w="1009283">
+                  <a:extLst>
+                    <a:ext uri="{9D8B030D-6E8A-4147-A177-3AD203B41FA5}">
+                      <a16:colId xmlns:a16="http://schemas.microsoft.com/office/drawing/2014/main" val="2342477985"/>
+                    </a:ext>
+                  </a:extLst>
+                </a:gridCol>
+                <a:gridCol w="1009283">
+                  <a:extLst>
+                    <a:ext uri="{9D8B030D-6E8A-4147-A177-3AD203B41FA5}">
+                      <a16:colId xmlns:a16="http://schemas.microsoft.com/office/drawing/2014/main" val="1261026011"/>
+                    </a:ext>
+                  </a:extLst>
+                </a:gridCol>
+                <a:gridCol w="1009283">
+                  <a:extLst>
+                    <a:ext uri="{9D8B030D-6E8A-4147-A177-3AD203B41FA5}">
+                      <a16:colId xmlns:a16="http://schemas.microsoft.com/office/drawing/2014/main" val="331378307"/>
+                    </a:ext>
+                  </a:extLst>
+                </a:gridCol>
+                <a:gridCol w="1009283">
+                  <a:extLst>
+                    <a:ext uri="{9D8B030D-6E8A-4147-A177-3AD203B41FA5}">
+                      <a16:colId xmlns:a16="http://schemas.microsoft.com/office/drawing/2014/main" val="3247464116"/>
+                    </a:ext>
+                  </a:extLst>
+                </a:gridCol>
+                <a:gridCol w="1009283">
+                  <a:extLst>
+                    <a:ext uri="{9D8B030D-6E8A-4147-A177-3AD203B41FA5}">
+                      <a16:colId xmlns:a16="http://schemas.microsoft.com/office/drawing/2014/main" val="2154436256"/>
+                    </a:ext>
+                  </a:extLst>
+                </a:gridCol>
+              </a:tblGrid>
+              <a:tr h="370840">
+                <a:tc>
+                  <a:txBody>
+                    <a:bodyPr/>
+                    <a:lstStyle/>
+                    <a:p>
+                      <a:r>
+                        <a:rPr lang="en-US" dirty="0" err="1" smtClean="0"/>
+                        <a:t>Bill_id</a:t>
+                      </a:r>
+                      <a:endParaRPr lang="en-US" dirty="0"/>
+                    </a:p>
+                  </a:txBody>
+                  <a:tcPr/>
+                </a:tc>
+                <a:tc>
+                  <a:txBody>
+                    <a:bodyPr/>
+                    <a:lstStyle/>
+                    <a:p>
+                      <a:r>
+                        <a:rPr lang="en-US" dirty="0" err="1" smtClean="0"/>
+                        <a:t>customerName</a:t>
+                      </a:r>
+                      <a:endParaRPr lang="en-US" dirty="0"/>
+                    </a:p>
+                  </a:txBody>
+                  <a:tcPr/>
+                </a:tc>
+                <a:tc>
+                  <a:txBody>
+                    <a:bodyPr/>
+                    <a:lstStyle/>
+                    <a:p>
+                      <a:r>
+                        <a:rPr lang="en-US" dirty="0" smtClean="0"/>
+                        <a:t>Address</a:t>
+                      </a:r>
+                      <a:endParaRPr lang="en-US" dirty="0"/>
+                    </a:p>
+                  </a:txBody>
+                  <a:tcPr/>
+                </a:tc>
+                <a:tc>
+                  <a:txBody>
+                    <a:bodyPr/>
+                    <a:lstStyle/>
+                    <a:p>
+                      <a:r>
+                        <a:rPr lang="en-US" dirty="0" err="1" smtClean="0"/>
+                        <a:t>profileFees</a:t>
+                      </a:r>
+                      <a:endParaRPr lang="en-US" dirty="0"/>
+                    </a:p>
+                  </a:txBody>
+                  <a:tcPr/>
+                </a:tc>
+                <a:tc>
+                  <a:txBody>
+                    <a:bodyPr/>
+                    <a:lstStyle/>
+                    <a:p>
+                      <a:r>
+                        <a:rPr lang="en-US" dirty="0" err="1" smtClean="0"/>
+                        <a:t>OneTimeFees</a:t>
+                      </a:r>
+                      <a:endParaRPr lang="en-US" dirty="0"/>
+                    </a:p>
+                  </a:txBody>
+                  <a:tcPr/>
+                </a:tc>
+                <a:tc>
+                  <a:txBody>
+                    <a:bodyPr/>
+                    <a:lstStyle/>
+                    <a:p>
+                      <a:r>
+                        <a:rPr lang="en-US" dirty="0" err="1" smtClean="0"/>
+                        <a:t>Reccuring</a:t>
+                      </a:r>
+                      <a:r>
+                        <a:rPr lang="en-US" dirty="0" smtClean="0"/>
+                        <a:t> fees</a:t>
+                      </a:r>
+                      <a:endParaRPr lang="en-US" dirty="0"/>
+                    </a:p>
+                  </a:txBody>
+                  <a:tcPr/>
+                </a:tc>
+                <a:tc>
+                  <a:txBody>
+                    <a:bodyPr/>
+                    <a:lstStyle/>
+                    <a:p>
+                      <a:r>
+                        <a:rPr lang="en-US" dirty="0" err="1" smtClean="0"/>
+                        <a:t>TotalVoice</a:t>
+                      </a:r>
+                      <a:r>
+                        <a:rPr lang="en-US" dirty="0" smtClean="0"/>
+                        <a:t> Cost</a:t>
+                      </a:r>
+                      <a:endParaRPr lang="en-US" dirty="0"/>
+                    </a:p>
+                  </a:txBody>
+                  <a:tcPr/>
+                </a:tc>
+                <a:tc>
+                  <a:txBody>
+                    <a:bodyPr/>
+                    <a:lstStyle/>
+                    <a:p>
+                      <a:r>
+                        <a:rPr lang="en-US" dirty="0" smtClean="0"/>
+                        <a:t>Total SMS cost</a:t>
+                      </a:r>
+                      <a:endParaRPr lang="en-US" dirty="0"/>
+                    </a:p>
+                  </a:txBody>
+                  <a:tcPr/>
+                </a:tc>
+                <a:tc>
+                  <a:txBody>
+                    <a:bodyPr/>
+                    <a:lstStyle/>
+                    <a:p>
+                      <a:r>
+                        <a:rPr lang="en-US" dirty="0" smtClean="0"/>
+                        <a:t>Total Data Cost </a:t>
+                      </a:r>
+                      <a:endParaRPr lang="en-US" dirty="0"/>
+                    </a:p>
+                  </a:txBody>
+                  <a:tcPr/>
+                </a:tc>
+                <a:tc>
+                  <a:txBody>
+                    <a:bodyPr/>
+                    <a:lstStyle/>
+                    <a:p>
+                      <a:r>
+                        <a:rPr lang="en-US" dirty="0" err="1" smtClean="0"/>
+                        <a:t>Taxs</a:t>
+                      </a:r>
+                      <a:endParaRPr lang="en-US" dirty="0"/>
+                    </a:p>
+                  </a:txBody>
+                  <a:tcPr/>
+                </a:tc>
+                <a:tc>
+                  <a:txBody>
+                    <a:bodyPr/>
+                    <a:lstStyle/>
+                    <a:p>
+                      <a:r>
+                        <a:rPr lang="en-US" dirty="0" smtClean="0"/>
+                        <a:t>Total Invoice </a:t>
+                      </a:r>
+                      <a:endParaRPr lang="en-US" dirty="0"/>
+                    </a:p>
+                  </a:txBody>
+                  <a:tcPr/>
+                </a:tc>
+                <a:extLst>
+                  <a:ext uri="{0D108BD9-81ED-4DB2-BD59-A6C34878D82A}">
+                    <a16:rowId xmlns:a16="http://schemas.microsoft.com/office/drawing/2014/main" val="1251800219"/>
                   </a:ext>
                 </a:extLst>
               </a:tr>
@@ -12781,6 +12933,895 @@
 </file>
 
 <file path=ppt/slides/slide7.xml><?xml version="1.0" encoding="utf-8"?>
+<p:sld xmlns:a="http://schemas.openxmlformats.org/drawingml/2006/main" xmlns:r="http://schemas.openxmlformats.org/officeDocument/2006/relationships" xmlns:p="http://schemas.openxmlformats.org/presentationml/2006/main">
+  <p:cSld>
+    <p:spTree>
+      <p:nvGrpSpPr>
+        <p:cNvPr id="1" name=""/>
+        <p:cNvGrpSpPr/>
+        <p:nvPr/>
+      </p:nvGrpSpPr>
+      <p:grpSpPr>
+        <a:xfrm>
+          <a:off x="0" y="0"/>
+          <a:ext cx="0" cy="0"/>
+          <a:chOff x="0" y="0"/>
+          <a:chExt cx="0" cy="0"/>
+        </a:xfrm>
+      </p:grpSpPr>
+      <p:sp>
+        <p:nvSpPr>
+          <p:cNvPr id="3" name="TextBox 2"/>
+          <p:cNvSpPr txBox="1"/>
+          <p:nvPr/>
+        </p:nvSpPr>
+        <p:spPr>
+          <a:xfrm flipH="1">
+            <a:off x="512618" y="374073"/>
+            <a:ext cx="11263746" cy="5355312"/>
+          </a:xfrm>
+          <a:prstGeom prst="rect">
+            <a:avLst/>
+          </a:prstGeom>
+          <a:noFill/>
+        </p:spPr>
+        <p:txBody>
+          <a:bodyPr wrap="square" rtlCol="0">
+            <a:spAutoFit/>
+          </a:bodyPr>
+          <a:lstStyle/>
+          <a:p>
+            <a:r>
+              <a:rPr lang="en-US" dirty="0" smtClean="0">
+                <a:solidFill>
+                  <a:srgbClr val="FF0000"/>
+                </a:solidFill>
+                <a:sym typeface="Wingdings" panose="05000000000000000000" pitchFamily="2" charset="2"/>
+              </a:rPr>
+              <a:t>c</a:t>
+            </a:r>
+            <a:r>
+              <a:rPr lang="en-US" dirty="0">
+                <a:solidFill>
+                  <a:srgbClr val="FF0000"/>
+                </a:solidFill>
+                <a:sym typeface="Wingdings" panose="05000000000000000000" pitchFamily="2" charset="2"/>
+              </a:rPr>
+              <a:t>) add </a:t>
+            </a:r>
+            <a:r>
+              <a:rPr lang="en-US" dirty="0" err="1">
+                <a:solidFill>
+                  <a:srgbClr val="FF0000"/>
+                </a:solidFill>
+                <a:sym typeface="Wingdings" panose="05000000000000000000" pitchFamily="2" charset="2"/>
+              </a:rPr>
+              <a:t>Reccuring</a:t>
+            </a:r>
+            <a:r>
+              <a:rPr lang="en-US" dirty="0">
+                <a:solidFill>
+                  <a:srgbClr val="FF0000"/>
+                </a:solidFill>
+                <a:sym typeface="Wingdings" panose="05000000000000000000" pitchFamily="2" charset="2"/>
+              </a:rPr>
+              <a:t> and </a:t>
+            </a:r>
+            <a:r>
+              <a:rPr lang="en-US" dirty="0">
+                <a:solidFill>
+                  <a:srgbClr val="FF0000"/>
+                </a:solidFill>
+              </a:rPr>
+              <a:t>1)Total Voice cost / customer </a:t>
+            </a:r>
+            <a:r>
+              <a:rPr lang="en-US" dirty="0" err="1">
+                <a:solidFill>
+                  <a:srgbClr val="FF0000"/>
+                </a:solidFill>
+              </a:rPr>
+              <a:t>dialA</a:t>
+            </a:r>
+            <a:r>
+              <a:rPr lang="en-US" dirty="0">
+                <a:solidFill>
+                  <a:srgbClr val="FF0000"/>
+                </a:solidFill>
+              </a:rPr>
+              <a:t>    -    Total Data cost / customer </a:t>
+            </a:r>
+            <a:r>
+              <a:rPr lang="en-US" dirty="0" err="1">
+                <a:solidFill>
+                  <a:srgbClr val="FF0000"/>
+                </a:solidFill>
+              </a:rPr>
+              <a:t>dialA</a:t>
+            </a:r>
+            <a:r>
+              <a:rPr lang="en-US" dirty="0">
+                <a:solidFill>
+                  <a:srgbClr val="FF0000"/>
+                </a:solidFill>
+              </a:rPr>
+              <a:t>     -   Total SMS cost / customer </a:t>
+            </a:r>
+            <a:r>
+              <a:rPr lang="en-US" dirty="0" err="1">
+                <a:solidFill>
+                  <a:srgbClr val="FF0000"/>
+                </a:solidFill>
+              </a:rPr>
+              <a:t>dialA</a:t>
+            </a:r>
+            <a:endParaRPr lang="en-US" dirty="0">
+              <a:solidFill>
+                <a:srgbClr val="FF0000"/>
+              </a:solidFill>
+            </a:endParaRPr>
+          </a:p>
+          <a:p>
+            <a:endParaRPr lang="en-US" dirty="0" smtClean="0">
+              <a:solidFill>
+                <a:srgbClr val="FF0000"/>
+              </a:solidFill>
+              <a:sym typeface="Wingdings" panose="05000000000000000000" pitchFamily="2" charset="2"/>
+            </a:endParaRPr>
+          </a:p>
+          <a:p>
+            <a:r>
+              <a:rPr lang="en-US" dirty="0" smtClean="0">
+                <a:solidFill>
+                  <a:srgbClr val="FFC000"/>
+                </a:solidFill>
+                <a:sym typeface="Wingdings" panose="05000000000000000000" pitchFamily="2" charset="2"/>
+              </a:rPr>
+              <a:t>d)one-Time </a:t>
+            </a:r>
+            <a:r>
+              <a:rPr lang="en-US" dirty="0">
+                <a:solidFill>
+                  <a:srgbClr val="FFC000"/>
+                </a:solidFill>
+                <a:sym typeface="Wingdings" panose="05000000000000000000" pitchFamily="2" charset="2"/>
+              </a:rPr>
+              <a:t>fees  separated/same </a:t>
+            </a:r>
+            <a:r>
+              <a:rPr lang="en-US" dirty="0" smtClean="0">
+                <a:solidFill>
+                  <a:srgbClr val="FFC000"/>
+                </a:solidFill>
+                <a:sym typeface="Wingdings" panose="05000000000000000000" pitchFamily="2" charset="2"/>
+              </a:rPr>
+              <a:t>class</a:t>
+            </a:r>
+          </a:p>
+          <a:p>
+            <a:endParaRPr lang="en-US" dirty="0">
+              <a:solidFill>
+                <a:srgbClr val="FFC000"/>
+              </a:solidFill>
+              <a:sym typeface="Wingdings" panose="05000000000000000000" pitchFamily="2" charset="2"/>
+            </a:endParaRPr>
+          </a:p>
+          <a:p>
+            <a:r>
+              <a:rPr lang="en-US" dirty="0">
+                <a:sym typeface="Wingdings" panose="05000000000000000000" pitchFamily="2" charset="2"/>
+              </a:rPr>
+              <a:t>e</a:t>
+            </a:r>
+            <a:r>
+              <a:rPr lang="en-US" dirty="0" smtClean="0">
+                <a:sym typeface="Wingdings" panose="05000000000000000000" pitchFamily="2" charset="2"/>
+              </a:rPr>
+              <a:t>) </a:t>
+            </a:r>
+            <a:r>
+              <a:rPr lang="en-US" dirty="0">
+                <a:sym typeface="Wingdings" panose="05000000000000000000" pitchFamily="2" charset="2"/>
+              </a:rPr>
+              <a:t>add </a:t>
+            </a:r>
+            <a:r>
+              <a:rPr lang="en-US" dirty="0" err="1">
+                <a:sym typeface="Wingdings" panose="05000000000000000000" pitchFamily="2" charset="2"/>
+              </a:rPr>
+              <a:t>Taxs</a:t>
+            </a:r>
+            <a:r>
+              <a:rPr lang="en-US" dirty="0">
+                <a:sym typeface="Wingdings" panose="05000000000000000000" pitchFamily="2" charset="2"/>
+              </a:rPr>
+              <a:t>  same </a:t>
+            </a:r>
+            <a:r>
+              <a:rPr lang="en-US" dirty="0" smtClean="0">
+                <a:sym typeface="Wingdings" panose="05000000000000000000" pitchFamily="2" charset="2"/>
+              </a:rPr>
+              <a:t>class -------- Invoice  </a:t>
+            </a:r>
+            <a:endParaRPr lang="en-US" dirty="0">
+              <a:sym typeface="Wingdings" panose="05000000000000000000" pitchFamily="2" charset="2"/>
+            </a:endParaRPr>
+          </a:p>
+          <a:p>
+            <a:r>
+              <a:rPr lang="en-US" dirty="0" smtClean="0"/>
+              <a:t>/////////////////////////////////////////////////////////////////////////////////////////////////////////</a:t>
+            </a:r>
+          </a:p>
+          <a:p>
+            <a:r>
+              <a:rPr lang="en-US" dirty="0" smtClean="0"/>
+              <a:t>2)Java Class </a:t>
+            </a:r>
+            <a:r>
+              <a:rPr lang="en-US" b="1" dirty="0" smtClean="0">
+                <a:solidFill>
+                  <a:srgbClr val="FF0000"/>
+                </a:solidFill>
+              </a:rPr>
+              <a:t>bill Sheet generation </a:t>
+            </a:r>
+            <a:r>
+              <a:rPr lang="en-US" dirty="0" smtClean="0">
+                <a:sym typeface="Wingdings" panose="05000000000000000000" pitchFamily="2" charset="2"/>
+              </a:rPr>
+              <a:t> list Customers  for </a:t>
+            </a:r>
+            <a:r>
+              <a:rPr lang="en-US" dirty="0" err="1" smtClean="0">
+                <a:sym typeface="Wingdings" panose="05000000000000000000" pitchFamily="2" charset="2"/>
+              </a:rPr>
+              <a:t>eachone</a:t>
+            </a:r>
+            <a:endParaRPr lang="en-US" dirty="0" smtClean="0">
+              <a:sym typeface="Wingdings" panose="05000000000000000000" pitchFamily="2" charset="2"/>
+            </a:endParaRPr>
+          </a:p>
+          <a:p>
+            <a:r>
+              <a:rPr lang="en-US" dirty="0" smtClean="0">
+                <a:sym typeface="Wingdings" panose="05000000000000000000" pitchFamily="2" charset="2"/>
+              </a:rPr>
+              <a:t>	a)order </a:t>
+            </a:r>
+            <a:r>
+              <a:rPr lang="en-US" dirty="0" err="1" smtClean="0">
+                <a:sym typeface="Wingdings" panose="05000000000000000000" pitchFamily="2" charset="2"/>
+              </a:rPr>
+              <a:t>udrs</a:t>
+            </a:r>
+            <a:r>
+              <a:rPr lang="en-US" dirty="0" smtClean="0">
+                <a:sym typeface="Wingdings" panose="05000000000000000000" pitchFamily="2" charset="2"/>
+              </a:rPr>
+              <a:t> / specific month </a:t>
+            </a:r>
+          </a:p>
+          <a:p>
+            <a:r>
+              <a:rPr lang="en-US" dirty="0">
+                <a:sym typeface="Wingdings" panose="05000000000000000000" pitchFamily="2" charset="2"/>
+              </a:rPr>
+              <a:t>	</a:t>
+            </a:r>
+            <a:r>
+              <a:rPr lang="en-US" dirty="0" smtClean="0">
+                <a:sym typeface="Wingdings" panose="05000000000000000000" pitchFamily="2" charset="2"/>
+              </a:rPr>
+              <a:t>b)call </a:t>
+            </a:r>
+            <a:r>
+              <a:rPr lang="en-US" dirty="0" err="1" smtClean="0">
+                <a:sym typeface="Wingdings" panose="05000000000000000000" pitchFamily="2" charset="2"/>
+              </a:rPr>
+              <a:t>freeUnit</a:t>
+            </a:r>
+            <a:r>
+              <a:rPr lang="en-US" dirty="0" smtClean="0">
+                <a:sym typeface="Wingdings" panose="05000000000000000000" pitchFamily="2" charset="2"/>
+              </a:rPr>
+              <a:t> Voice class - to update </a:t>
+            </a:r>
+            <a:r>
+              <a:rPr lang="en-US" dirty="0" err="1" smtClean="0">
+                <a:sym typeface="Wingdings" panose="05000000000000000000" pitchFamily="2" charset="2"/>
+              </a:rPr>
+              <a:t>fus</a:t>
+            </a:r>
+            <a:r>
+              <a:rPr lang="en-US" dirty="0" smtClean="0">
+                <a:sym typeface="Wingdings" panose="05000000000000000000" pitchFamily="2" charset="2"/>
+              </a:rPr>
+              <a:t> and calculate cost for this service </a:t>
+            </a:r>
+          </a:p>
+          <a:p>
+            <a:r>
+              <a:rPr lang="en-US" dirty="0">
+                <a:sym typeface="Wingdings" panose="05000000000000000000" pitchFamily="2" charset="2"/>
+              </a:rPr>
+              <a:t>	</a:t>
+            </a:r>
+            <a:r>
+              <a:rPr lang="en-US" dirty="0" smtClean="0">
+                <a:sym typeface="Wingdings" panose="05000000000000000000" pitchFamily="2" charset="2"/>
+              </a:rPr>
+              <a:t>-call </a:t>
+            </a:r>
+            <a:r>
+              <a:rPr lang="en-US" dirty="0" err="1">
+                <a:sym typeface="Wingdings" panose="05000000000000000000" pitchFamily="2" charset="2"/>
+              </a:rPr>
+              <a:t>freeUnit</a:t>
+            </a:r>
+            <a:r>
+              <a:rPr lang="en-US" dirty="0">
+                <a:sym typeface="Wingdings" panose="05000000000000000000" pitchFamily="2" charset="2"/>
+              </a:rPr>
+              <a:t> </a:t>
+            </a:r>
+            <a:r>
+              <a:rPr lang="en-US" dirty="0" smtClean="0">
+                <a:sym typeface="Wingdings" panose="05000000000000000000" pitchFamily="2" charset="2"/>
+              </a:rPr>
+              <a:t>data </a:t>
+            </a:r>
+            <a:r>
+              <a:rPr lang="en-US" dirty="0">
+                <a:sym typeface="Wingdings" panose="05000000000000000000" pitchFamily="2" charset="2"/>
+              </a:rPr>
+              <a:t>class - to update </a:t>
+            </a:r>
+            <a:r>
+              <a:rPr lang="en-US" dirty="0" err="1">
+                <a:sym typeface="Wingdings" panose="05000000000000000000" pitchFamily="2" charset="2"/>
+              </a:rPr>
+              <a:t>fus</a:t>
+            </a:r>
+            <a:r>
+              <a:rPr lang="en-US" dirty="0">
+                <a:sym typeface="Wingdings" panose="05000000000000000000" pitchFamily="2" charset="2"/>
+              </a:rPr>
+              <a:t> and calculate cost for this </a:t>
+            </a:r>
+            <a:r>
+              <a:rPr lang="en-US" dirty="0" smtClean="0">
+                <a:sym typeface="Wingdings" panose="05000000000000000000" pitchFamily="2" charset="2"/>
+              </a:rPr>
+              <a:t>service</a:t>
+            </a:r>
+          </a:p>
+          <a:p>
+            <a:r>
+              <a:rPr lang="en-US" dirty="0">
+                <a:sym typeface="Wingdings" panose="05000000000000000000" pitchFamily="2" charset="2"/>
+              </a:rPr>
+              <a:t>	</a:t>
+            </a:r>
+            <a:r>
+              <a:rPr lang="en-US" dirty="0" smtClean="0">
+                <a:sym typeface="Wingdings" panose="05000000000000000000" pitchFamily="2" charset="2"/>
+              </a:rPr>
+              <a:t>call </a:t>
+            </a:r>
+            <a:r>
+              <a:rPr lang="en-US" dirty="0" err="1">
+                <a:sym typeface="Wingdings" panose="05000000000000000000" pitchFamily="2" charset="2"/>
+              </a:rPr>
+              <a:t>freeUnit</a:t>
+            </a:r>
+            <a:r>
+              <a:rPr lang="en-US" dirty="0">
+                <a:sym typeface="Wingdings" panose="05000000000000000000" pitchFamily="2" charset="2"/>
+              </a:rPr>
+              <a:t>  </a:t>
+            </a:r>
+            <a:r>
+              <a:rPr lang="en-US" dirty="0" err="1" smtClean="0">
+                <a:sym typeface="Wingdings" panose="05000000000000000000" pitchFamily="2" charset="2"/>
+              </a:rPr>
+              <a:t>sms</a:t>
+            </a:r>
+            <a:r>
+              <a:rPr lang="en-US" dirty="0" smtClean="0">
+                <a:sym typeface="Wingdings" panose="05000000000000000000" pitchFamily="2" charset="2"/>
+              </a:rPr>
+              <a:t> </a:t>
+            </a:r>
+            <a:r>
+              <a:rPr lang="en-US" dirty="0">
+                <a:sym typeface="Wingdings" panose="05000000000000000000" pitchFamily="2" charset="2"/>
+              </a:rPr>
+              <a:t>class - to update </a:t>
+            </a:r>
+            <a:r>
+              <a:rPr lang="en-US" dirty="0" err="1">
+                <a:sym typeface="Wingdings" panose="05000000000000000000" pitchFamily="2" charset="2"/>
+              </a:rPr>
+              <a:t>fus</a:t>
+            </a:r>
+            <a:r>
+              <a:rPr lang="en-US" dirty="0">
+                <a:sym typeface="Wingdings" panose="05000000000000000000" pitchFamily="2" charset="2"/>
+              </a:rPr>
+              <a:t> and calculate cost for this </a:t>
+            </a:r>
+            <a:r>
+              <a:rPr lang="en-US" dirty="0" smtClean="0">
+                <a:sym typeface="Wingdings" panose="05000000000000000000" pitchFamily="2" charset="2"/>
+              </a:rPr>
+              <a:t>service</a:t>
+            </a:r>
+          </a:p>
+          <a:p>
+            <a:r>
+              <a:rPr lang="en-US" dirty="0">
+                <a:sym typeface="Wingdings" panose="05000000000000000000" pitchFamily="2" charset="2"/>
+              </a:rPr>
+              <a:t>	</a:t>
+            </a:r>
+            <a:r>
+              <a:rPr lang="en-US" b="1" dirty="0" smtClean="0">
+                <a:sym typeface="Wingdings" panose="05000000000000000000" pitchFamily="2" charset="2"/>
+              </a:rPr>
+              <a:t>	e) take return of each class (cost of each service )  in same/different class bill sheet generation </a:t>
+            </a:r>
+          </a:p>
+          <a:p>
+            <a:r>
+              <a:rPr lang="en-US" b="1" dirty="0" smtClean="0">
+                <a:sym typeface="Wingdings" panose="05000000000000000000" pitchFamily="2" charset="2"/>
+              </a:rPr>
+              <a:t>`	will create first Table for bill sheet contains</a:t>
+            </a:r>
+          </a:p>
+          <a:p>
+            <a:r>
+              <a:rPr lang="en-US" b="1" dirty="0">
+                <a:sym typeface="Wingdings" panose="05000000000000000000" pitchFamily="2" charset="2"/>
+              </a:rPr>
+              <a:t>	</a:t>
+            </a:r>
+            <a:r>
+              <a:rPr lang="en-US" b="1" dirty="0" smtClean="0">
+                <a:sym typeface="Wingdings" panose="05000000000000000000" pitchFamily="2" charset="2"/>
+              </a:rPr>
+              <a:t>(</a:t>
+            </a:r>
+            <a:r>
+              <a:rPr lang="en-US" b="1" dirty="0" err="1" smtClean="0">
+                <a:sym typeface="Wingdings" panose="05000000000000000000" pitchFamily="2" charset="2"/>
+              </a:rPr>
+              <a:t>table_id</a:t>
+            </a:r>
+            <a:r>
+              <a:rPr lang="en-US" b="1" dirty="0" smtClean="0">
+                <a:sym typeface="Wingdings" panose="05000000000000000000" pitchFamily="2" charset="2"/>
+              </a:rPr>
+              <a:t>, </a:t>
+            </a:r>
+            <a:r>
+              <a:rPr lang="en-US" b="1" dirty="0" err="1" smtClean="0">
+                <a:solidFill>
+                  <a:srgbClr val="FFC000"/>
+                </a:solidFill>
+                <a:sym typeface="Wingdings" panose="05000000000000000000" pitchFamily="2" charset="2"/>
+              </a:rPr>
+              <a:t>companyName</a:t>
+            </a:r>
+            <a:r>
+              <a:rPr lang="en-US" b="1" dirty="0" smtClean="0">
+                <a:sym typeface="Wingdings" panose="05000000000000000000" pitchFamily="2" charset="2"/>
+              </a:rPr>
+              <a:t>, </a:t>
+            </a:r>
+            <a:r>
+              <a:rPr lang="en-US" b="1" dirty="0" err="1" smtClean="0">
+                <a:solidFill>
+                  <a:srgbClr val="FFC000"/>
+                </a:solidFill>
+                <a:sym typeface="Wingdings" panose="05000000000000000000" pitchFamily="2" charset="2"/>
+              </a:rPr>
+              <a:t>url</a:t>
+            </a:r>
+            <a:r>
+              <a:rPr lang="en-US" b="1" dirty="0" smtClean="0">
+                <a:solidFill>
+                  <a:srgbClr val="FFC000"/>
+                </a:solidFill>
+                <a:sym typeface="Wingdings" panose="05000000000000000000" pitchFamily="2" charset="2"/>
+              </a:rPr>
+              <a:t> of logo </a:t>
+            </a:r>
+            <a:r>
+              <a:rPr lang="en-US" b="1" dirty="0" smtClean="0">
+                <a:sym typeface="Wingdings" panose="05000000000000000000" pitchFamily="2" charset="2"/>
+              </a:rPr>
+              <a:t>, customer </a:t>
+            </a:r>
+            <a:r>
+              <a:rPr lang="en-US" b="1" dirty="0" err="1" smtClean="0">
+                <a:sym typeface="Wingdings" panose="05000000000000000000" pitchFamily="2" charset="2"/>
+              </a:rPr>
+              <a:t>name,Address</a:t>
+            </a:r>
+            <a:r>
+              <a:rPr lang="en-US" b="1" dirty="0" smtClean="0">
+                <a:sym typeface="Wingdings" panose="05000000000000000000" pitchFamily="2" charset="2"/>
+              </a:rPr>
+              <a:t>,</a:t>
+            </a:r>
+          </a:p>
+          <a:p>
+            <a:r>
+              <a:rPr lang="en-US" b="1" dirty="0">
+                <a:sym typeface="Wingdings" panose="05000000000000000000" pitchFamily="2" charset="2"/>
+              </a:rPr>
+              <a:t>	</a:t>
+            </a:r>
+            <a:r>
+              <a:rPr lang="en-US" b="1" dirty="0" smtClean="0">
+                <a:sym typeface="Wingdings" panose="05000000000000000000" pitchFamily="2" charset="2"/>
+              </a:rPr>
+              <a:t> profile Fees, one-Time fees, recurring Fees, Total voice cost, Total SMS cost, </a:t>
+            </a:r>
+            <a:r>
+              <a:rPr lang="en-US" b="1" dirty="0" err="1" smtClean="0">
+                <a:sym typeface="Wingdings" panose="05000000000000000000" pitchFamily="2" charset="2"/>
+              </a:rPr>
+              <a:t>ToTal</a:t>
+            </a:r>
+            <a:r>
+              <a:rPr lang="en-US" b="1" dirty="0" smtClean="0">
+                <a:sym typeface="Wingdings" panose="05000000000000000000" pitchFamily="2" charset="2"/>
+              </a:rPr>
+              <a:t> Data cost, </a:t>
+            </a:r>
+            <a:r>
+              <a:rPr lang="en-US" b="1" dirty="0" err="1" smtClean="0">
+                <a:sym typeface="Wingdings" panose="05000000000000000000" pitchFamily="2" charset="2"/>
+              </a:rPr>
+              <a:t>Taxs</a:t>
+            </a:r>
+            <a:r>
+              <a:rPr lang="en-US" b="1" dirty="0" smtClean="0">
+                <a:sym typeface="Wingdings" panose="05000000000000000000" pitchFamily="2" charset="2"/>
+              </a:rPr>
+              <a:t>, Total 	invoice)</a:t>
+            </a:r>
+          </a:p>
+          <a:p>
+            <a:r>
+              <a:rPr lang="en-US" b="1" dirty="0">
+                <a:sym typeface="Wingdings" panose="05000000000000000000" pitchFamily="2" charset="2"/>
+              </a:rPr>
+              <a:t>	</a:t>
+            </a:r>
+            <a:r>
+              <a:rPr lang="en-US" b="1" dirty="0" smtClean="0">
+                <a:sym typeface="Wingdings" panose="05000000000000000000" pitchFamily="2" charset="2"/>
+              </a:rPr>
+              <a:t>f) call/data/</a:t>
+            </a:r>
+            <a:r>
+              <a:rPr lang="en-US" b="1" dirty="0" err="1" smtClean="0">
+                <a:sym typeface="Wingdings" panose="05000000000000000000" pitchFamily="2" charset="2"/>
+              </a:rPr>
+              <a:t>sms</a:t>
+            </a:r>
+            <a:r>
+              <a:rPr lang="en-US" b="1" dirty="0" smtClean="0">
+                <a:sym typeface="Wingdings" panose="05000000000000000000" pitchFamily="2" charset="2"/>
+              </a:rPr>
+              <a:t> details pages</a:t>
+            </a:r>
+          </a:p>
+          <a:p>
+            <a:r>
+              <a:rPr lang="en-US" b="1" dirty="0" smtClean="0">
+                <a:sym typeface="Wingdings" panose="05000000000000000000" pitchFamily="2" charset="2"/>
+              </a:rPr>
+              <a:t>3) Display on portal (pdf on browser)</a:t>
+            </a:r>
+            <a:endParaRPr lang="en-US" b="1" dirty="0"/>
+          </a:p>
+        </p:txBody>
+      </p:sp>
+      <p:graphicFrame>
+        <p:nvGraphicFramePr>
+          <p:cNvPr id="4" name="Table 3"/>
+          <p:cNvGraphicFramePr>
+            <a:graphicFrameLocks noGrp="1"/>
+          </p:cNvGraphicFramePr>
+          <p:nvPr>
+            <p:extLst>
+              <p:ext uri="{D42A27DB-BD31-4B8C-83A1-F6EECF244321}">
+                <p14:modId xmlns:p14="http://schemas.microsoft.com/office/powerpoint/2010/main" val="3595469872"/>
+              </p:ext>
+            </p:extLst>
+          </p:nvPr>
+        </p:nvGraphicFramePr>
+        <p:xfrm>
+          <a:off x="674252" y="5729385"/>
+          <a:ext cx="11102112" cy="914400"/>
+        </p:xfrm>
+        <a:graphic>
+          <a:graphicData uri="http://schemas.openxmlformats.org/drawingml/2006/table">
+            <a:tbl>
+              <a:tblPr firstRow="1" bandRow="1">
+                <a:tableStyleId>{5C22544A-7EE6-4342-B048-85BDC9FD1C3A}</a:tableStyleId>
+              </a:tblPr>
+              <a:tblGrid>
+                <a:gridCol w="710089">
+                  <a:extLst>
+                    <a:ext uri="{9D8B030D-6E8A-4147-A177-3AD203B41FA5}">
+                      <a16:colId xmlns:a16="http://schemas.microsoft.com/office/drawing/2014/main" val="4251094841"/>
+                    </a:ext>
+                  </a:extLst>
+                </a:gridCol>
+                <a:gridCol w="1308476">
+                  <a:extLst>
+                    <a:ext uri="{9D8B030D-6E8A-4147-A177-3AD203B41FA5}">
+                      <a16:colId xmlns:a16="http://schemas.microsoft.com/office/drawing/2014/main" val="1610645073"/>
+                    </a:ext>
+                  </a:extLst>
+                </a:gridCol>
+                <a:gridCol w="1009283">
+                  <a:extLst>
+                    <a:ext uri="{9D8B030D-6E8A-4147-A177-3AD203B41FA5}">
+                      <a16:colId xmlns:a16="http://schemas.microsoft.com/office/drawing/2014/main" val="3836028896"/>
+                    </a:ext>
+                  </a:extLst>
+                </a:gridCol>
+                <a:gridCol w="1009283">
+                  <a:extLst>
+                    <a:ext uri="{9D8B030D-6E8A-4147-A177-3AD203B41FA5}">
+                      <a16:colId xmlns:a16="http://schemas.microsoft.com/office/drawing/2014/main" val="1935004993"/>
+                    </a:ext>
+                  </a:extLst>
+                </a:gridCol>
+                <a:gridCol w="1009283">
+                  <a:extLst>
+                    <a:ext uri="{9D8B030D-6E8A-4147-A177-3AD203B41FA5}">
+                      <a16:colId xmlns:a16="http://schemas.microsoft.com/office/drawing/2014/main" val="3423328262"/>
+                    </a:ext>
+                  </a:extLst>
+                </a:gridCol>
+                <a:gridCol w="1009283">
+                  <a:extLst>
+                    <a:ext uri="{9D8B030D-6E8A-4147-A177-3AD203B41FA5}">
+                      <a16:colId xmlns:a16="http://schemas.microsoft.com/office/drawing/2014/main" val="1628423275"/>
+                    </a:ext>
+                  </a:extLst>
+                </a:gridCol>
+                <a:gridCol w="1009283">
+                  <a:extLst>
+                    <a:ext uri="{9D8B030D-6E8A-4147-A177-3AD203B41FA5}">
+                      <a16:colId xmlns:a16="http://schemas.microsoft.com/office/drawing/2014/main" val="2342477985"/>
+                    </a:ext>
+                  </a:extLst>
+                </a:gridCol>
+                <a:gridCol w="1009283">
+                  <a:extLst>
+                    <a:ext uri="{9D8B030D-6E8A-4147-A177-3AD203B41FA5}">
+                      <a16:colId xmlns:a16="http://schemas.microsoft.com/office/drawing/2014/main" val="1261026011"/>
+                    </a:ext>
+                  </a:extLst>
+                </a:gridCol>
+                <a:gridCol w="1009283">
+                  <a:extLst>
+                    <a:ext uri="{9D8B030D-6E8A-4147-A177-3AD203B41FA5}">
+                      <a16:colId xmlns:a16="http://schemas.microsoft.com/office/drawing/2014/main" val="331378307"/>
+                    </a:ext>
+                  </a:extLst>
+                </a:gridCol>
+                <a:gridCol w="1009283">
+                  <a:extLst>
+                    <a:ext uri="{9D8B030D-6E8A-4147-A177-3AD203B41FA5}">
+                      <a16:colId xmlns:a16="http://schemas.microsoft.com/office/drawing/2014/main" val="3247464116"/>
+                    </a:ext>
+                  </a:extLst>
+                </a:gridCol>
+                <a:gridCol w="1009283">
+                  <a:extLst>
+                    <a:ext uri="{9D8B030D-6E8A-4147-A177-3AD203B41FA5}">
+                      <a16:colId xmlns:a16="http://schemas.microsoft.com/office/drawing/2014/main" val="2154436256"/>
+                    </a:ext>
+                  </a:extLst>
+                </a:gridCol>
+              </a:tblGrid>
+              <a:tr h="370840">
+                <a:tc>
+                  <a:txBody>
+                    <a:bodyPr/>
+                    <a:lstStyle/>
+                    <a:p>
+                      <a:r>
+                        <a:rPr lang="en-US" dirty="0" err="1" smtClean="0"/>
+                        <a:t>Bill_id</a:t>
+                      </a:r>
+                      <a:endParaRPr lang="en-US" dirty="0"/>
+                    </a:p>
+                  </a:txBody>
+                  <a:tcPr/>
+                </a:tc>
+                <a:tc>
+                  <a:txBody>
+                    <a:bodyPr/>
+                    <a:lstStyle/>
+                    <a:p>
+                      <a:r>
+                        <a:rPr lang="en-US" dirty="0" err="1" smtClean="0"/>
+                        <a:t>customerName</a:t>
+                      </a:r>
+                      <a:endParaRPr lang="en-US" dirty="0"/>
+                    </a:p>
+                  </a:txBody>
+                  <a:tcPr/>
+                </a:tc>
+                <a:tc>
+                  <a:txBody>
+                    <a:bodyPr/>
+                    <a:lstStyle/>
+                    <a:p>
+                      <a:r>
+                        <a:rPr lang="en-US" dirty="0" smtClean="0"/>
+                        <a:t>Address</a:t>
+                      </a:r>
+                      <a:endParaRPr lang="en-US" dirty="0"/>
+                    </a:p>
+                  </a:txBody>
+                  <a:tcPr/>
+                </a:tc>
+                <a:tc>
+                  <a:txBody>
+                    <a:bodyPr/>
+                    <a:lstStyle/>
+                    <a:p>
+                      <a:r>
+                        <a:rPr lang="en-US" dirty="0" err="1" smtClean="0"/>
+                        <a:t>profileFees</a:t>
+                      </a:r>
+                      <a:endParaRPr lang="en-US" dirty="0"/>
+                    </a:p>
+                  </a:txBody>
+                  <a:tcPr/>
+                </a:tc>
+                <a:tc>
+                  <a:txBody>
+                    <a:bodyPr/>
+                    <a:lstStyle/>
+                    <a:p>
+                      <a:r>
+                        <a:rPr lang="en-US" dirty="0" err="1" smtClean="0"/>
+                        <a:t>OneTimeFees</a:t>
+                      </a:r>
+                      <a:endParaRPr lang="en-US" dirty="0"/>
+                    </a:p>
+                  </a:txBody>
+                  <a:tcPr/>
+                </a:tc>
+                <a:tc>
+                  <a:txBody>
+                    <a:bodyPr/>
+                    <a:lstStyle/>
+                    <a:p>
+                      <a:r>
+                        <a:rPr lang="en-US" dirty="0" err="1" smtClean="0"/>
+                        <a:t>Reccuring</a:t>
+                      </a:r>
+                      <a:r>
+                        <a:rPr lang="en-US" dirty="0" smtClean="0"/>
+                        <a:t> fees</a:t>
+                      </a:r>
+                      <a:endParaRPr lang="en-US" dirty="0"/>
+                    </a:p>
+                  </a:txBody>
+                  <a:tcPr/>
+                </a:tc>
+                <a:tc>
+                  <a:txBody>
+                    <a:bodyPr/>
+                    <a:lstStyle/>
+                    <a:p>
+                      <a:r>
+                        <a:rPr lang="en-US" dirty="0" err="1" smtClean="0"/>
+                        <a:t>TotalVoice</a:t>
+                      </a:r>
+                      <a:r>
+                        <a:rPr lang="en-US" dirty="0" smtClean="0"/>
+                        <a:t> Cost</a:t>
+                      </a:r>
+                      <a:endParaRPr lang="en-US" dirty="0"/>
+                    </a:p>
+                  </a:txBody>
+                  <a:tcPr/>
+                </a:tc>
+                <a:tc>
+                  <a:txBody>
+                    <a:bodyPr/>
+                    <a:lstStyle/>
+                    <a:p>
+                      <a:r>
+                        <a:rPr lang="en-US" dirty="0" smtClean="0"/>
+                        <a:t>Total SMS cost</a:t>
+                      </a:r>
+                      <a:endParaRPr lang="en-US" dirty="0"/>
+                    </a:p>
+                  </a:txBody>
+                  <a:tcPr/>
+                </a:tc>
+                <a:tc>
+                  <a:txBody>
+                    <a:bodyPr/>
+                    <a:lstStyle/>
+                    <a:p>
+                      <a:r>
+                        <a:rPr lang="en-US" dirty="0" smtClean="0"/>
+                        <a:t>Total Data Cost </a:t>
+                      </a:r>
+                      <a:endParaRPr lang="en-US" dirty="0"/>
+                    </a:p>
+                  </a:txBody>
+                  <a:tcPr/>
+                </a:tc>
+                <a:tc>
+                  <a:txBody>
+                    <a:bodyPr/>
+                    <a:lstStyle/>
+                    <a:p>
+                      <a:r>
+                        <a:rPr lang="en-US" dirty="0" err="1" smtClean="0"/>
+                        <a:t>Taxs</a:t>
+                      </a:r>
+                      <a:endParaRPr lang="en-US" dirty="0"/>
+                    </a:p>
+                  </a:txBody>
+                  <a:tcPr/>
+                </a:tc>
+                <a:tc>
+                  <a:txBody>
+                    <a:bodyPr/>
+                    <a:lstStyle/>
+                    <a:p>
+                      <a:r>
+                        <a:rPr lang="en-US" dirty="0" smtClean="0"/>
+                        <a:t>Total Invoice </a:t>
+                      </a:r>
+                      <a:endParaRPr lang="en-US" dirty="0"/>
+                    </a:p>
+                  </a:txBody>
+                  <a:tcPr/>
+                </a:tc>
+                <a:extLst>
+                  <a:ext uri="{0D108BD9-81ED-4DB2-BD59-A6C34878D82A}">
+                    <a16:rowId xmlns:a16="http://schemas.microsoft.com/office/drawing/2014/main" val="1251800219"/>
+                  </a:ext>
+                </a:extLst>
+              </a:tr>
+            </a:tbl>
+          </a:graphicData>
+        </a:graphic>
+      </p:graphicFrame>
+    </p:spTree>
+    <p:extLst>
+      <p:ext uri="{BB962C8B-B14F-4D97-AF65-F5344CB8AC3E}">
+        <p14:creationId xmlns:p14="http://schemas.microsoft.com/office/powerpoint/2010/main" val="2526895437"/>
+      </p:ext>
+    </p:extLst>
+  </p:cSld>
+  <p:clrMapOvr>
+    <a:masterClrMapping/>
+  </p:clrMapOvr>
+</p:sld>
+</file>
+
+<file path=ppt/slides/slide8.xml><?xml version="1.0" encoding="utf-8"?>
 <p:sld xmlns:a="http://schemas.openxmlformats.org/drawingml/2006/main" xmlns:r="http://schemas.openxmlformats.org/officeDocument/2006/relationships" xmlns:p="http://schemas.openxmlformats.org/presentationml/2006/main">
   <p:cSld>
     <p:spTree>

</xml_diff>